<commit_message>
chore : ctrl+s (save file) works
</commit_message>
<xml_diff>
--- a/DATA STRUCTURE PROJECT – TEXT EDITOR.pptx
+++ b/DATA STRUCTURE PROJECT – TEXT EDITOR.pptx
@@ -306,7 +306,7 @@
             <a:fld id="{B61BEF0D-F0BB-DE4B-95CE-6DB70DBA9567}" type="datetimeFigureOut">
               <a:rPr lang="en-US" dirty="0"/>
               <a:pPr/>
-              <a:t>3/1/2021</a:t>
+              <a:t>3/2/2021</a:t>
             </a:fld>
             <a:endParaRPr lang="en-US" dirty="0"/>
           </a:p>
@@ -641,7 +641,7 @@
             <a:fld id="{B61BEF0D-F0BB-DE4B-95CE-6DB70DBA9567}" type="datetimeFigureOut">
               <a:rPr lang="en-US" dirty="0"/>
               <a:pPr/>
-              <a:t>3/1/2021</a:t>
+              <a:t>3/2/2021</a:t>
             </a:fld>
             <a:endParaRPr lang="en-US" dirty="0"/>
           </a:p>
@@ -1039,7 +1039,7 @@
             <a:fld id="{B61BEF0D-F0BB-DE4B-95CE-6DB70DBA9567}" type="datetimeFigureOut">
               <a:rPr lang="en-US" dirty="0"/>
               <a:pPr/>
-              <a:t>3/1/2021</a:t>
+              <a:t>3/2/2021</a:t>
             </a:fld>
             <a:endParaRPr lang="en-US" dirty="0"/>
           </a:p>
@@ -1371,7 +1371,7 @@
             <a:fld id="{B61BEF0D-F0BB-DE4B-95CE-6DB70DBA9567}" type="datetimeFigureOut">
               <a:rPr lang="en-US" dirty="0"/>
               <a:pPr/>
-              <a:t>3/1/2021</a:t>
+              <a:t>3/2/2021</a:t>
             </a:fld>
             <a:endParaRPr lang="en-US" dirty="0"/>
           </a:p>
@@ -1688,7 +1688,7 @@
             <a:fld id="{B61BEF0D-F0BB-DE4B-95CE-6DB70DBA9567}" type="datetimeFigureOut">
               <a:rPr lang="en-US" dirty="0"/>
               <a:pPr/>
-              <a:t>3/1/2021</a:t>
+              <a:t>3/2/2021</a:t>
             </a:fld>
             <a:endParaRPr lang="en-US" dirty="0"/>
           </a:p>
@@ -2081,7 +2081,7 @@
             <a:fld id="{B61BEF0D-F0BB-DE4B-95CE-6DB70DBA9567}" type="datetimeFigureOut">
               <a:rPr lang="en-US" dirty="0"/>
               <a:pPr/>
-              <a:t>3/1/2021</a:t>
+              <a:t>3/2/2021</a:t>
             </a:fld>
             <a:endParaRPr lang="en-US" dirty="0"/>
           </a:p>
@@ -2335,7 +2335,7 @@
             <a:fld id="{B61BEF0D-F0BB-DE4B-95CE-6DB70DBA9567}" type="datetimeFigureOut">
               <a:rPr lang="en-US" dirty="0"/>
               <a:pPr/>
-              <a:t>3/1/2021</a:t>
+              <a:t>3/2/2021</a:t>
             </a:fld>
             <a:endParaRPr lang="en-US" dirty="0"/>
           </a:p>
@@ -2594,7 +2594,7 @@
             <a:fld id="{B61BEF0D-F0BB-DE4B-95CE-6DB70DBA9567}" type="datetimeFigureOut">
               <a:rPr lang="en-US" dirty="0"/>
               <a:pPr/>
-              <a:t>3/1/2021</a:t>
+              <a:t>3/2/2021</a:t>
             </a:fld>
             <a:endParaRPr lang="en-US" dirty="0"/>
           </a:p>
@@ -2853,7 +2853,7 @@
             <a:fld id="{B61BEF0D-F0BB-DE4B-95CE-6DB70DBA9567}" type="datetimeFigureOut">
               <a:rPr lang="en-US" dirty="0"/>
               <a:pPr/>
-              <a:t>3/1/2021</a:t>
+              <a:t>3/2/2021</a:t>
             </a:fld>
             <a:endParaRPr lang="en-US" dirty="0"/>
           </a:p>
@@ -3179,7 +3179,7 @@
             <a:fld id="{B61BEF0D-F0BB-DE4B-95CE-6DB70DBA9567}" type="datetimeFigureOut">
               <a:rPr lang="en-US" dirty="0"/>
               <a:pPr/>
-              <a:t>3/1/2021</a:t>
+              <a:t>3/2/2021</a:t>
             </a:fld>
             <a:endParaRPr lang="en-US" dirty="0"/>
           </a:p>
@@ -3499,7 +3499,7 @@
             <a:fld id="{B61BEF0D-F0BB-DE4B-95CE-6DB70DBA9567}" type="datetimeFigureOut">
               <a:rPr lang="en-US" dirty="0"/>
               <a:pPr/>
-              <a:t>3/1/2021</a:t>
+              <a:t>3/2/2021</a:t>
             </a:fld>
             <a:endParaRPr lang="en-US" dirty="0"/>
           </a:p>
@@ -3953,7 +3953,7 @@
             <a:fld id="{B61BEF0D-F0BB-DE4B-95CE-6DB70DBA9567}" type="datetimeFigureOut">
               <a:rPr lang="en-US" dirty="0"/>
               <a:pPr/>
-              <a:t>3/1/2021</a:t>
+              <a:t>3/2/2021</a:t>
             </a:fld>
             <a:endParaRPr lang="en-US" dirty="0"/>
           </a:p>
@@ -4155,7 +4155,7 @@
             <a:fld id="{B61BEF0D-F0BB-DE4B-95CE-6DB70DBA9567}" type="datetimeFigureOut">
               <a:rPr lang="en-US" dirty="0"/>
               <a:pPr/>
-              <a:t>3/1/2021</a:t>
+              <a:t>3/2/2021</a:t>
             </a:fld>
             <a:endParaRPr lang="en-US" dirty="0"/>
           </a:p>
@@ -4329,7 +4329,7 @@
             <a:fld id="{B61BEF0D-F0BB-DE4B-95CE-6DB70DBA9567}" type="datetimeFigureOut">
               <a:rPr lang="en-US" dirty="0"/>
               <a:pPr/>
-              <a:t>3/1/2021</a:t>
+              <a:t>3/2/2021</a:t>
             </a:fld>
             <a:endParaRPr lang="en-US" dirty="0"/>
           </a:p>
@@ -4659,7 +4659,7 @@
             <a:fld id="{B61BEF0D-F0BB-DE4B-95CE-6DB70DBA9567}" type="datetimeFigureOut">
               <a:rPr lang="en-US" dirty="0"/>
               <a:pPr/>
-              <a:t>3/1/2021</a:t>
+              <a:t>3/2/2021</a:t>
             </a:fld>
             <a:endParaRPr lang="en-US" dirty="0"/>
           </a:p>
@@ -5001,7 +5001,7 @@
             <a:fld id="{B61BEF0D-F0BB-DE4B-95CE-6DB70DBA9567}" type="datetimeFigureOut">
               <a:rPr lang="en-US" dirty="0"/>
               <a:pPr/>
-              <a:t>3/1/2021</a:t>
+              <a:t>3/2/2021</a:t>
             </a:fld>
             <a:endParaRPr lang="en-US" dirty="0"/>
           </a:p>
@@ -7115,7 +7115,7 @@
             <a:fld id="{B61BEF0D-F0BB-DE4B-95CE-6DB70DBA9567}" type="datetimeFigureOut">
               <a:rPr lang="en-US" dirty="0"/>
               <a:pPr/>
-              <a:t>3/1/2021</a:t>
+              <a:t>3/2/2021</a:t>
             </a:fld>
             <a:endParaRPr lang="en-US" dirty="0"/>
           </a:p>
@@ -8280,7 +8280,7 @@
         <p:spPr/>
         <p:txBody>
           <a:bodyPr>
-            <a:normAutofit lnSpcReduction="10000"/>
+            <a:normAutofit fontScale="92500" lnSpcReduction="10000"/>
           </a:bodyPr>
           <a:lstStyle/>
           <a:p>
@@ -8318,6 +8318,25 @@
               <a:rPr lang="en-IN" dirty="0"/>
               <a:t>Backspace works</a:t>
             </a:r>
+          </a:p>
+          <a:p>
+            <a:r>
+              <a:rPr lang="en-IN" dirty="0"/>
+              <a:t>Save file works </a:t>
+            </a:r>
+            <a:r>
+              <a:rPr lang="en-IN" dirty="0" err="1"/>
+              <a:t>i.e</a:t>
+            </a:r>
+            <a:r>
+              <a:rPr lang="en-IN" dirty="0"/>
+              <a:t> ctrl + </a:t>
+            </a:r>
+            <a:r>
+              <a:rPr lang="en-IN"/>
+              <a:t>s works</a:t>
+            </a:r>
+            <a:endParaRPr lang="en-IN" dirty="0"/>
           </a:p>
           <a:p>
             <a:r>

</xml_diff>

<commit_message>
chore : Gantt chart image added and its html file deleted
</commit_message>
<xml_diff>
--- a/DATA STRUCTURE PROJECT – TEXT EDITOR.pptx
+++ b/DATA STRUCTURE PROJECT – TEXT EDITOR.pptx
@@ -21506,7 +21506,7 @@
             <a:pPr algn="ctr"/>
             <a:r>
               <a:rPr lang="en-IN" sz="2400" dirty="0"/>
-              <a:t>Project Name :  Text Editor</a:t>
+              <a:t>Text Editor</a:t>
             </a:r>
           </a:p>
         </p:txBody>
@@ -22151,6 +22151,45 @@
           </a:p>
         </p:txBody>
       </p:sp>
+      <p:sp>
+        <p:nvSpPr>
+          <p:cNvPr id="2" name="TextBox 1">
+            <a:extLst>
+              <a:ext uri="{FF2B5EF4-FFF2-40B4-BE49-F238E27FC236}">
+                <a16:creationId xmlns:a16="http://schemas.microsoft.com/office/drawing/2014/main" id="{B54A9ED6-F30D-40A1-BF30-CC2626E67ADF}"/>
+              </a:ext>
+            </a:extLst>
+          </p:cNvPr>
+          <p:cNvSpPr txBox="1"/>
+          <p:nvPr/>
+        </p:nvSpPr>
+        <p:spPr>
+          <a:xfrm>
+            <a:off x="1822882" y="43826"/>
+            <a:ext cx="3171743" cy="523220"/>
+          </a:xfrm>
+          <a:prstGeom prst="rect">
+            <a:avLst/>
+          </a:prstGeom>
+          <a:noFill/>
+        </p:spPr>
+        <p:txBody>
+          <a:bodyPr wrap="square" rtlCol="0">
+            <a:spAutoFit/>
+          </a:bodyPr>
+          <a:lstStyle/>
+          <a:p>
+            <a:r>
+              <a:rPr lang="en-IN" sz="2800" dirty="0">
+                <a:solidFill>
+                  <a:srgbClr val="FF0000"/>
+                </a:solidFill>
+              </a:rPr>
+              <a:t>Gantt Chart : </a:t>
+            </a:r>
+          </a:p>
+        </p:txBody>
+      </p:sp>
     </p:spTree>
     <p:extLst>
       <p:ext uri="{BB962C8B-B14F-4D97-AF65-F5344CB8AC3E}">

</xml_diff>

<commit_message>
Screenshots added and some minor changes
</commit_message>
<xml_diff>
--- a/DATA STRUCTURE PROJECT – TEXT EDITOR.pptx
+++ b/DATA STRUCTURE PROJECT – TEXT EDITOR.pptx
@@ -6,11 +6,13 @@
   </p:sldMasterIdLst>
   <p:sldIdLst>
     <p:sldId id="256" r:id="rId2"/>
-    <p:sldId id="257" r:id="rId3"/>
-    <p:sldId id="263" r:id="rId4"/>
-    <p:sldId id="258" r:id="rId5"/>
-    <p:sldId id="260" r:id="rId6"/>
-    <p:sldId id="262" r:id="rId7"/>
+    <p:sldId id="263" r:id="rId3"/>
+    <p:sldId id="264" r:id="rId4"/>
+    <p:sldId id="267" r:id="rId5"/>
+    <p:sldId id="258" r:id="rId6"/>
+    <p:sldId id="257" r:id="rId7"/>
+    <p:sldId id="262" r:id="rId8"/>
+    <p:sldId id="266" r:id="rId9"/>
   </p:sldIdLst>
   <p:sldSz cx="12192000" cy="6858000"/>
   <p:notesSz cx="6858000" cy="9144000"/>
@@ -117,6 +119,2942 @@
 </p:presentation>
 </file>
 
+<file path=ppt/diagrams/colors1.xml><?xml version="1.0" encoding="utf-8"?>
+<dgm:colorsDef xmlns:dgm="http://schemas.openxmlformats.org/drawingml/2006/diagram" xmlns:a="http://schemas.openxmlformats.org/drawingml/2006/main" uniqueId="urn:microsoft.com/office/officeart/2005/8/colors/accent0_3">
+  <dgm:title val=""/>
+  <dgm:desc val=""/>
+  <dgm:catLst>
+    <dgm:cat type="mainScheme" pri="10300"/>
+  </dgm:catLst>
+  <dgm:styleLbl name="node0">
+    <dgm:fillClrLst meth="repeat">
+      <a:schemeClr val="dk2"/>
+    </dgm:fillClrLst>
+    <dgm:linClrLst meth="repeat">
+      <a:schemeClr val="lt2"/>
+    </dgm:linClrLst>
+    <dgm:effectClrLst/>
+    <dgm:txLinClrLst/>
+    <dgm:txFillClrLst/>
+    <dgm:txEffectClrLst/>
+  </dgm:styleLbl>
+  <dgm:styleLbl name="alignNode1">
+    <dgm:fillClrLst meth="repeat">
+      <a:schemeClr val="dk2"/>
+    </dgm:fillClrLst>
+    <dgm:linClrLst meth="repeat">
+      <a:schemeClr val="dk2"/>
+    </dgm:linClrLst>
+    <dgm:effectClrLst/>
+    <dgm:txLinClrLst/>
+    <dgm:txFillClrLst/>
+    <dgm:txEffectClrLst/>
+  </dgm:styleLbl>
+  <dgm:styleLbl name="node1">
+    <dgm:fillClrLst meth="repeat">
+      <a:schemeClr val="dk2"/>
+    </dgm:fillClrLst>
+    <dgm:linClrLst meth="repeat">
+      <a:schemeClr val="lt2"/>
+    </dgm:linClrLst>
+    <dgm:effectClrLst/>
+    <dgm:txLinClrLst/>
+    <dgm:txFillClrLst/>
+    <dgm:txEffectClrLst/>
+  </dgm:styleLbl>
+  <dgm:styleLbl name="lnNode1">
+    <dgm:fillClrLst meth="repeat">
+      <a:schemeClr val="dk2"/>
+    </dgm:fillClrLst>
+    <dgm:linClrLst meth="repeat">
+      <a:schemeClr val="lt2"/>
+    </dgm:linClrLst>
+    <dgm:effectClrLst/>
+    <dgm:txLinClrLst/>
+    <dgm:txFillClrLst/>
+    <dgm:txEffectClrLst/>
+  </dgm:styleLbl>
+  <dgm:styleLbl name="vennNode1">
+    <dgm:fillClrLst meth="repeat">
+      <a:schemeClr val="dk2">
+        <a:alpha val="50000"/>
+      </a:schemeClr>
+    </dgm:fillClrLst>
+    <dgm:linClrLst meth="repeat">
+      <a:schemeClr val="lt2"/>
+    </dgm:linClrLst>
+    <dgm:effectClrLst/>
+    <dgm:txLinClrLst/>
+    <dgm:txFillClrLst/>
+    <dgm:txEffectClrLst/>
+  </dgm:styleLbl>
+  <dgm:styleLbl name="node2">
+    <dgm:fillClrLst meth="repeat">
+      <a:schemeClr val="dk2"/>
+    </dgm:fillClrLst>
+    <dgm:linClrLst meth="repeat">
+      <a:schemeClr val="lt2"/>
+    </dgm:linClrLst>
+    <dgm:effectClrLst/>
+    <dgm:txLinClrLst/>
+    <dgm:txFillClrLst/>
+    <dgm:txEffectClrLst/>
+  </dgm:styleLbl>
+  <dgm:styleLbl name="node3">
+    <dgm:fillClrLst meth="repeat">
+      <a:schemeClr val="dk2"/>
+    </dgm:fillClrLst>
+    <dgm:linClrLst meth="repeat">
+      <a:schemeClr val="lt2"/>
+    </dgm:linClrLst>
+    <dgm:effectClrLst/>
+    <dgm:txLinClrLst/>
+    <dgm:txFillClrLst/>
+    <dgm:txEffectClrLst/>
+  </dgm:styleLbl>
+  <dgm:styleLbl name="node4">
+    <dgm:fillClrLst meth="repeat">
+      <a:schemeClr val="dk2"/>
+    </dgm:fillClrLst>
+    <dgm:linClrLst meth="repeat">
+      <a:schemeClr val="lt2"/>
+    </dgm:linClrLst>
+    <dgm:effectClrLst/>
+    <dgm:txLinClrLst/>
+    <dgm:txFillClrLst/>
+    <dgm:txEffectClrLst/>
+  </dgm:styleLbl>
+  <dgm:styleLbl name="fgImgPlace1">
+    <dgm:fillClrLst meth="repeat">
+      <a:schemeClr val="dk2">
+        <a:tint val="50000"/>
+      </a:schemeClr>
+    </dgm:fillClrLst>
+    <dgm:linClrLst meth="repeat">
+      <a:schemeClr val="lt2"/>
+    </dgm:linClrLst>
+    <dgm:effectClrLst/>
+    <dgm:txLinClrLst/>
+    <dgm:txFillClrLst meth="repeat">
+      <a:schemeClr val="lt2"/>
+    </dgm:txFillClrLst>
+    <dgm:txEffectClrLst/>
+  </dgm:styleLbl>
+  <dgm:styleLbl name="alignImgPlace1">
+    <dgm:fillClrLst meth="repeat">
+      <a:schemeClr val="dk2">
+        <a:tint val="50000"/>
+      </a:schemeClr>
+    </dgm:fillClrLst>
+    <dgm:linClrLst meth="repeat">
+      <a:schemeClr val="dk2">
+        <a:shade val="80000"/>
+      </a:schemeClr>
+    </dgm:linClrLst>
+    <dgm:effectClrLst/>
+    <dgm:txLinClrLst/>
+    <dgm:txFillClrLst meth="repeat">
+      <a:schemeClr val="lt2"/>
+    </dgm:txFillClrLst>
+    <dgm:txEffectClrLst/>
+  </dgm:styleLbl>
+  <dgm:styleLbl name="bgImgPlace1">
+    <dgm:fillClrLst meth="repeat">
+      <a:schemeClr val="dk2">
+        <a:tint val="50000"/>
+      </a:schemeClr>
+    </dgm:fillClrLst>
+    <dgm:linClrLst meth="repeat">
+      <a:schemeClr val="dk2">
+        <a:shade val="80000"/>
+      </a:schemeClr>
+    </dgm:linClrLst>
+    <dgm:effectClrLst/>
+    <dgm:txLinClrLst/>
+    <dgm:txFillClrLst meth="repeat">
+      <a:schemeClr val="lt2"/>
+    </dgm:txFillClrLst>
+    <dgm:txEffectClrLst/>
+  </dgm:styleLbl>
+  <dgm:styleLbl name="sibTrans2D1">
+    <dgm:fillClrLst meth="repeat">
+      <a:schemeClr val="dk2">
+        <a:tint val="60000"/>
+      </a:schemeClr>
+    </dgm:fillClrLst>
+    <dgm:linClrLst meth="repeat">
+      <a:schemeClr val="dk2">
+        <a:tint val="60000"/>
+      </a:schemeClr>
+    </dgm:linClrLst>
+    <dgm:effectClrLst/>
+    <dgm:txLinClrLst/>
+    <dgm:txFillClrLst/>
+    <dgm:txEffectClrLst/>
+  </dgm:styleLbl>
+  <dgm:styleLbl name="fgSibTrans2D1">
+    <dgm:fillClrLst meth="repeat">
+      <a:schemeClr val="dk2">
+        <a:tint val="60000"/>
+      </a:schemeClr>
+    </dgm:fillClrLst>
+    <dgm:linClrLst meth="repeat">
+      <a:schemeClr val="dk2">
+        <a:tint val="60000"/>
+      </a:schemeClr>
+    </dgm:linClrLst>
+    <dgm:effectClrLst/>
+    <dgm:txLinClrLst/>
+    <dgm:txFillClrLst/>
+    <dgm:txEffectClrLst/>
+  </dgm:styleLbl>
+  <dgm:styleLbl name="bgSibTrans2D1">
+    <dgm:fillClrLst meth="repeat">
+      <a:schemeClr val="dk2">
+        <a:tint val="60000"/>
+      </a:schemeClr>
+    </dgm:fillClrLst>
+    <dgm:linClrLst meth="repeat">
+      <a:schemeClr val="dk2">
+        <a:tint val="60000"/>
+      </a:schemeClr>
+    </dgm:linClrLst>
+    <dgm:effectClrLst/>
+    <dgm:txLinClrLst/>
+    <dgm:txFillClrLst/>
+    <dgm:txEffectClrLst/>
+  </dgm:styleLbl>
+  <dgm:styleLbl name="sibTrans1D1">
+    <dgm:fillClrLst meth="repeat">
+      <a:schemeClr val="dk2"/>
+    </dgm:fillClrLst>
+    <dgm:linClrLst meth="repeat">
+      <a:schemeClr val="dk2"/>
+    </dgm:linClrLst>
+    <dgm:effectClrLst/>
+    <dgm:txLinClrLst/>
+    <dgm:txFillClrLst meth="repeat">
+      <a:schemeClr val="lt2"/>
+    </dgm:txFillClrLst>
+    <dgm:txEffectClrLst/>
+  </dgm:styleLbl>
+  <dgm:styleLbl name="callout">
+    <dgm:fillClrLst meth="repeat">
+      <a:schemeClr val="dk2"/>
+    </dgm:fillClrLst>
+    <dgm:linClrLst meth="repeat">
+      <a:schemeClr val="dk2">
+        <a:tint val="50000"/>
+      </a:schemeClr>
+    </dgm:linClrLst>
+    <dgm:effectClrLst/>
+    <dgm:txLinClrLst/>
+    <dgm:txFillClrLst meth="repeat">
+      <a:schemeClr val="lt2"/>
+    </dgm:txFillClrLst>
+    <dgm:txEffectClrLst/>
+  </dgm:styleLbl>
+  <dgm:styleLbl name="asst0">
+    <dgm:fillClrLst meth="repeat">
+      <a:schemeClr val="dk2"/>
+    </dgm:fillClrLst>
+    <dgm:linClrLst meth="repeat">
+      <a:schemeClr val="lt2"/>
+    </dgm:linClrLst>
+    <dgm:effectClrLst/>
+    <dgm:txLinClrLst/>
+    <dgm:txFillClrLst/>
+    <dgm:txEffectClrLst/>
+  </dgm:styleLbl>
+  <dgm:styleLbl name="asst1">
+    <dgm:fillClrLst meth="repeat">
+      <a:schemeClr val="dk2"/>
+    </dgm:fillClrLst>
+    <dgm:linClrLst meth="repeat">
+      <a:schemeClr val="lt2"/>
+    </dgm:linClrLst>
+    <dgm:effectClrLst/>
+    <dgm:txLinClrLst/>
+    <dgm:txFillClrLst/>
+    <dgm:txEffectClrLst/>
+  </dgm:styleLbl>
+  <dgm:styleLbl name="asst2">
+    <dgm:fillClrLst meth="repeat">
+      <a:schemeClr val="dk2"/>
+    </dgm:fillClrLst>
+    <dgm:linClrLst meth="repeat">
+      <a:schemeClr val="lt2"/>
+    </dgm:linClrLst>
+    <dgm:effectClrLst/>
+    <dgm:txLinClrLst/>
+    <dgm:txFillClrLst/>
+    <dgm:txEffectClrLst/>
+  </dgm:styleLbl>
+  <dgm:styleLbl name="asst3">
+    <dgm:fillClrLst meth="repeat">
+      <a:schemeClr val="dk2"/>
+    </dgm:fillClrLst>
+    <dgm:linClrLst meth="repeat">
+      <a:schemeClr val="lt2"/>
+    </dgm:linClrLst>
+    <dgm:effectClrLst/>
+    <dgm:txLinClrLst/>
+    <dgm:txFillClrLst/>
+    <dgm:txEffectClrLst/>
+  </dgm:styleLbl>
+  <dgm:styleLbl name="asst4">
+    <dgm:fillClrLst meth="repeat">
+      <a:schemeClr val="dk2"/>
+    </dgm:fillClrLst>
+    <dgm:linClrLst meth="repeat">
+      <a:schemeClr val="lt2"/>
+    </dgm:linClrLst>
+    <dgm:effectClrLst/>
+    <dgm:txLinClrLst/>
+    <dgm:txFillClrLst/>
+    <dgm:txEffectClrLst/>
+  </dgm:styleLbl>
+  <dgm:styleLbl name="parChTrans2D1">
+    <dgm:fillClrLst meth="repeat">
+      <a:schemeClr val="dk2">
+        <a:tint val="60000"/>
+      </a:schemeClr>
+    </dgm:fillClrLst>
+    <dgm:linClrLst meth="repeat">
+      <a:schemeClr val="dk2">
+        <a:tint val="60000"/>
+      </a:schemeClr>
+    </dgm:linClrLst>
+    <dgm:effectClrLst/>
+    <dgm:txLinClrLst/>
+    <dgm:txFillClrLst meth="repeat">
+      <a:schemeClr val="lt2"/>
+    </dgm:txFillClrLst>
+    <dgm:txEffectClrLst/>
+  </dgm:styleLbl>
+  <dgm:styleLbl name="parChTrans2D2">
+    <dgm:fillClrLst meth="repeat">
+      <a:schemeClr val="dk2"/>
+    </dgm:fillClrLst>
+    <dgm:linClrLst meth="repeat">
+      <a:schemeClr val="dk2"/>
+    </dgm:linClrLst>
+    <dgm:effectClrLst/>
+    <dgm:txLinClrLst/>
+    <dgm:txFillClrLst meth="repeat">
+      <a:schemeClr val="lt2"/>
+    </dgm:txFillClrLst>
+    <dgm:txEffectClrLst/>
+  </dgm:styleLbl>
+  <dgm:styleLbl name="parChTrans2D3">
+    <dgm:fillClrLst meth="repeat">
+      <a:schemeClr val="dk2"/>
+    </dgm:fillClrLst>
+    <dgm:linClrLst meth="repeat">
+      <a:schemeClr val="dk2"/>
+    </dgm:linClrLst>
+    <dgm:effectClrLst/>
+    <dgm:txLinClrLst/>
+    <dgm:txFillClrLst meth="repeat">
+      <a:schemeClr val="lt2"/>
+    </dgm:txFillClrLst>
+    <dgm:txEffectClrLst/>
+  </dgm:styleLbl>
+  <dgm:styleLbl name="parChTrans2D4">
+    <dgm:fillClrLst meth="repeat">
+      <a:schemeClr val="dk2"/>
+    </dgm:fillClrLst>
+    <dgm:linClrLst meth="repeat">
+      <a:schemeClr val="dk2"/>
+    </dgm:linClrLst>
+    <dgm:effectClrLst/>
+    <dgm:txLinClrLst/>
+    <dgm:txFillClrLst meth="repeat">
+      <a:schemeClr val="lt2"/>
+    </dgm:txFillClrLst>
+    <dgm:txEffectClrLst/>
+  </dgm:styleLbl>
+  <dgm:styleLbl name="parChTrans1D1">
+    <dgm:fillClrLst meth="repeat">
+      <a:schemeClr val="dk2"/>
+    </dgm:fillClrLst>
+    <dgm:linClrLst meth="repeat">
+      <a:schemeClr val="dk2">
+        <a:shade val="60000"/>
+      </a:schemeClr>
+    </dgm:linClrLst>
+    <dgm:effectClrLst/>
+    <dgm:txLinClrLst/>
+    <dgm:txFillClrLst meth="repeat">
+      <a:schemeClr val="tx1"/>
+    </dgm:txFillClrLst>
+    <dgm:txEffectClrLst/>
+  </dgm:styleLbl>
+  <dgm:styleLbl name="parChTrans1D2">
+    <dgm:fillClrLst meth="repeat">
+      <a:schemeClr val="dk2"/>
+    </dgm:fillClrLst>
+    <dgm:linClrLst meth="repeat">
+      <a:schemeClr val="dk2">
+        <a:shade val="60000"/>
+      </a:schemeClr>
+    </dgm:linClrLst>
+    <dgm:effectClrLst/>
+    <dgm:txLinClrLst/>
+    <dgm:txFillClrLst meth="repeat">
+      <a:schemeClr val="tx1"/>
+    </dgm:txFillClrLst>
+    <dgm:txEffectClrLst/>
+  </dgm:styleLbl>
+  <dgm:styleLbl name="parChTrans1D3">
+    <dgm:fillClrLst meth="repeat">
+      <a:schemeClr val="dk2"/>
+    </dgm:fillClrLst>
+    <dgm:linClrLst meth="repeat">
+      <a:schemeClr val="dk2">
+        <a:shade val="80000"/>
+      </a:schemeClr>
+    </dgm:linClrLst>
+    <dgm:effectClrLst/>
+    <dgm:txLinClrLst/>
+    <dgm:txFillClrLst meth="repeat">
+      <a:schemeClr val="tx1"/>
+    </dgm:txFillClrLst>
+    <dgm:txEffectClrLst/>
+  </dgm:styleLbl>
+  <dgm:styleLbl name="parChTrans1D4">
+    <dgm:fillClrLst meth="repeat">
+      <a:schemeClr val="dk2"/>
+    </dgm:fillClrLst>
+    <dgm:linClrLst meth="repeat">
+      <a:schemeClr val="dk2">
+        <a:shade val="80000"/>
+      </a:schemeClr>
+    </dgm:linClrLst>
+    <dgm:effectClrLst/>
+    <dgm:txLinClrLst/>
+    <dgm:txFillClrLst meth="repeat">
+      <a:schemeClr val="tx1"/>
+    </dgm:txFillClrLst>
+    <dgm:txEffectClrLst/>
+  </dgm:styleLbl>
+  <dgm:styleLbl name="fgAcc1">
+    <dgm:fillClrLst meth="repeat">
+      <a:schemeClr val="lt2">
+        <a:alpha val="90000"/>
+      </a:schemeClr>
+    </dgm:fillClrLst>
+    <dgm:linClrLst meth="repeat">
+      <a:schemeClr val="dk2"/>
+    </dgm:linClrLst>
+    <dgm:effectClrLst/>
+    <dgm:txLinClrLst/>
+    <dgm:txFillClrLst meth="repeat">
+      <a:schemeClr val="dk1"/>
+    </dgm:txFillClrLst>
+    <dgm:txEffectClrLst/>
+  </dgm:styleLbl>
+  <dgm:styleLbl name="conFgAcc1">
+    <dgm:fillClrLst meth="repeat">
+      <a:schemeClr val="lt2">
+        <a:alpha val="90000"/>
+      </a:schemeClr>
+    </dgm:fillClrLst>
+    <dgm:linClrLst meth="repeat">
+      <a:schemeClr val="dk2"/>
+    </dgm:linClrLst>
+    <dgm:effectClrLst/>
+    <dgm:txLinClrLst/>
+    <dgm:txFillClrLst meth="repeat">
+      <a:schemeClr val="dk1"/>
+    </dgm:txFillClrLst>
+    <dgm:txEffectClrLst/>
+  </dgm:styleLbl>
+  <dgm:styleLbl name="alignAcc1">
+    <dgm:fillClrLst meth="repeat">
+      <a:schemeClr val="lt2">
+        <a:alpha val="90000"/>
+      </a:schemeClr>
+    </dgm:fillClrLst>
+    <dgm:linClrLst meth="repeat">
+      <a:schemeClr val="dk2"/>
+    </dgm:linClrLst>
+    <dgm:effectClrLst/>
+    <dgm:txLinClrLst/>
+    <dgm:txFillClrLst meth="repeat">
+      <a:schemeClr val="dk1"/>
+    </dgm:txFillClrLst>
+    <dgm:txEffectClrLst/>
+  </dgm:styleLbl>
+  <dgm:styleLbl name="trAlignAcc1">
+    <dgm:fillClrLst meth="repeat">
+      <a:schemeClr val="lt2">
+        <a:alpha val="40000"/>
+      </a:schemeClr>
+    </dgm:fillClrLst>
+    <dgm:linClrLst meth="repeat">
+      <a:schemeClr val="dk2"/>
+    </dgm:linClrLst>
+    <dgm:effectClrLst/>
+    <dgm:txLinClrLst/>
+    <dgm:txFillClrLst meth="repeat">
+      <a:schemeClr val="dk1"/>
+    </dgm:txFillClrLst>
+    <dgm:txEffectClrLst/>
+  </dgm:styleLbl>
+  <dgm:styleLbl name="bgAcc1">
+    <dgm:fillClrLst meth="repeat">
+      <a:schemeClr val="lt2">
+        <a:alpha val="90000"/>
+      </a:schemeClr>
+    </dgm:fillClrLst>
+    <dgm:linClrLst meth="repeat">
+      <a:schemeClr val="dk2"/>
+    </dgm:linClrLst>
+    <dgm:effectClrLst/>
+    <dgm:txLinClrLst/>
+    <dgm:txFillClrLst meth="repeat">
+      <a:schemeClr val="dk1"/>
+    </dgm:txFillClrLst>
+    <dgm:txEffectClrLst/>
+  </dgm:styleLbl>
+  <dgm:styleLbl name="solidFgAcc1">
+    <dgm:fillClrLst meth="repeat">
+      <a:schemeClr val="lt2"/>
+    </dgm:fillClrLst>
+    <dgm:linClrLst meth="repeat">
+      <a:schemeClr val="dk2"/>
+    </dgm:linClrLst>
+    <dgm:effectClrLst/>
+    <dgm:txLinClrLst/>
+    <dgm:txFillClrLst meth="repeat">
+      <a:schemeClr val="dk1"/>
+    </dgm:txFillClrLst>
+    <dgm:txEffectClrLst/>
+  </dgm:styleLbl>
+  <dgm:styleLbl name="solidAlignAcc1">
+    <dgm:fillClrLst meth="repeat">
+      <a:schemeClr val="lt2"/>
+    </dgm:fillClrLst>
+    <dgm:linClrLst meth="repeat">
+      <a:schemeClr val="dk2"/>
+    </dgm:linClrLst>
+    <dgm:effectClrLst/>
+    <dgm:txLinClrLst/>
+    <dgm:txFillClrLst meth="repeat">
+      <a:schemeClr val="dk1"/>
+    </dgm:txFillClrLst>
+    <dgm:txEffectClrLst/>
+  </dgm:styleLbl>
+  <dgm:styleLbl name="solidBgAcc1">
+    <dgm:fillClrLst meth="repeat">
+      <a:schemeClr val="lt2"/>
+    </dgm:fillClrLst>
+    <dgm:linClrLst meth="repeat">
+      <a:schemeClr val="dk2"/>
+    </dgm:linClrLst>
+    <dgm:effectClrLst/>
+    <dgm:txLinClrLst/>
+    <dgm:txFillClrLst meth="repeat">
+      <a:schemeClr val="dk1"/>
+    </dgm:txFillClrLst>
+    <dgm:txEffectClrLst/>
+  </dgm:styleLbl>
+  <dgm:styleLbl name="fgAccFollowNode1">
+    <dgm:fillClrLst meth="repeat">
+      <a:schemeClr val="dk2">
+        <a:alpha val="90000"/>
+        <a:tint val="40000"/>
+      </a:schemeClr>
+    </dgm:fillClrLst>
+    <dgm:linClrLst meth="repeat">
+      <a:schemeClr val="dk2">
+        <a:alpha val="90000"/>
+        <a:tint val="40000"/>
+      </a:schemeClr>
+    </dgm:linClrLst>
+    <dgm:effectClrLst/>
+    <dgm:txLinClrLst/>
+    <dgm:txFillClrLst meth="repeat">
+      <a:schemeClr val="dk1"/>
+    </dgm:txFillClrLst>
+    <dgm:txEffectClrLst/>
+  </dgm:styleLbl>
+  <dgm:styleLbl name="alignAccFollowNode1">
+    <dgm:fillClrLst meth="repeat">
+      <a:schemeClr val="dk2">
+        <a:alpha val="90000"/>
+        <a:tint val="40000"/>
+      </a:schemeClr>
+    </dgm:fillClrLst>
+    <dgm:linClrLst meth="repeat">
+      <a:schemeClr val="dk2">
+        <a:alpha val="90000"/>
+        <a:tint val="40000"/>
+      </a:schemeClr>
+    </dgm:linClrLst>
+    <dgm:effectClrLst/>
+    <dgm:txLinClrLst/>
+    <dgm:txFillClrLst meth="repeat">
+      <a:schemeClr val="dk1"/>
+    </dgm:txFillClrLst>
+    <dgm:txEffectClrLst/>
+  </dgm:styleLbl>
+  <dgm:styleLbl name="bgAccFollowNode1">
+    <dgm:fillClrLst meth="repeat">
+      <a:schemeClr val="dk2">
+        <a:alpha val="90000"/>
+        <a:tint val="40000"/>
+      </a:schemeClr>
+    </dgm:fillClrLst>
+    <dgm:linClrLst meth="repeat">
+      <a:schemeClr val="dk2">
+        <a:alpha val="90000"/>
+        <a:tint val="40000"/>
+      </a:schemeClr>
+    </dgm:linClrLst>
+    <dgm:effectClrLst/>
+    <dgm:txLinClrLst/>
+    <dgm:txFillClrLst meth="repeat">
+      <a:schemeClr val="dk1"/>
+    </dgm:txFillClrLst>
+    <dgm:txEffectClrLst/>
+  </dgm:styleLbl>
+  <dgm:styleLbl name="fgAcc0">
+    <dgm:fillClrLst meth="repeat">
+      <a:schemeClr val="lt2">
+        <a:alpha val="90000"/>
+      </a:schemeClr>
+    </dgm:fillClrLst>
+    <dgm:linClrLst meth="repeat">
+      <a:schemeClr val="dk2"/>
+    </dgm:linClrLst>
+    <dgm:effectClrLst/>
+    <dgm:txLinClrLst/>
+    <dgm:txFillClrLst meth="repeat">
+      <a:schemeClr val="dk1"/>
+    </dgm:txFillClrLst>
+    <dgm:txEffectClrLst/>
+  </dgm:styleLbl>
+  <dgm:styleLbl name="fgAcc2">
+    <dgm:fillClrLst meth="repeat">
+      <a:schemeClr val="lt2">
+        <a:alpha val="90000"/>
+      </a:schemeClr>
+    </dgm:fillClrLst>
+    <dgm:linClrLst meth="repeat">
+      <a:schemeClr val="dk2"/>
+    </dgm:linClrLst>
+    <dgm:effectClrLst/>
+    <dgm:txLinClrLst/>
+    <dgm:txFillClrLst meth="repeat">
+      <a:schemeClr val="dk1"/>
+    </dgm:txFillClrLst>
+    <dgm:txEffectClrLst/>
+  </dgm:styleLbl>
+  <dgm:styleLbl name="fgAcc3">
+    <dgm:fillClrLst meth="repeat">
+      <a:schemeClr val="lt2">
+        <a:alpha val="90000"/>
+      </a:schemeClr>
+    </dgm:fillClrLst>
+    <dgm:linClrLst meth="repeat">
+      <a:schemeClr val="dk2"/>
+    </dgm:linClrLst>
+    <dgm:effectClrLst/>
+    <dgm:txLinClrLst/>
+    <dgm:txFillClrLst meth="repeat">
+      <a:schemeClr val="dk1"/>
+    </dgm:txFillClrLst>
+    <dgm:txEffectClrLst/>
+  </dgm:styleLbl>
+  <dgm:styleLbl name="fgAcc4">
+    <dgm:fillClrLst meth="repeat">
+      <a:schemeClr val="lt2">
+        <a:alpha val="90000"/>
+      </a:schemeClr>
+    </dgm:fillClrLst>
+    <dgm:linClrLst meth="repeat">
+      <a:schemeClr val="dk2"/>
+    </dgm:linClrLst>
+    <dgm:effectClrLst/>
+    <dgm:txLinClrLst/>
+    <dgm:txFillClrLst meth="repeat">
+      <a:schemeClr val="dk1"/>
+    </dgm:txFillClrLst>
+    <dgm:txEffectClrLst/>
+  </dgm:styleLbl>
+  <dgm:styleLbl name="bgShp">
+    <dgm:fillClrLst meth="repeat">
+      <a:schemeClr val="dk2">
+        <a:tint val="40000"/>
+      </a:schemeClr>
+    </dgm:fillClrLst>
+    <dgm:linClrLst meth="repeat">
+      <a:schemeClr val="dk2"/>
+    </dgm:linClrLst>
+    <dgm:effectClrLst/>
+    <dgm:txLinClrLst/>
+    <dgm:txFillClrLst meth="repeat">
+      <a:schemeClr val="dk1"/>
+    </dgm:txFillClrLst>
+    <dgm:txEffectClrLst/>
+  </dgm:styleLbl>
+  <dgm:styleLbl name="dkBgShp">
+    <dgm:fillClrLst meth="repeat">
+      <a:schemeClr val="dk2">
+        <a:shade val="80000"/>
+      </a:schemeClr>
+    </dgm:fillClrLst>
+    <dgm:linClrLst meth="repeat">
+      <a:schemeClr val="dk2"/>
+    </dgm:linClrLst>
+    <dgm:effectClrLst/>
+    <dgm:txLinClrLst/>
+    <dgm:txFillClrLst meth="repeat">
+      <a:schemeClr val="lt1"/>
+    </dgm:txFillClrLst>
+    <dgm:txEffectClrLst/>
+  </dgm:styleLbl>
+  <dgm:styleLbl name="trBgShp">
+    <dgm:fillClrLst meth="repeat">
+      <a:schemeClr val="dk2">
+        <a:tint val="50000"/>
+        <a:alpha val="40000"/>
+      </a:schemeClr>
+    </dgm:fillClrLst>
+    <dgm:linClrLst meth="repeat">
+      <a:schemeClr val="dk2"/>
+    </dgm:linClrLst>
+    <dgm:effectClrLst/>
+    <dgm:txLinClrLst/>
+    <dgm:txFillClrLst meth="repeat">
+      <a:schemeClr val="lt1"/>
+    </dgm:txFillClrLst>
+    <dgm:txEffectClrLst/>
+  </dgm:styleLbl>
+  <dgm:styleLbl name="fgShp">
+    <dgm:fillClrLst meth="repeat">
+      <a:schemeClr val="dk2">
+        <a:tint val="60000"/>
+      </a:schemeClr>
+    </dgm:fillClrLst>
+    <dgm:linClrLst meth="repeat">
+      <a:schemeClr val="lt2"/>
+    </dgm:linClrLst>
+    <dgm:effectClrLst/>
+    <dgm:txLinClrLst/>
+    <dgm:txFillClrLst meth="repeat">
+      <a:schemeClr val="dk1"/>
+    </dgm:txFillClrLst>
+    <dgm:txEffectClrLst/>
+  </dgm:styleLbl>
+  <dgm:styleLbl name="revTx">
+    <dgm:fillClrLst meth="repeat">
+      <a:schemeClr val="lt2">
+        <a:alpha val="0"/>
+      </a:schemeClr>
+    </dgm:fillClrLst>
+    <dgm:linClrLst meth="repeat">
+      <a:schemeClr val="dk1">
+        <a:alpha val="0"/>
+      </a:schemeClr>
+    </dgm:linClrLst>
+    <dgm:effectClrLst/>
+    <dgm:txLinClrLst/>
+    <dgm:txFillClrLst meth="repeat">
+      <a:schemeClr val="tx1"/>
+    </dgm:txFillClrLst>
+    <dgm:txEffectClrLst/>
+  </dgm:styleLbl>
+</dgm:colorsDef>
+</file>
+
+<file path=ppt/diagrams/data1.xml><?xml version="1.0" encoding="utf-8"?>
+<dgm:dataModel xmlns:dgm="http://schemas.openxmlformats.org/drawingml/2006/diagram" xmlns:a="http://schemas.openxmlformats.org/drawingml/2006/main">
+  <dgm:ptLst>
+    <dgm:pt modelId="{9D9C734E-1A49-446D-BD9C-252CBFBACAC9}" type="doc">
+      <dgm:prSet loTypeId="urn:microsoft.com/office/officeart/2005/8/layout/hProcess9" loCatId="process" qsTypeId="urn:microsoft.com/office/officeart/2005/8/quickstyle/simple1" qsCatId="simple" csTypeId="urn:microsoft.com/office/officeart/2005/8/colors/accent0_3" csCatId="mainScheme" phldr="1"/>
+      <dgm:spPr/>
+      <dgm:t>
+        <a:bodyPr/>
+        <a:lstStyle/>
+        <a:p>
+          <a:endParaRPr lang="en-IN"/>
+        </a:p>
+      </dgm:t>
+    </dgm:pt>
+    <dgm:pt modelId="{8FCFE4E0-F262-477D-A2C2-AF2609CE5163}">
+      <dgm:prSet/>
+      <dgm:spPr/>
+      <dgm:t>
+        <a:bodyPr/>
+        <a:lstStyle/>
+        <a:p>
+          <a:r>
+            <a:rPr lang="en-IN"/>
+            <a:t>Decided project</a:t>
+          </a:r>
+        </a:p>
+      </dgm:t>
+    </dgm:pt>
+    <dgm:pt modelId="{E4997A0E-A931-4401-81CC-5DA4DF99421F}" type="parTrans" cxnId="{331FBCCE-3994-431D-A814-EAE445547A87}">
+      <dgm:prSet/>
+      <dgm:spPr/>
+      <dgm:t>
+        <a:bodyPr/>
+        <a:lstStyle/>
+        <a:p>
+          <a:endParaRPr lang="en-IN"/>
+        </a:p>
+      </dgm:t>
+    </dgm:pt>
+    <dgm:pt modelId="{AD482059-F522-4765-8DB0-70415E1F6E61}" type="sibTrans" cxnId="{331FBCCE-3994-431D-A814-EAE445547A87}">
+      <dgm:prSet/>
+      <dgm:spPr/>
+      <dgm:t>
+        <a:bodyPr/>
+        <a:lstStyle/>
+        <a:p>
+          <a:endParaRPr lang="en-IN"/>
+        </a:p>
+      </dgm:t>
+    </dgm:pt>
+    <dgm:pt modelId="{A566269E-6E64-4F97-A10C-F33B2AB1A175}">
+      <dgm:prSet/>
+      <dgm:spPr/>
+      <dgm:t>
+        <a:bodyPr/>
+        <a:lstStyle/>
+        <a:p>
+          <a:r>
+            <a:rPr lang="en-IN" dirty="0"/>
+            <a:t>Studied about editor and NCURSES library.</a:t>
+          </a:r>
+        </a:p>
+      </dgm:t>
+    </dgm:pt>
+    <dgm:pt modelId="{B0AB6841-D20E-44F5-9C55-BCD13376CB26}" type="parTrans" cxnId="{C9ECAF7A-1CAB-4C96-B5F1-E7E6899013D2}">
+      <dgm:prSet/>
+      <dgm:spPr/>
+      <dgm:t>
+        <a:bodyPr/>
+        <a:lstStyle/>
+        <a:p>
+          <a:endParaRPr lang="en-IN"/>
+        </a:p>
+      </dgm:t>
+    </dgm:pt>
+    <dgm:pt modelId="{09AB2802-A491-4869-BF18-5F3931B05B66}" type="sibTrans" cxnId="{C9ECAF7A-1CAB-4C96-B5F1-E7E6899013D2}">
+      <dgm:prSet/>
+      <dgm:spPr/>
+      <dgm:t>
+        <a:bodyPr/>
+        <a:lstStyle/>
+        <a:p>
+          <a:endParaRPr lang="en-IN"/>
+        </a:p>
+      </dgm:t>
+    </dgm:pt>
+    <dgm:pt modelId="{A094165E-97FF-4EAD-8971-06D5B7DEFD6D}">
+      <dgm:prSet/>
+      <dgm:spPr/>
+      <dgm:t>
+        <a:bodyPr/>
+        <a:lstStyle/>
+        <a:p>
+          <a:r>
+            <a:rPr lang="en-IN"/>
+            <a:t>Created Structure of buffer</a:t>
+          </a:r>
+        </a:p>
+      </dgm:t>
+    </dgm:pt>
+    <dgm:pt modelId="{6F707A94-B648-45EF-AD77-B8A9D77C818A}" type="parTrans" cxnId="{D4E324BA-FE48-45CA-A55B-B8ABA86587FA}">
+      <dgm:prSet/>
+      <dgm:spPr/>
+      <dgm:t>
+        <a:bodyPr/>
+        <a:lstStyle/>
+        <a:p>
+          <a:endParaRPr lang="en-IN"/>
+        </a:p>
+      </dgm:t>
+    </dgm:pt>
+    <dgm:pt modelId="{FDE8DA41-A12C-4EC2-9811-4BA8D3BDF603}" type="sibTrans" cxnId="{D4E324BA-FE48-45CA-A55B-B8ABA86587FA}">
+      <dgm:prSet/>
+      <dgm:spPr/>
+      <dgm:t>
+        <a:bodyPr/>
+        <a:lstStyle/>
+        <a:p>
+          <a:endParaRPr lang="en-IN"/>
+        </a:p>
+      </dgm:t>
+    </dgm:pt>
+    <dgm:pt modelId="{87D6482E-C74D-4BCD-B766-5582D11D7DA9}">
+      <dgm:prSet/>
+      <dgm:spPr/>
+      <dgm:t>
+        <a:bodyPr/>
+        <a:lstStyle/>
+        <a:p>
+          <a:r>
+            <a:rPr lang="en-IN"/>
+            <a:t>Implemented basic functions of buffer</a:t>
+          </a:r>
+        </a:p>
+      </dgm:t>
+    </dgm:pt>
+    <dgm:pt modelId="{54A2DE72-C8AB-4F15-837C-63DAC8C1251B}" type="parTrans" cxnId="{1DA4B03F-3927-4887-B282-9F9A35FC2179}">
+      <dgm:prSet/>
+      <dgm:spPr/>
+      <dgm:t>
+        <a:bodyPr/>
+        <a:lstStyle/>
+        <a:p>
+          <a:endParaRPr lang="en-IN"/>
+        </a:p>
+      </dgm:t>
+    </dgm:pt>
+    <dgm:pt modelId="{D4116930-4AAF-4567-BDD2-6A9F05C3B885}" type="sibTrans" cxnId="{1DA4B03F-3927-4887-B282-9F9A35FC2179}">
+      <dgm:prSet/>
+      <dgm:spPr/>
+      <dgm:t>
+        <a:bodyPr/>
+        <a:lstStyle/>
+        <a:p>
+          <a:endParaRPr lang="en-IN"/>
+        </a:p>
+      </dgm:t>
+    </dgm:pt>
+    <dgm:pt modelId="{CFB44720-7FBB-4244-9697-BAB520A3D173}">
+      <dgm:prSet/>
+      <dgm:spPr/>
+      <dgm:t>
+        <a:bodyPr/>
+        <a:lstStyle/>
+        <a:p>
+          <a:r>
+            <a:rPr lang="en-IN"/>
+            <a:t>Implemented UI using NCURSES</a:t>
+          </a:r>
+        </a:p>
+      </dgm:t>
+    </dgm:pt>
+    <dgm:pt modelId="{38ADE678-BF0D-4947-98BA-ECDD1ED2B0CB}" type="parTrans" cxnId="{A63331DB-139D-47F6-8CAC-9486C3F10C84}">
+      <dgm:prSet/>
+      <dgm:spPr/>
+      <dgm:t>
+        <a:bodyPr/>
+        <a:lstStyle/>
+        <a:p>
+          <a:endParaRPr lang="en-IN"/>
+        </a:p>
+      </dgm:t>
+    </dgm:pt>
+    <dgm:pt modelId="{5362A5B5-7535-4B0B-B4A8-C721C694B8AE}" type="sibTrans" cxnId="{A63331DB-139D-47F6-8CAC-9486C3F10C84}">
+      <dgm:prSet/>
+      <dgm:spPr/>
+      <dgm:t>
+        <a:bodyPr/>
+        <a:lstStyle/>
+        <a:p>
+          <a:endParaRPr lang="en-IN"/>
+        </a:p>
+      </dgm:t>
+    </dgm:pt>
+    <dgm:pt modelId="{430843C5-2688-4F69-80AB-C902729F86B1}">
+      <dgm:prSet/>
+      <dgm:spPr/>
+      <dgm:t>
+        <a:bodyPr/>
+        <a:lstStyle/>
+        <a:p>
+          <a:r>
+            <a:rPr lang="en-IN"/>
+            <a:t>Added functionalities like as a basic editor</a:t>
+          </a:r>
+        </a:p>
+      </dgm:t>
+    </dgm:pt>
+    <dgm:pt modelId="{824A7244-72FF-4902-8877-0903D8637885}" type="parTrans" cxnId="{E155DB53-93B9-4D46-A015-5520BE91E1B5}">
+      <dgm:prSet/>
+      <dgm:spPr/>
+      <dgm:t>
+        <a:bodyPr/>
+        <a:lstStyle/>
+        <a:p>
+          <a:endParaRPr lang="en-IN"/>
+        </a:p>
+      </dgm:t>
+    </dgm:pt>
+    <dgm:pt modelId="{4482EBF8-2BB9-404D-9FAE-03F003B92A2A}" type="sibTrans" cxnId="{E155DB53-93B9-4D46-A015-5520BE91E1B5}">
+      <dgm:prSet/>
+      <dgm:spPr/>
+      <dgm:t>
+        <a:bodyPr/>
+        <a:lstStyle/>
+        <a:p>
+          <a:endParaRPr lang="en-IN"/>
+        </a:p>
+      </dgm:t>
+    </dgm:pt>
+    <dgm:pt modelId="{7AC83FF1-173D-4211-A968-5ED5F698C27F}">
+      <dgm:prSet/>
+      <dgm:spPr/>
+      <dgm:t>
+        <a:bodyPr/>
+        <a:lstStyle/>
+        <a:p>
+          <a:r>
+            <a:rPr lang="en-IN"/>
+            <a:t>Added more Advanced functionalities. </a:t>
+          </a:r>
+        </a:p>
+      </dgm:t>
+    </dgm:pt>
+    <dgm:pt modelId="{A419524B-0A39-4A63-8983-3C5EBE05EF2A}" type="parTrans" cxnId="{8AB4F6E8-039C-4EB0-9AEA-EA0E4AF332DD}">
+      <dgm:prSet/>
+      <dgm:spPr/>
+      <dgm:t>
+        <a:bodyPr/>
+        <a:lstStyle/>
+        <a:p>
+          <a:endParaRPr lang="en-IN"/>
+        </a:p>
+      </dgm:t>
+    </dgm:pt>
+    <dgm:pt modelId="{5310F6FC-44D8-4CAD-A59D-539501ABF096}" type="sibTrans" cxnId="{8AB4F6E8-039C-4EB0-9AEA-EA0E4AF332DD}">
+      <dgm:prSet/>
+      <dgm:spPr/>
+      <dgm:t>
+        <a:bodyPr/>
+        <a:lstStyle/>
+        <a:p>
+          <a:endParaRPr lang="en-IN"/>
+        </a:p>
+      </dgm:t>
+    </dgm:pt>
+    <dgm:pt modelId="{DA6AA271-D66C-4A36-BFE6-D80195EA4A1E}" type="pres">
+      <dgm:prSet presAssocID="{9D9C734E-1A49-446D-BD9C-252CBFBACAC9}" presName="CompostProcess" presStyleCnt="0">
+        <dgm:presLayoutVars>
+          <dgm:dir/>
+          <dgm:resizeHandles val="exact"/>
+        </dgm:presLayoutVars>
+      </dgm:prSet>
+      <dgm:spPr/>
+    </dgm:pt>
+    <dgm:pt modelId="{F3F47C30-2FA9-4E53-AAC8-CC4BFE4671E1}" type="pres">
+      <dgm:prSet presAssocID="{9D9C734E-1A49-446D-BD9C-252CBFBACAC9}" presName="arrow" presStyleLbl="bgShp" presStyleIdx="0" presStyleCnt="1"/>
+      <dgm:spPr/>
+    </dgm:pt>
+    <dgm:pt modelId="{A1629A0E-0EC5-4936-8431-EBC33A1CA495}" type="pres">
+      <dgm:prSet presAssocID="{9D9C734E-1A49-446D-BD9C-252CBFBACAC9}" presName="linearProcess" presStyleCnt="0"/>
+      <dgm:spPr/>
+    </dgm:pt>
+    <dgm:pt modelId="{8352C1E8-2172-48E5-B427-1A0E8A3AC4B5}" type="pres">
+      <dgm:prSet presAssocID="{8FCFE4E0-F262-477D-A2C2-AF2609CE5163}" presName="textNode" presStyleLbl="node1" presStyleIdx="0" presStyleCnt="7">
+        <dgm:presLayoutVars>
+          <dgm:bulletEnabled val="1"/>
+        </dgm:presLayoutVars>
+      </dgm:prSet>
+      <dgm:spPr/>
+    </dgm:pt>
+    <dgm:pt modelId="{2D096FCE-3901-42FF-9D4B-273F7A31349A}" type="pres">
+      <dgm:prSet presAssocID="{AD482059-F522-4765-8DB0-70415E1F6E61}" presName="sibTrans" presStyleCnt="0"/>
+      <dgm:spPr/>
+    </dgm:pt>
+    <dgm:pt modelId="{F996BF07-F1A1-4C0A-80B3-911958DDE9E6}" type="pres">
+      <dgm:prSet presAssocID="{A566269E-6E64-4F97-A10C-F33B2AB1A175}" presName="textNode" presStyleLbl="node1" presStyleIdx="1" presStyleCnt="7">
+        <dgm:presLayoutVars>
+          <dgm:bulletEnabled val="1"/>
+        </dgm:presLayoutVars>
+      </dgm:prSet>
+      <dgm:spPr/>
+    </dgm:pt>
+    <dgm:pt modelId="{DA0F86EB-5174-4F93-9400-B7448D759C03}" type="pres">
+      <dgm:prSet presAssocID="{09AB2802-A491-4869-BF18-5F3931B05B66}" presName="sibTrans" presStyleCnt="0"/>
+      <dgm:spPr/>
+    </dgm:pt>
+    <dgm:pt modelId="{29ABCCA4-89D5-4B40-8882-DEB758F4AD08}" type="pres">
+      <dgm:prSet presAssocID="{A094165E-97FF-4EAD-8971-06D5B7DEFD6D}" presName="textNode" presStyleLbl="node1" presStyleIdx="2" presStyleCnt="7">
+        <dgm:presLayoutVars>
+          <dgm:bulletEnabled val="1"/>
+        </dgm:presLayoutVars>
+      </dgm:prSet>
+      <dgm:spPr/>
+    </dgm:pt>
+    <dgm:pt modelId="{898D6D0F-35DE-46BD-AD98-5691D8C316A0}" type="pres">
+      <dgm:prSet presAssocID="{FDE8DA41-A12C-4EC2-9811-4BA8D3BDF603}" presName="sibTrans" presStyleCnt="0"/>
+      <dgm:spPr/>
+    </dgm:pt>
+    <dgm:pt modelId="{416FD297-47A1-40F4-8001-0554B7F4A48A}" type="pres">
+      <dgm:prSet presAssocID="{87D6482E-C74D-4BCD-B766-5582D11D7DA9}" presName="textNode" presStyleLbl="node1" presStyleIdx="3" presStyleCnt="7">
+        <dgm:presLayoutVars>
+          <dgm:bulletEnabled val="1"/>
+        </dgm:presLayoutVars>
+      </dgm:prSet>
+      <dgm:spPr/>
+    </dgm:pt>
+    <dgm:pt modelId="{E51E3EA6-D90A-4642-9A60-E280CFB60F16}" type="pres">
+      <dgm:prSet presAssocID="{D4116930-4AAF-4567-BDD2-6A9F05C3B885}" presName="sibTrans" presStyleCnt="0"/>
+      <dgm:spPr/>
+    </dgm:pt>
+    <dgm:pt modelId="{10D74E59-C7ED-4F40-BFAA-DEDE6B19FB60}" type="pres">
+      <dgm:prSet presAssocID="{CFB44720-7FBB-4244-9697-BAB520A3D173}" presName="textNode" presStyleLbl="node1" presStyleIdx="4" presStyleCnt="7">
+        <dgm:presLayoutVars>
+          <dgm:bulletEnabled val="1"/>
+        </dgm:presLayoutVars>
+      </dgm:prSet>
+      <dgm:spPr/>
+    </dgm:pt>
+    <dgm:pt modelId="{403E0ABC-3111-4CDB-8B07-B24BA999DF9A}" type="pres">
+      <dgm:prSet presAssocID="{5362A5B5-7535-4B0B-B4A8-C721C694B8AE}" presName="sibTrans" presStyleCnt="0"/>
+      <dgm:spPr/>
+    </dgm:pt>
+    <dgm:pt modelId="{939740D5-786F-4036-A509-50A0359D9FCD}" type="pres">
+      <dgm:prSet presAssocID="{430843C5-2688-4F69-80AB-C902729F86B1}" presName="textNode" presStyleLbl="node1" presStyleIdx="5" presStyleCnt="7">
+        <dgm:presLayoutVars>
+          <dgm:bulletEnabled val="1"/>
+        </dgm:presLayoutVars>
+      </dgm:prSet>
+      <dgm:spPr/>
+    </dgm:pt>
+    <dgm:pt modelId="{707303D6-70F3-4A90-8B38-C07EF9BF0DC0}" type="pres">
+      <dgm:prSet presAssocID="{4482EBF8-2BB9-404D-9FAE-03F003B92A2A}" presName="sibTrans" presStyleCnt="0"/>
+      <dgm:spPr/>
+    </dgm:pt>
+    <dgm:pt modelId="{4DDB096F-512F-4475-9322-30A79DF2AB69}" type="pres">
+      <dgm:prSet presAssocID="{7AC83FF1-173D-4211-A968-5ED5F698C27F}" presName="textNode" presStyleLbl="node1" presStyleIdx="6" presStyleCnt="7">
+        <dgm:presLayoutVars>
+          <dgm:bulletEnabled val="1"/>
+        </dgm:presLayoutVars>
+      </dgm:prSet>
+      <dgm:spPr/>
+    </dgm:pt>
+  </dgm:ptLst>
+  <dgm:cxnLst>
+    <dgm:cxn modelId="{D29D0F09-0BE7-484E-B385-3206AE034D3B}" type="presOf" srcId="{87D6482E-C74D-4BCD-B766-5582D11D7DA9}" destId="{416FD297-47A1-40F4-8001-0554B7F4A48A}" srcOrd="0" destOrd="0" presId="urn:microsoft.com/office/officeart/2005/8/layout/hProcess9"/>
+    <dgm:cxn modelId="{1DA4B03F-3927-4887-B282-9F9A35FC2179}" srcId="{9D9C734E-1A49-446D-BD9C-252CBFBACAC9}" destId="{87D6482E-C74D-4BCD-B766-5582D11D7DA9}" srcOrd="3" destOrd="0" parTransId="{54A2DE72-C8AB-4F15-837C-63DAC8C1251B}" sibTransId="{D4116930-4AAF-4567-BDD2-6A9F05C3B885}"/>
+    <dgm:cxn modelId="{E155DB53-93B9-4D46-A015-5520BE91E1B5}" srcId="{9D9C734E-1A49-446D-BD9C-252CBFBACAC9}" destId="{430843C5-2688-4F69-80AB-C902729F86B1}" srcOrd="5" destOrd="0" parTransId="{824A7244-72FF-4902-8877-0903D8637885}" sibTransId="{4482EBF8-2BB9-404D-9FAE-03F003B92A2A}"/>
+    <dgm:cxn modelId="{C2862957-A457-48E9-ACB5-215C4901E570}" type="presOf" srcId="{9D9C734E-1A49-446D-BD9C-252CBFBACAC9}" destId="{DA6AA271-D66C-4A36-BFE6-D80195EA4A1E}" srcOrd="0" destOrd="0" presId="urn:microsoft.com/office/officeart/2005/8/layout/hProcess9"/>
+    <dgm:cxn modelId="{C9ECAF7A-1CAB-4C96-B5F1-E7E6899013D2}" srcId="{9D9C734E-1A49-446D-BD9C-252CBFBACAC9}" destId="{A566269E-6E64-4F97-A10C-F33B2AB1A175}" srcOrd="1" destOrd="0" parTransId="{B0AB6841-D20E-44F5-9C55-BCD13376CB26}" sibTransId="{09AB2802-A491-4869-BF18-5F3931B05B66}"/>
+    <dgm:cxn modelId="{1622418E-BA5E-4347-A715-17331E16CF38}" type="presOf" srcId="{CFB44720-7FBB-4244-9697-BAB520A3D173}" destId="{10D74E59-C7ED-4F40-BFAA-DEDE6B19FB60}" srcOrd="0" destOrd="0" presId="urn:microsoft.com/office/officeart/2005/8/layout/hProcess9"/>
+    <dgm:cxn modelId="{E4776F90-6195-47FD-A939-7801A8C6C426}" type="presOf" srcId="{A094165E-97FF-4EAD-8971-06D5B7DEFD6D}" destId="{29ABCCA4-89D5-4B40-8882-DEB758F4AD08}" srcOrd="0" destOrd="0" presId="urn:microsoft.com/office/officeart/2005/8/layout/hProcess9"/>
+    <dgm:cxn modelId="{0FFBD393-862C-420C-B877-D868D76BF484}" type="presOf" srcId="{A566269E-6E64-4F97-A10C-F33B2AB1A175}" destId="{F996BF07-F1A1-4C0A-80B3-911958DDE9E6}" srcOrd="0" destOrd="0" presId="urn:microsoft.com/office/officeart/2005/8/layout/hProcess9"/>
+    <dgm:cxn modelId="{2E4737B3-E451-42FE-8F84-44DA90ECDD09}" type="presOf" srcId="{8FCFE4E0-F262-477D-A2C2-AF2609CE5163}" destId="{8352C1E8-2172-48E5-B427-1A0E8A3AC4B5}" srcOrd="0" destOrd="0" presId="urn:microsoft.com/office/officeart/2005/8/layout/hProcess9"/>
+    <dgm:cxn modelId="{D4E324BA-FE48-45CA-A55B-B8ABA86587FA}" srcId="{9D9C734E-1A49-446D-BD9C-252CBFBACAC9}" destId="{A094165E-97FF-4EAD-8971-06D5B7DEFD6D}" srcOrd="2" destOrd="0" parTransId="{6F707A94-B648-45EF-AD77-B8A9D77C818A}" sibTransId="{FDE8DA41-A12C-4EC2-9811-4BA8D3BDF603}"/>
+    <dgm:cxn modelId="{331FBCCE-3994-431D-A814-EAE445547A87}" srcId="{9D9C734E-1A49-446D-BD9C-252CBFBACAC9}" destId="{8FCFE4E0-F262-477D-A2C2-AF2609CE5163}" srcOrd="0" destOrd="0" parTransId="{E4997A0E-A931-4401-81CC-5DA4DF99421F}" sibTransId="{AD482059-F522-4765-8DB0-70415E1F6E61}"/>
+    <dgm:cxn modelId="{3F0C94DA-E9C2-4FAE-A006-2583CFDEB126}" type="presOf" srcId="{7AC83FF1-173D-4211-A968-5ED5F698C27F}" destId="{4DDB096F-512F-4475-9322-30A79DF2AB69}" srcOrd="0" destOrd="0" presId="urn:microsoft.com/office/officeart/2005/8/layout/hProcess9"/>
+    <dgm:cxn modelId="{A63331DB-139D-47F6-8CAC-9486C3F10C84}" srcId="{9D9C734E-1A49-446D-BD9C-252CBFBACAC9}" destId="{CFB44720-7FBB-4244-9697-BAB520A3D173}" srcOrd="4" destOrd="0" parTransId="{38ADE678-BF0D-4947-98BA-ECDD1ED2B0CB}" sibTransId="{5362A5B5-7535-4B0B-B4A8-C721C694B8AE}"/>
+    <dgm:cxn modelId="{8AB4F6E8-039C-4EB0-9AEA-EA0E4AF332DD}" srcId="{9D9C734E-1A49-446D-BD9C-252CBFBACAC9}" destId="{7AC83FF1-173D-4211-A968-5ED5F698C27F}" srcOrd="6" destOrd="0" parTransId="{A419524B-0A39-4A63-8983-3C5EBE05EF2A}" sibTransId="{5310F6FC-44D8-4CAD-A59D-539501ABF096}"/>
+    <dgm:cxn modelId="{92CDB2F0-7EBE-4532-9A32-400FCC440180}" type="presOf" srcId="{430843C5-2688-4F69-80AB-C902729F86B1}" destId="{939740D5-786F-4036-A509-50A0359D9FCD}" srcOrd="0" destOrd="0" presId="urn:microsoft.com/office/officeart/2005/8/layout/hProcess9"/>
+    <dgm:cxn modelId="{7C3A1F2A-A522-4AFD-B29A-34D824DA37A5}" type="presParOf" srcId="{DA6AA271-D66C-4A36-BFE6-D80195EA4A1E}" destId="{F3F47C30-2FA9-4E53-AAC8-CC4BFE4671E1}" srcOrd="0" destOrd="0" presId="urn:microsoft.com/office/officeart/2005/8/layout/hProcess9"/>
+    <dgm:cxn modelId="{13607CE4-A407-492F-887B-09B2439B7260}" type="presParOf" srcId="{DA6AA271-D66C-4A36-BFE6-D80195EA4A1E}" destId="{A1629A0E-0EC5-4936-8431-EBC33A1CA495}" srcOrd="1" destOrd="0" presId="urn:microsoft.com/office/officeart/2005/8/layout/hProcess9"/>
+    <dgm:cxn modelId="{C06987CA-273E-4E23-8169-C02B9C9356EE}" type="presParOf" srcId="{A1629A0E-0EC5-4936-8431-EBC33A1CA495}" destId="{8352C1E8-2172-48E5-B427-1A0E8A3AC4B5}" srcOrd="0" destOrd="0" presId="urn:microsoft.com/office/officeart/2005/8/layout/hProcess9"/>
+    <dgm:cxn modelId="{93BB0E36-F19B-4DDD-B12E-3E8C8C4C0BAD}" type="presParOf" srcId="{A1629A0E-0EC5-4936-8431-EBC33A1CA495}" destId="{2D096FCE-3901-42FF-9D4B-273F7A31349A}" srcOrd="1" destOrd="0" presId="urn:microsoft.com/office/officeart/2005/8/layout/hProcess9"/>
+    <dgm:cxn modelId="{77DB00BB-8F35-42CA-820F-9E893174F7E2}" type="presParOf" srcId="{A1629A0E-0EC5-4936-8431-EBC33A1CA495}" destId="{F996BF07-F1A1-4C0A-80B3-911958DDE9E6}" srcOrd="2" destOrd="0" presId="urn:microsoft.com/office/officeart/2005/8/layout/hProcess9"/>
+    <dgm:cxn modelId="{245DE118-53D8-4249-88B7-E4AFB39313A7}" type="presParOf" srcId="{A1629A0E-0EC5-4936-8431-EBC33A1CA495}" destId="{DA0F86EB-5174-4F93-9400-B7448D759C03}" srcOrd="3" destOrd="0" presId="urn:microsoft.com/office/officeart/2005/8/layout/hProcess9"/>
+    <dgm:cxn modelId="{4FDFD505-4C89-430F-AA99-886DCAAF6592}" type="presParOf" srcId="{A1629A0E-0EC5-4936-8431-EBC33A1CA495}" destId="{29ABCCA4-89D5-4B40-8882-DEB758F4AD08}" srcOrd="4" destOrd="0" presId="urn:microsoft.com/office/officeart/2005/8/layout/hProcess9"/>
+    <dgm:cxn modelId="{6E3C4B90-A7A0-47AE-B225-D3006EE58C30}" type="presParOf" srcId="{A1629A0E-0EC5-4936-8431-EBC33A1CA495}" destId="{898D6D0F-35DE-46BD-AD98-5691D8C316A0}" srcOrd="5" destOrd="0" presId="urn:microsoft.com/office/officeart/2005/8/layout/hProcess9"/>
+    <dgm:cxn modelId="{0EE8865F-D2BE-411B-8445-64F9D4FEB3A6}" type="presParOf" srcId="{A1629A0E-0EC5-4936-8431-EBC33A1CA495}" destId="{416FD297-47A1-40F4-8001-0554B7F4A48A}" srcOrd="6" destOrd="0" presId="urn:microsoft.com/office/officeart/2005/8/layout/hProcess9"/>
+    <dgm:cxn modelId="{4017430B-78CA-49D9-B5B1-C205CA356DF2}" type="presParOf" srcId="{A1629A0E-0EC5-4936-8431-EBC33A1CA495}" destId="{E51E3EA6-D90A-4642-9A60-E280CFB60F16}" srcOrd="7" destOrd="0" presId="urn:microsoft.com/office/officeart/2005/8/layout/hProcess9"/>
+    <dgm:cxn modelId="{035701ED-5CAE-42B6-AC45-09948ED5D8CF}" type="presParOf" srcId="{A1629A0E-0EC5-4936-8431-EBC33A1CA495}" destId="{10D74E59-C7ED-4F40-BFAA-DEDE6B19FB60}" srcOrd="8" destOrd="0" presId="urn:microsoft.com/office/officeart/2005/8/layout/hProcess9"/>
+    <dgm:cxn modelId="{FA73A475-3784-424A-B688-6B1C3858B568}" type="presParOf" srcId="{A1629A0E-0EC5-4936-8431-EBC33A1CA495}" destId="{403E0ABC-3111-4CDB-8B07-B24BA999DF9A}" srcOrd="9" destOrd="0" presId="urn:microsoft.com/office/officeart/2005/8/layout/hProcess9"/>
+    <dgm:cxn modelId="{3D6DF3FE-DB7F-4FC7-B92D-5714DA3268F2}" type="presParOf" srcId="{A1629A0E-0EC5-4936-8431-EBC33A1CA495}" destId="{939740D5-786F-4036-A509-50A0359D9FCD}" srcOrd="10" destOrd="0" presId="urn:microsoft.com/office/officeart/2005/8/layout/hProcess9"/>
+    <dgm:cxn modelId="{74036470-0F77-42CE-83EC-4899D2FE14F5}" type="presParOf" srcId="{A1629A0E-0EC5-4936-8431-EBC33A1CA495}" destId="{707303D6-70F3-4A90-8B38-C07EF9BF0DC0}" srcOrd="11" destOrd="0" presId="urn:microsoft.com/office/officeart/2005/8/layout/hProcess9"/>
+    <dgm:cxn modelId="{3E80F7CB-9B83-4BFF-8EA3-ABD81F513886}" type="presParOf" srcId="{A1629A0E-0EC5-4936-8431-EBC33A1CA495}" destId="{4DDB096F-512F-4475-9322-30A79DF2AB69}" srcOrd="12" destOrd="0" presId="urn:microsoft.com/office/officeart/2005/8/layout/hProcess9"/>
+  </dgm:cxnLst>
+  <dgm:bg/>
+  <dgm:whole/>
+  <dgm:extLst>
+    <a:ext uri="http://schemas.microsoft.com/office/drawing/2008/diagram">
+      <dsp:dataModelExt xmlns:dsp="http://schemas.microsoft.com/office/drawing/2008/diagram" relId="rId6" minVer="http://schemas.openxmlformats.org/drawingml/2006/diagram"/>
+    </a:ext>
+  </dgm:extLst>
+</dgm:dataModel>
+</file>
+
+<file path=ppt/diagrams/drawing1.xml><?xml version="1.0" encoding="utf-8"?>
+<dsp:drawing xmlns:dgm="http://schemas.openxmlformats.org/drawingml/2006/diagram" xmlns:dsp="http://schemas.microsoft.com/office/drawing/2008/diagram" xmlns:a="http://schemas.openxmlformats.org/drawingml/2006/main">
+  <dsp:spTree>
+    <dsp:nvGrpSpPr>
+      <dsp:cNvPr id="0" name=""/>
+      <dsp:cNvGrpSpPr/>
+    </dsp:nvGrpSpPr>
+    <dsp:grpSpPr/>
+    <dsp:sp modelId="{F3F47C30-2FA9-4E53-AAC8-CC4BFE4671E1}">
+      <dsp:nvSpPr>
+        <dsp:cNvPr id="0" name=""/>
+        <dsp:cNvSpPr/>
+      </dsp:nvSpPr>
+      <dsp:spPr>
+        <a:xfrm>
+          <a:off x="776532" y="0"/>
+          <a:ext cx="8800697" cy="4058751"/>
+        </a:xfrm>
+        <a:prstGeom prst="rightArrow">
+          <a:avLst/>
+        </a:prstGeom>
+        <a:solidFill>
+          <a:schemeClr val="dk2">
+            <a:tint val="40000"/>
+            <a:hueOff val="0"/>
+            <a:satOff val="0"/>
+            <a:lumOff val="0"/>
+            <a:alphaOff val="0"/>
+          </a:schemeClr>
+        </a:solidFill>
+        <a:ln>
+          <a:noFill/>
+        </a:ln>
+        <a:effectLst/>
+      </dsp:spPr>
+      <dsp:style>
+        <a:lnRef idx="0">
+          <a:scrgbClr r="0" g="0" b="0"/>
+        </a:lnRef>
+        <a:fillRef idx="1">
+          <a:scrgbClr r="0" g="0" b="0"/>
+        </a:fillRef>
+        <a:effectRef idx="0">
+          <a:scrgbClr r="0" g="0" b="0"/>
+        </a:effectRef>
+        <a:fontRef idx="minor"/>
+      </dsp:style>
+    </dsp:sp>
+    <dsp:sp modelId="{8352C1E8-2172-48E5-B427-1A0E8A3AC4B5}">
+      <dsp:nvSpPr>
+        <dsp:cNvPr id="0" name=""/>
+        <dsp:cNvSpPr/>
+      </dsp:nvSpPr>
+      <dsp:spPr>
+        <a:xfrm>
+          <a:off x="884" y="1217625"/>
+          <a:ext cx="1418081" cy="1623500"/>
+        </a:xfrm>
+        <a:prstGeom prst="roundRect">
+          <a:avLst/>
+        </a:prstGeom>
+        <a:solidFill>
+          <a:schemeClr val="dk2">
+            <a:hueOff val="0"/>
+            <a:satOff val="0"/>
+            <a:lumOff val="0"/>
+            <a:alphaOff val="0"/>
+          </a:schemeClr>
+        </a:solidFill>
+        <a:ln w="15875" cap="rnd" cmpd="sng" algn="ctr">
+          <a:solidFill>
+            <a:schemeClr val="lt2">
+              <a:hueOff val="0"/>
+              <a:satOff val="0"/>
+              <a:lumOff val="0"/>
+              <a:alphaOff val="0"/>
+            </a:schemeClr>
+          </a:solidFill>
+          <a:prstDash val="solid"/>
+        </a:ln>
+        <a:effectLst/>
+      </dsp:spPr>
+      <dsp:style>
+        <a:lnRef idx="2">
+          <a:scrgbClr r="0" g="0" b="0"/>
+        </a:lnRef>
+        <a:fillRef idx="1">
+          <a:scrgbClr r="0" g="0" b="0"/>
+        </a:fillRef>
+        <a:effectRef idx="0">
+          <a:scrgbClr r="0" g="0" b="0"/>
+        </a:effectRef>
+        <a:fontRef idx="minor">
+          <a:schemeClr val="lt1"/>
+        </a:fontRef>
+      </dsp:style>
+      <dsp:txBody>
+        <a:bodyPr spcFirstLastPara="0" vert="horz" wrap="square" lIns="53340" tIns="53340" rIns="53340" bIns="53340" numCol="1" spcCol="1270" anchor="ctr" anchorCtr="0">
+          <a:noAutofit/>
+        </a:bodyPr>
+        <a:lstStyle/>
+        <a:p>
+          <a:pPr marL="0" lvl="0" indent="0" algn="ctr" defTabSz="622300">
+            <a:lnSpc>
+              <a:spcPct val="90000"/>
+            </a:lnSpc>
+            <a:spcBef>
+              <a:spcPct val="0"/>
+            </a:spcBef>
+            <a:spcAft>
+              <a:spcPct val="35000"/>
+            </a:spcAft>
+            <a:buNone/>
+          </a:pPr>
+          <a:r>
+            <a:rPr lang="en-IN" sz="1400" kern="1200"/>
+            <a:t>Decided project</a:t>
+          </a:r>
+        </a:p>
+      </dsp:txBody>
+      <dsp:txXfrm>
+        <a:off x="70109" y="1286850"/>
+        <a:ext cx="1279631" cy="1485050"/>
+      </dsp:txXfrm>
+    </dsp:sp>
+    <dsp:sp modelId="{F996BF07-F1A1-4C0A-80B3-911958DDE9E6}">
+      <dsp:nvSpPr>
+        <dsp:cNvPr id="0" name=""/>
+        <dsp:cNvSpPr/>
+      </dsp:nvSpPr>
+      <dsp:spPr>
+        <a:xfrm>
+          <a:off x="1489869" y="1217625"/>
+          <a:ext cx="1418081" cy="1623500"/>
+        </a:xfrm>
+        <a:prstGeom prst="roundRect">
+          <a:avLst/>
+        </a:prstGeom>
+        <a:solidFill>
+          <a:schemeClr val="dk2">
+            <a:hueOff val="0"/>
+            <a:satOff val="0"/>
+            <a:lumOff val="0"/>
+            <a:alphaOff val="0"/>
+          </a:schemeClr>
+        </a:solidFill>
+        <a:ln w="15875" cap="rnd" cmpd="sng" algn="ctr">
+          <a:solidFill>
+            <a:schemeClr val="lt2">
+              <a:hueOff val="0"/>
+              <a:satOff val="0"/>
+              <a:lumOff val="0"/>
+              <a:alphaOff val="0"/>
+            </a:schemeClr>
+          </a:solidFill>
+          <a:prstDash val="solid"/>
+        </a:ln>
+        <a:effectLst/>
+      </dsp:spPr>
+      <dsp:style>
+        <a:lnRef idx="2">
+          <a:scrgbClr r="0" g="0" b="0"/>
+        </a:lnRef>
+        <a:fillRef idx="1">
+          <a:scrgbClr r="0" g="0" b="0"/>
+        </a:fillRef>
+        <a:effectRef idx="0">
+          <a:scrgbClr r="0" g="0" b="0"/>
+        </a:effectRef>
+        <a:fontRef idx="minor">
+          <a:schemeClr val="lt1"/>
+        </a:fontRef>
+      </dsp:style>
+      <dsp:txBody>
+        <a:bodyPr spcFirstLastPara="0" vert="horz" wrap="square" lIns="53340" tIns="53340" rIns="53340" bIns="53340" numCol="1" spcCol="1270" anchor="ctr" anchorCtr="0">
+          <a:noAutofit/>
+        </a:bodyPr>
+        <a:lstStyle/>
+        <a:p>
+          <a:pPr marL="0" lvl="0" indent="0" algn="ctr" defTabSz="622300">
+            <a:lnSpc>
+              <a:spcPct val="90000"/>
+            </a:lnSpc>
+            <a:spcBef>
+              <a:spcPct val="0"/>
+            </a:spcBef>
+            <a:spcAft>
+              <a:spcPct val="35000"/>
+            </a:spcAft>
+            <a:buNone/>
+          </a:pPr>
+          <a:r>
+            <a:rPr lang="en-IN" sz="1400" kern="1200" dirty="0"/>
+            <a:t>Studied about editor and NCURSES library.</a:t>
+          </a:r>
+        </a:p>
+      </dsp:txBody>
+      <dsp:txXfrm>
+        <a:off x="1559094" y="1286850"/>
+        <a:ext cx="1279631" cy="1485050"/>
+      </dsp:txXfrm>
+    </dsp:sp>
+    <dsp:sp modelId="{29ABCCA4-89D5-4B40-8882-DEB758F4AD08}">
+      <dsp:nvSpPr>
+        <dsp:cNvPr id="0" name=""/>
+        <dsp:cNvSpPr/>
+      </dsp:nvSpPr>
+      <dsp:spPr>
+        <a:xfrm>
+          <a:off x="2978855" y="1217625"/>
+          <a:ext cx="1418081" cy="1623500"/>
+        </a:xfrm>
+        <a:prstGeom prst="roundRect">
+          <a:avLst/>
+        </a:prstGeom>
+        <a:solidFill>
+          <a:schemeClr val="dk2">
+            <a:hueOff val="0"/>
+            <a:satOff val="0"/>
+            <a:lumOff val="0"/>
+            <a:alphaOff val="0"/>
+          </a:schemeClr>
+        </a:solidFill>
+        <a:ln w="15875" cap="rnd" cmpd="sng" algn="ctr">
+          <a:solidFill>
+            <a:schemeClr val="lt2">
+              <a:hueOff val="0"/>
+              <a:satOff val="0"/>
+              <a:lumOff val="0"/>
+              <a:alphaOff val="0"/>
+            </a:schemeClr>
+          </a:solidFill>
+          <a:prstDash val="solid"/>
+        </a:ln>
+        <a:effectLst/>
+      </dsp:spPr>
+      <dsp:style>
+        <a:lnRef idx="2">
+          <a:scrgbClr r="0" g="0" b="0"/>
+        </a:lnRef>
+        <a:fillRef idx="1">
+          <a:scrgbClr r="0" g="0" b="0"/>
+        </a:fillRef>
+        <a:effectRef idx="0">
+          <a:scrgbClr r="0" g="0" b="0"/>
+        </a:effectRef>
+        <a:fontRef idx="minor">
+          <a:schemeClr val="lt1"/>
+        </a:fontRef>
+      </dsp:style>
+      <dsp:txBody>
+        <a:bodyPr spcFirstLastPara="0" vert="horz" wrap="square" lIns="53340" tIns="53340" rIns="53340" bIns="53340" numCol="1" spcCol="1270" anchor="ctr" anchorCtr="0">
+          <a:noAutofit/>
+        </a:bodyPr>
+        <a:lstStyle/>
+        <a:p>
+          <a:pPr marL="0" lvl="0" indent="0" algn="ctr" defTabSz="622300">
+            <a:lnSpc>
+              <a:spcPct val="90000"/>
+            </a:lnSpc>
+            <a:spcBef>
+              <a:spcPct val="0"/>
+            </a:spcBef>
+            <a:spcAft>
+              <a:spcPct val="35000"/>
+            </a:spcAft>
+            <a:buNone/>
+          </a:pPr>
+          <a:r>
+            <a:rPr lang="en-IN" sz="1400" kern="1200"/>
+            <a:t>Created Structure of buffer</a:t>
+          </a:r>
+        </a:p>
+      </dsp:txBody>
+      <dsp:txXfrm>
+        <a:off x="3048080" y="1286850"/>
+        <a:ext cx="1279631" cy="1485050"/>
+      </dsp:txXfrm>
+    </dsp:sp>
+    <dsp:sp modelId="{416FD297-47A1-40F4-8001-0554B7F4A48A}">
+      <dsp:nvSpPr>
+        <dsp:cNvPr id="0" name=""/>
+        <dsp:cNvSpPr/>
+      </dsp:nvSpPr>
+      <dsp:spPr>
+        <a:xfrm>
+          <a:off x="4467840" y="1217625"/>
+          <a:ext cx="1418081" cy="1623500"/>
+        </a:xfrm>
+        <a:prstGeom prst="roundRect">
+          <a:avLst/>
+        </a:prstGeom>
+        <a:solidFill>
+          <a:schemeClr val="dk2">
+            <a:hueOff val="0"/>
+            <a:satOff val="0"/>
+            <a:lumOff val="0"/>
+            <a:alphaOff val="0"/>
+          </a:schemeClr>
+        </a:solidFill>
+        <a:ln w="15875" cap="rnd" cmpd="sng" algn="ctr">
+          <a:solidFill>
+            <a:schemeClr val="lt2">
+              <a:hueOff val="0"/>
+              <a:satOff val="0"/>
+              <a:lumOff val="0"/>
+              <a:alphaOff val="0"/>
+            </a:schemeClr>
+          </a:solidFill>
+          <a:prstDash val="solid"/>
+        </a:ln>
+        <a:effectLst/>
+      </dsp:spPr>
+      <dsp:style>
+        <a:lnRef idx="2">
+          <a:scrgbClr r="0" g="0" b="0"/>
+        </a:lnRef>
+        <a:fillRef idx="1">
+          <a:scrgbClr r="0" g="0" b="0"/>
+        </a:fillRef>
+        <a:effectRef idx="0">
+          <a:scrgbClr r="0" g="0" b="0"/>
+        </a:effectRef>
+        <a:fontRef idx="minor">
+          <a:schemeClr val="lt1"/>
+        </a:fontRef>
+      </dsp:style>
+      <dsp:txBody>
+        <a:bodyPr spcFirstLastPara="0" vert="horz" wrap="square" lIns="53340" tIns="53340" rIns="53340" bIns="53340" numCol="1" spcCol="1270" anchor="ctr" anchorCtr="0">
+          <a:noAutofit/>
+        </a:bodyPr>
+        <a:lstStyle/>
+        <a:p>
+          <a:pPr marL="0" lvl="0" indent="0" algn="ctr" defTabSz="622300">
+            <a:lnSpc>
+              <a:spcPct val="90000"/>
+            </a:lnSpc>
+            <a:spcBef>
+              <a:spcPct val="0"/>
+            </a:spcBef>
+            <a:spcAft>
+              <a:spcPct val="35000"/>
+            </a:spcAft>
+            <a:buNone/>
+          </a:pPr>
+          <a:r>
+            <a:rPr lang="en-IN" sz="1400" kern="1200"/>
+            <a:t>Implemented basic functions of buffer</a:t>
+          </a:r>
+        </a:p>
+      </dsp:txBody>
+      <dsp:txXfrm>
+        <a:off x="4537065" y="1286850"/>
+        <a:ext cx="1279631" cy="1485050"/>
+      </dsp:txXfrm>
+    </dsp:sp>
+    <dsp:sp modelId="{10D74E59-C7ED-4F40-BFAA-DEDE6B19FB60}">
+      <dsp:nvSpPr>
+        <dsp:cNvPr id="0" name=""/>
+        <dsp:cNvSpPr/>
+      </dsp:nvSpPr>
+      <dsp:spPr>
+        <a:xfrm>
+          <a:off x="5956825" y="1217625"/>
+          <a:ext cx="1418081" cy="1623500"/>
+        </a:xfrm>
+        <a:prstGeom prst="roundRect">
+          <a:avLst/>
+        </a:prstGeom>
+        <a:solidFill>
+          <a:schemeClr val="dk2">
+            <a:hueOff val="0"/>
+            <a:satOff val="0"/>
+            <a:lumOff val="0"/>
+            <a:alphaOff val="0"/>
+          </a:schemeClr>
+        </a:solidFill>
+        <a:ln w="15875" cap="rnd" cmpd="sng" algn="ctr">
+          <a:solidFill>
+            <a:schemeClr val="lt2">
+              <a:hueOff val="0"/>
+              <a:satOff val="0"/>
+              <a:lumOff val="0"/>
+              <a:alphaOff val="0"/>
+            </a:schemeClr>
+          </a:solidFill>
+          <a:prstDash val="solid"/>
+        </a:ln>
+        <a:effectLst/>
+      </dsp:spPr>
+      <dsp:style>
+        <a:lnRef idx="2">
+          <a:scrgbClr r="0" g="0" b="0"/>
+        </a:lnRef>
+        <a:fillRef idx="1">
+          <a:scrgbClr r="0" g="0" b="0"/>
+        </a:fillRef>
+        <a:effectRef idx="0">
+          <a:scrgbClr r="0" g="0" b="0"/>
+        </a:effectRef>
+        <a:fontRef idx="minor">
+          <a:schemeClr val="lt1"/>
+        </a:fontRef>
+      </dsp:style>
+      <dsp:txBody>
+        <a:bodyPr spcFirstLastPara="0" vert="horz" wrap="square" lIns="53340" tIns="53340" rIns="53340" bIns="53340" numCol="1" spcCol="1270" anchor="ctr" anchorCtr="0">
+          <a:noAutofit/>
+        </a:bodyPr>
+        <a:lstStyle/>
+        <a:p>
+          <a:pPr marL="0" lvl="0" indent="0" algn="ctr" defTabSz="622300">
+            <a:lnSpc>
+              <a:spcPct val="90000"/>
+            </a:lnSpc>
+            <a:spcBef>
+              <a:spcPct val="0"/>
+            </a:spcBef>
+            <a:spcAft>
+              <a:spcPct val="35000"/>
+            </a:spcAft>
+            <a:buNone/>
+          </a:pPr>
+          <a:r>
+            <a:rPr lang="en-IN" sz="1400" kern="1200"/>
+            <a:t>Implemented UI using NCURSES</a:t>
+          </a:r>
+        </a:p>
+      </dsp:txBody>
+      <dsp:txXfrm>
+        <a:off x="6026050" y="1286850"/>
+        <a:ext cx="1279631" cy="1485050"/>
+      </dsp:txXfrm>
+    </dsp:sp>
+    <dsp:sp modelId="{939740D5-786F-4036-A509-50A0359D9FCD}">
+      <dsp:nvSpPr>
+        <dsp:cNvPr id="0" name=""/>
+        <dsp:cNvSpPr/>
+      </dsp:nvSpPr>
+      <dsp:spPr>
+        <a:xfrm>
+          <a:off x="7445810" y="1217625"/>
+          <a:ext cx="1418081" cy="1623500"/>
+        </a:xfrm>
+        <a:prstGeom prst="roundRect">
+          <a:avLst/>
+        </a:prstGeom>
+        <a:solidFill>
+          <a:schemeClr val="dk2">
+            <a:hueOff val="0"/>
+            <a:satOff val="0"/>
+            <a:lumOff val="0"/>
+            <a:alphaOff val="0"/>
+          </a:schemeClr>
+        </a:solidFill>
+        <a:ln w="15875" cap="rnd" cmpd="sng" algn="ctr">
+          <a:solidFill>
+            <a:schemeClr val="lt2">
+              <a:hueOff val="0"/>
+              <a:satOff val="0"/>
+              <a:lumOff val="0"/>
+              <a:alphaOff val="0"/>
+            </a:schemeClr>
+          </a:solidFill>
+          <a:prstDash val="solid"/>
+        </a:ln>
+        <a:effectLst/>
+      </dsp:spPr>
+      <dsp:style>
+        <a:lnRef idx="2">
+          <a:scrgbClr r="0" g="0" b="0"/>
+        </a:lnRef>
+        <a:fillRef idx="1">
+          <a:scrgbClr r="0" g="0" b="0"/>
+        </a:fillRef>
+        <a:effectRef idx="0">
+          <a:scrgbClr r="0" g="0" b="0"/>
+        </a:effectRef>
+        <a:fontRef idx="minor">
+          <a:schemeClr val="lt1"/>
+        </a:fontRef>
+      </dsp:style>
+      <dsp:txBody>
+        <a:bodyPr spcFirstLastPara="0" vert="horz" wrap="square" lIns="53340" tIns="53340" rIns="53340" bIns="53340" numCol="1" spcCol="1270" anchor="ctr" anchorCtr="0">
+          <a:noAutofit/>
+        </a:bodyPr>
+        <a:lstStyle/>
+        <a:p>
+          <a:pPr marL="0" lvl="0" indent="0" algn="ctr" defTabSz="622300">
+            <a:lnSpc>
+              <a:spcPct val="90000"/>
+            </a:lnSpc>
+            <a:spcBef>
+              <a:spcPct val="0"/>
+            </a:spcBef>
+            <a:spcAft>
+              <a:spcPct val="35000"/>
+            </a:spcAft>
+            <a:buNone/>
+          </a:pPr>
+          <a:r>
+            <a:rPr lang="en-IN" sz="1400" kern="1200"/>
+            <a:t>Added functionalities like as a basic editor</a:t>
+          </a:r>
+        </a:p>
+      </dsp:txBody>
+      <dsp:txXfrm>
+        <a:off x="7515035" y="1286850"/>
+        <a:ext cx="1279631" cy="1485050"/>
+      </dsp:txXfrm>
+    </dsp:sp>
+    <dsp:sp modelId="{4DDB096F-512F-4475-9322-30A79DF2AB69}">
+      <dsp:nvSpPr>
+        <dsp:cNvPr id="0" name=""/>
+        <dsp:cNvSpPr/>
+      </dsp:nvSpPr>
+      <dsp:spPr>
+        <a:xfrm>
+          <a:off x="8934796" y="1217625"/>
+          <a:ext cx="1418081" cy="1623500"/>
+        </a:xfrm>
+        <a:prstGeom prst="roundRect">
+          <a:avLst/>
+        </a:prstGeom>
+        <a:solidFill>
+          <a:schemeClr val="dk2">
+            <a:hueOff val="0"/>
+            <a:satOff val="0"/>
+            <a:lumOff val="0"/>
+            <a:alphaOff val="0"/>
+          </a:schemeClr>
+        </a:solidFill>
+        <a:ln w="15875" cap="rnd" cmpd="sng" algn="ctr">
+          <a:solidFill>
+            <a:schemeClr val="lt2">
+              <a:hueOff val="0"/>
+              <a:satOff val="0"/>
+              <a:lumOff val="0"/>
+              <a:alphaOff val="0"/>
+            </a:schemeClr>
+          </a:solidFill>
+          <a:prstDash val="solid"/>
+        </a:ln>
+        <a:effectLst/>
+      </dsp:spPr>
+      <dsp:style>
+        <a:lnRef idx="2">
+          <a:scrgbClr r="0" g="0" b="0"/>
+        </a:lnRef>
+        <a:fillRef idx="1">
+          <a:scrgbClr r="0" g="0" b="0"/>
+        </a:fillRef>
+        <a:effectRef idx="0">
+          <a:scrgbClr r="0" g="0" b="0"/>
+        </a:effectRef>
+        <a:fontRef idx="minor">
+          <a:schemeClr val="lt1"/>
+        </a:fontRef>
+      </dsp:style>
+      <dsp:txBody>
+        <a:bodyPr spcFirstLastPara="0" vert="horz" wrap="square" lIns="53340" tIns="53340" rIns="53340" bIns="53340" numCol="1" spcCol="1270" anchor="ctr" anchorCtr="0">
+          <a:noAutofit/>
+        </a:bodyPr>
+        <a:lstStyle/>
+        <a:p>
+          <a:pPr marL="0" lvl="0" indent="0" algn="ctr" defTabSz="622300">
+            <a:lnSpc>
+              <a:spcPct val="90000"/>
+            </a:lnSpc>
+            <a:spcBef>
+              <a:spcPct val="0"/>
+            </a:spcBef>
+            <a:spcAft>
+              <a:spcPct val="35000"/>
+            </a:spcAft>
+            <a:buNone/>
+          </a:pPr>
+          <a:r>
+            <a:rPr lang="en-IN" sz="1400" kern="1200"/>
+            <a:t>Added more Advanced functionalities. </a:t>
+          </a:r>
+        </a:p>
+      </dsp:txBody>
+      <dsp:txXfrm>
+        <a:off x="9004021" y="1286850"/>
+        <a:ext cx="1279631" cy="1485050"/>
+      </dsp:txXfrm>
+    </dsp:sp>
+  </dsp:spTree>
+</dsp:drawing>
+</file>
+
+<file path=ppt/diagrams/layout1.xml><?xml version="1.0" encoding="utf-8"?>
+<dgm:layoutDef xmlns:dgm="http://schemas.openxmlformats.org/drawingml/2006/diagram" xmlns:a="http://schemas.openxmlformats.org/drawingml/2006/main" uniqueId="urn:microsoft.com/office/officeart/2005/8/layout/hProcess9">
+  <dgm:title val=""/>
+  <dgm:desc val=""/>
+  <dgm:catLst>
+    <dgm:cat type="process" pri="5000"/>
+    <dgm:cat type="convert" pri="13000"/>
+  </dgm:catLst>
+  <dgm:sampData useDef="1">
+    <dgm:dataModel>
+      <dgm:ptLst/>
+      <dgm:bg/>
+      <dgm:whole/>
+    </dgm:dataModel>
+  </dgm:sampData>
+  <dgm:styleData>
+    <dgm:dataModel>
+      <dgm:ptLst>
+        <dgm:pt modelId="0" type="doc"/>
+        <dgm:pt modelId="1"/>
+        <dgm:pt modelId="2"/>
+      </dgm:ptLst>
+      <dgm:cxnLst>
+        <dgm:cxn modelId="3" srcId="0" destId="1" srcOrd="0" destOrd="0"/>
+        <dgm:cxn modelId="4" srcId="0" destId="2" srcOrd="1" destOrd="0"/>
+      </dgm:cxnLst>
+      <dgm:bg/>
+      <dgm:whole/>
+    </dgm:dataModel>
+  </dgm:styleData>
+  <dgm:clrData>
+    <dgm:dataModel>
+      <dgm:ptLst>
+        <dgm:pt modelId="0" type="doc"/>
+        <dgm:pt modelId="1"/>
+        <dgm:pt modelId="2"/>
+        <dgm:pt modelId="3"/>
+        <dgm:pt modelId="4"/>
+      </dgm:ptLst>
+      <dgm:cxnLst>
+        <dgm:cxn modelId="5" srcId="0" destId="1" srcOrd="0" destOrd="0"/>
+        <dgm:cxn modelId="6" srcId="0" destId="2" srcOrd="1" destOrd="0"/>
+        <dgm:cxn modelId="7" srcId="0" destId="3" srcOrd="2" destOrd="0"/>
+        <dgm:cxn modelId="8" srcId="0" destId="4" srcOrd="3" destOrd="0"/>
+      </dgm:cxnLst>
+      <dgm:bg/>
+      <dgm:whole/>
+    </dgm:dataModel>
+  </dgm:clrData>
+  <dgm:layoutNode name="CompostProcess">
+    <dgm:varLst>
+      <dgm:dir/>
+      <dgm:resizeHandles val="exact"/>
+    </dgm:varLst>
+    <dgm:alg type="composite">
+      <dgm:param type="horzAlign" val="ctr"/>
+      <dgm:param type="vertAlign" val="mid"/>
+    </dgm:alg>
+    <dgm:shape xmlns:r="http://schemas.openxmlformats.org/officeDocument/2006/relationships" r:blip="">
+      <dgm:adjLst/>
+    </dgm:shape>
+    <dgm:presOf/>
+    <dgm:constrLst>
+      <dgm:constr type="w" for="ch" forName="arrow" refType="w" fact="0.85"/>
+      <dgm:constr type="h" for="ch" forName="arrow" refType="h"/>
+      <dgm:constr type="ctrX" for="ch" forName="arrow" refType="w" fact="0.5"/>
+      <dgm:constr type="ctrY" for="ch" forName="arrow" refType="h" fact="0.5"/>
+      <dgm:constr type="w" for="ch" forName="linearProcess" refType="w"/>
+      <dgm:constr type="h" for="ch" forName="linearProcess" refType="h" fact="0.4"/>
+      <dgm:constr type="ctrX" for="ch" forName="linearProcess" refType="w" fact="0.5"/>
+      <dgm:constr type="ctrY" for="ch" forName="linearProcess" refType="h" fact="0.5"/>
+    </dgm:constrLst>
+    <dgm:ruleLst/>
+    <dgm:layoutNode name="arrow" styleLbl="bgShp">
+      <dgm:alg type="sp"/>
+      <dgm:choose name="Name0">
+        <dgm:if name="Name1" func="var" arg="dir" op="equ" val="norm">
+          <dgm:shape xmlns:r="http://schemas.openxmlformats.org/officeDocument/2006/relationships" type="rightArrow" r:blip="">
+            <dgm:adjLst/>
+          </dgm:shape>
+        </dgm:if>
+        <dgm:else name="Name2">
+          <dgm:shape xmlns:r="http://schemas.openxmlformats.org/officeDocument/2006/relationships" type="leftArrow" r:blip="">
+            <dgm:adjLst/>
+          </dgm:shape>
+        </dgm:else>
+      </dgm:choose>
+      <dgm:presOf/>
+      <dgm:constrLst/>
+      <dgm:ruleLst/>
+    </dgm:layoutNode>
+    <dgm:layoutNode name="linearProcess">
+      <dgm:choose name="Name3">
+        <dgm:if name="Name4" func="var" arg="dir" op="equ" val="norm">
+          <dgm:alg type="lin"/>
+        </dgm:if>
+        <dgm:else name="Name5">
+          <dgm:alg type="lin">
+            <dgm:param type="linDir" val="fromR"/>
+          </dgm:alg>
+        </dgm:else>
+      </dgm:choose>
+      <dgm:shape xmlns:r="http://schemas.openxmlformats.org/officeDocument/2006/relationships" r:blip="">
+        <dgm:adjLst/>
+      </dgm:shape>
+      <dgm:presOf/>
+      <dgm:constrLst>
+        <dgm:constr type="userA" for="ch" ptType="node" refType="w"/>
+        <dgm:constr type="h" for="ch" ptType="node" refType="h"/>
+        <dgm:constr type="w" for="ch" ptType="node" op="equ"/>
+        <dgm:constr type="w" for="ch" forName="sibTrans" refType="w" fact="0.05"/>
+        <dgm:constr type="primFontSz" for="ch" ptType="node" op="equ" val="65"/>
+      </dgm:constrLst>
+      <dgm:ruleLst/>
+      <dgm:forEach name="Name6" axis="ch" ptType="node">
+        <dgm:layoutNode name="textNode" styleLbl="node1">
+          <dgm:varLst>
+            <dgm:bulletEnabled val="1"/>
+          </dgm:varLst>
+          <dgm:alg type="tx"/>
+          <dgm:shape xmlns:r="http://schemas.openxmlformats.org/officeDocument/2006/relationships" type="roundRect" r:blip="">
+            <dgm:adjLst/>
+          </dgm:shape>
+          <dgm:presOf axis="desOrSelf" ptType="node"/>
+          <dgm:constrLst>
+            <dgm:constr type="userA"/>
+            <dgm:constr type="w" refType="userA" fact="0.3"/>
+            <dgm:constr type="tMarg" refType="primFontSz" fact="0.3"/>
+            <dgm:constr type="bMarg" refType="primFontSz" fact="0.3"/>
+            <dgm:constr type="lMarg" refType="primFontSz" fact="0.3"/>
+            <dgm:constr type="rMarg" refType="primFontSz" fact="0.3"/>
+          </dgm:constrLst>
+          <dgm:ruleLst>
+            <dgm:rule type="w" val="NaN" fact="1" max="NaN"/>
+            <dgm:rule type="primFontSz" val="5" fact="NaN" max="NaN"/>
+          </dgm:ruleLst>
+        </dgm:layoutNode>
+        <dgm:forEach name="Name7" axis="followSib" ptType="sibTrans" cnt="1">
+          <dgm:layoutNode name="sibTrans">
+            <dgm:alg type="sp"/>
+            <dgm:shape xmlns:r="http://schemas.openxmlformats.org/officeDocument/2006/relationships" r:blip="">
+              <dgm:adjLst/>
+            </dgm:shape>
+            <dgm:presOf/>
+            <dgm:constrLst/>
+            <dgm:ruleLst/>
+          </dgm:layoutNode>
+        </dgm:forEach>
+      </dgm:forEach>
+    </dgm:layoutNode>
+  </dgm:layoutNode>
+</dgm:layoutDef>
+</file>
+
+<file path=ppt/diagrams/quickStyle1.xml><?xml version="1.0" encoding="utf-8"?>
+<dgm:styleDef xmlns:dgm="http://schemas.openxmlformats.org/drawingml/2006/diagram" xmlns:a="http://schemas.openxmlformats.org/drawingml/2006/main" uniqueId="urn:microsoft.com/office/officeart/2005/8/quickstyle/simple1">
+  <dgm:title val=""/>
+  <dgm:desc val=""/>
+  <dgm:catLst>
+    <dgm:cat type="simple" pri="10100"/>
+  </dgm:catLst>
+  <dgm:scene3d>
+    <a:camera prst="orthographicFront"/>
+    <a:lightRig rig="threePt" dir="t"/>
+  </dgm:scene3d>
+  <dgm:styleLbl name="node0">
+    <dgm:scene3d>
+      <a:camera prst="orthographicFront"/>
+      <a:lightRig rig="threePt" dir="t"/>
+    </dgm:scene3d>
+    <dgm:sp3d/>
+    <dgm:txPr/>
+    <dgm:style>
+      <a:lnRef idx="2">
+        <a:scrgbClr r="0" g="0" b="0"/>
+      </a:lnRef>
+      <a:fillRef idx="1">
+        <a:scrgbClr r="0" g="0" b="0"/>
+      </a:fillRef>
+      <a:effectRef idx="0">
+        <a:scrgbClr r="0" g="0" b="0"/>
+      </a:effectRef>
+      <a:fontRef idx="minor">
+        <a:schemeClr val="lt1"/>
+      </a:fontRef>
+    </dgm:style>
+  </dgm:styleLbl>
+  <dgm:styleLbl name="lnNode1">
+    <dgm:scene3d>
+      <a:camera prst="orthographicFront"/>
+      <a:lightRig rig="threePt" dir="t"/>
+    </dgm:scene3d>
+    <dgm:sp3d/>
+    <dgm:txPr/>
+    <dgm:style>
+      <a:lnRef idx="2">
+        <a:scrgbClr r="0" g="0" b="0"/>
+      </a:lnRef>
+      <a:fillRef idx="1">
+        <a:scrgbClr r="0" g="0" b="0"/>
+      </a:fillRef>
+      <a:effectRef idx="0">
+        <a:scrgbClr r="0" g="0" b="0"/>
+      </a:effectRef>
+      <a:fontRef idx="minor">
+        <a:schemeClr val="lt1"/>
+      </a:fontRef>
+    </dgm:style>
+  </dgm:styleLbl>
+  <dgm:styleLbl name="vennNode1">
+    <dgm:scene3d>
+      <a:camera prst="orthographicFront"/>
+      <a:lightRig rig="threePt" dir="t"/>
+    </dgm:scene3d>
+    <dgm:sp3d/>
+    <dgm:txPr/>
+    <dgm:style>
+      <a:lnRef idx="2">
+        <a:scrgbClr r="0" g="0" b="0"/>
+      </a:lnRef>
+      <a:fillRef idx="1">
+        <a:scrgbClr r="0" g="0" b="0"/>
+      </a:fillRef>
+      <a:effectRef idx="0">
+        <a:scrgbClr r="0" g="0" b="0"/>
+      </a:effectRef>
+      <a:fontRef idx="minor">
+        <a:schemeClr val="tx1"/>
+      </a:fontRef>
+    </dgm:style>
+  </dgm:styleLbl>
+  <dgm:styleLbl name="alignNode1">
+    <dgm:scene3d>
+      <a:camera prst="orthographicFront"/>
+      <a:lightRig rig="threePt" dir="t"/>
+    </dgm:scene3d>
+    <dgm:sp3d/>
+    <dgm:txPr/>
+    <dgm:style>
+      <a:lnRef idx="2">
+        <a:scrgbClr r="0" g="0" b="0"/>
+      </a:lnRef>
+      <a:fillRef idx="1">
+        <a:scrgbClr r="0" g="0" b="0"/>
+      </a:fillRef>
+      <a:effectRef idx="0">
+        <a:scrgbClr r="0" g="0" b="0"/>
+      </a:effectRef>
+      <a:fontRef idx="minor">
+        <a:schemeClr val="lt1"/>
+      </a:fontRef>
+    </dgm:style>
+  </dgm:styleLbl>
+  <dgm:styleLbl name="node1">
+    <dgm:scene3d>
+      <a:camera prst="orthographicFront"/>
+      <a:lightRig rig="threePt" dir="t"/>
+    </dgm:scene3d>
+    <dgm:sp3d/>
+    <dgm:txPr/>
+    <dgm:style>
+      <a:lnRef idx="2">
+        <a:scrgbClr r="0" g="0" b="0"/>
+      </a:lnRef>
+      <a:fillRef idx="1">
+        <a:scrgbClr r="0" g="0" b="0"/>
+      </a:fillRef>
+      <a:effectRef idx="0">
+        <a:scrgbClr r="0" g="0" b="0"/>
+      </a:effectRef>
+      <a:fontRef idx="minor">
+        <a:schemeClr val="lt1"/>
+      </a:fontRef>
+    </dgm:style>
+  </dgm:styleLbl>
+  <dgm:styleLbl name="node2">
+    <dgm:scene3d>
+      <a:camera prst="orthographicFront"/>
+      <a:lightRig rig="threePt" dir="t"/>
+    </dgm:scene3d>
+    <dgm:sp3d/>
+    <dgm:txPr/>
+    <dgm:style>
+      <a:lnRef idx="2">
+        <a:scrgbClr r="0" g="0" b="0"/>
+      </a:lnRef>
+      <a:fillRef idx="1">
+        <a:scrgbClr r="0" g="0" b="0"/>
+      </a:fillRef>
+      <a:effectRef idx="0">
+        <a:scrgbClr r="0" g="0" b="0"/>
+      </a:effectRef>
+      <a:fontRef idx="minor">
+        <a:schemeClr val="lt1"/>
+      </a:fontRef>
+    </dgm:style>
+  </dgm:styleLbl>
+  <dgm:styleLbl name="node3">
+    <dgm:scene3d>
+      <a:camera prst="orthographicFront"/>
+      <a:lightRig rig="threePt" dir="t"/>
+    </dgm:scene3d>
+    <dgm:sp3d/>
+    <dgm:txPr/>
+    <dgm:style>
+      <a:lnRef idx="2">
+        <a:scrgbClr r="0" g="0" b="0"/>
+      </a:lnRef>
+      <a:fillRef idx="1">
+        <a:scrgbClr r="0" g="0" b="0"/>
+      </a:fillRef>
+      <a:effectRef idx="0">
+        <a:scrgbClr r="0" g="0" b="0"/>
+      </a:effectRef>
+      <a:fontRef idx="minor">
+        <a:schemeClr val="lt1"/>
+      </a:fontRef>
+    </dgm:style>
+  </dgm:styleLbl>
+  <dgm:styleLbl name="node4">
+    <dgm:scene3d>
+      <a:camera prst="orthographicFront"/>
+      <a:lightRig rig="threePt" dir="t"/>
+    </dgm:scene3d>
+    <dgm:sp3d/>
+    <dgm:txPr/>
+    <dgm:style>
+      <a:lnRef idx="2">
+        <a:scrgbClr r="0" g="0" b="0"/>
+      </a:lnRef>
+      <a:fillRef idx="1">
+        <a:scrgbClr r="0" g="0" b="0"/>
+      </a:fillRef>
+      <a:effectRef idx="0">
+        <a:scrgbClr r="0" g="0" b="0"/>
+      </a:effectRef>
+      <a:fontRef idx="minor">
+        <a:schemeClr val="lt1"/>
+      </a:fontRef>
+    </dgm:style>
+  </dgm:styleLbl>
+  <dgm:styleLbl name="fgImgPlace1">
+    <dgm:scene3d>
+      <a:camera prst="orthographicFront"/>
+      <a:lightRig rig="threePt" dir="t"/>
+    </dgm:scene3d>
+    <dgm:sp3d/>
+    <dgm:txPr/>
+    <dgm:style>
+      <a:lnRef idx="2">
+        <a:scrgbClr r="0" g="0" b="0"/>
+      </a:lnRef>
+      <a:fillRef idx="1">
+        <a:scrgbClr r="0" g="0" b="0"/>
+      </a:fillRef>
+      <a:effectRef idx="0">
+        <a:scrgbClr r="0" g="0" b="0"/>
+      </a:effectRef>
+      <a:fontRef idx="minor"/>
+    </dgm:style>
+  </dgm:styleLbl>
+  <dgm:styleLbl name="alignImgPlace1">
+    <dgm:scene3d>
+      <a:camera prst="orthographicFront"/>
+      <a:lightRig rig="threePt" dir="t"/>
+    </dgm:scene3d>
+    <dgm:sp3d/>
+    <dgm:txPr/>
+    <dgm:style>
+      <a:lnRef idx="2">
+        <a:scrgbClr r="0" g="0" b="0"/>
+      </a:lnRef>
+      <a:fillRef idx="1">
+        <a:scrgbClr r="0" g="0" b="0"/>
+      </a:fillRef>
+      <a:effectRef idx="0">
+        <a:scrgbClr r="0" g="0" b="0"/>
+      </a:effectRef>
+      <a:fontRef idx="minor"/>
+    </dgm:style>
+  </dgm:styleLbl>
+  <dgm:styleLbl name="bgImgPlace1">
+    <dgm:scene3d>
+      <a:camera prst="orthographicFront"/>
+      <a:lightRig rig="threePt" dir="t"/>
+    </dgm:scene3d>
+    <dgm:sp3d/>
+    <dgm:txPr/>
+    <dgm:style>
+      <a:lnRef idx="2">
+        <a:scrgbClr r="0" g="0" b="0"/>
+      </a:lnRef>
+      <a:fillRef idx="1">
+        <a:scrgbClr r="0" g="0" b="0"/>
+      </a:fillRef>
+      <a:effectRef idx="0">
+        <a:scrgbClr r="0" g="0" b="0"/>
+      </a:effectRef>
+      <a:fontRef idx="minor"/>
+    </dgm:style>
+  </dgm:styleLbl>
+  <dgm:styleLbl name="sibTrans2D1">
+    <dgm:scene3d>
+      <a:camera prst="orthographicFront"/>
+      <a:lightRig rig="threePt" dir="t"/>
+    </dgm:scene3d>
+    <dgm:sp3d/>
+    <dgm:txPr/>
+    <dgm:style>
+      <a:lnRef idx="0">
+        <a:scrgbClr r="0" g="0" b="0"/>
+      </a:lnRef>
+      <a:fillRef idx="1">
+        <a:scrgbClr r="0" g="0" b="0"/>
+      </a:fillRef>
+      <a:effectRef idx="0">
+        <a:scrgbClr r="0" g="0" b="0"/>
+      </a:effectRef>
+      <a:fontRef idx="minor">
+        <a:schemeClr val="lt1"/>
+      </a:fontRef>
+    </dgm:style>
+  </dgm:styleLbl>
+  <dgm:styleLbl name="fgSibTrans2D1">
+    <dgm:scene3d>
+      <a:camera prst="orthographicFront"/>
+      <a:lightRig rig="threePt" dir="t"/>
+    </dgm:scene3d>
+    <dgm:sp3d/>
+    <dgm:txPr/>
+    <dgm:style>
+      <a:lnRef idx="0">
+        <a:scrgbClr r="0" g="0" b="0"/>
+      </a:lnRef>
+      <a:fillRef idx="1">
+        <a:scrgbClr r="0" g="0" b="0"/>
+      </a:fillRef>
+      <a:effectRef idx="0">
+        <a:scrgbClr r="0" g="0" b="0"/>
+      </a:effectRef>
+      <a:fontRef idx="minor">
+        <a:schemeClr val="lt1"/>
+      </a:fontRef>
+    </dgm:style>
+  </dgm:styleLbl>
+  <dgm:styleLbl name="bgSibTrans2D1">
+    <dgm:scene3d>
+      <a:camera prst="orthographicFront"/>
+      <a:lightRig rig="threePt" dir="t"/>
+    </dgm:scene3d>
+    <dgm:sp3d/>
+    <dgm:txPr/>
+    <dgm:style>
+      <a:lnRef idx="0">
+        <a:scrgbClr r="0" g="0" b="0"/>
+      </a:lnRef>
+      <a:fillRef idx="1">
+        <a:scrgbClr r="0" g="0" b="0"/>
+      </a:fillRef>
+      <a:effectRef idx="0">
+        <a:scrgbClr r="0" g="0" b="0"/>
+      </a:effectRef>
+      <a:fontRef idx="minor">
+        <a:schemeClr val="lt1"/>
+      </a:fontRef>
+    </dgm:style>
+  </dgm:styleLbl>
+  <dgm:styleLbl name="sibTrans1D1">
+    <dgm:scene3d>
+      <a:camera prst="orthographicFront"/>
+      <a:lightRig rig="threePt" dir="t"/>
+    </dgm:scene3d>
+    <dgm:sp3d/>
+    <dgm:txPr/>
+    <dgm:style>
+      <a:lnRef idx="1">
+        <a:scrgbClr r="0" g="0" b="0"/>
+      </a:lnRef>
+      <a:fillRef idx="0">
+        <a:scrgbClr r="0" g="0" b="0"/>
+      </a:fillRef>
+      <a:effectRef idx="0">
+        <a:scrgbClr r="0" g="0" b="0"/>
+      </a:effectRef>
+      <a:fontRef idx="minor"/>
+    </dgm:style>
+  </dgm:styleLbl>
+  <dgm:styleLbl name="callout">
+    <dgm:scene3d>
+      <a:camera prst="orthographicFront"/>
+      <a:lightRig rig="threePt" dir="t"/>
+    </dgm:scene3d>
+    <dgm:sp3d/>
+    <dgm:txPr/>
+    <dgm:style>
+      <a:lnRef idx="2">
+        <a:scrgbClr r="0" g="0" b="0"/>
+      </a:lnRef>
+      <a:fillRef idx="1">
+        <a:scrgbClr r="0" g="0" b="0"/>
+      </a:fillRef>
+      <a:effectRef idx="0">
+        <a:scrgbClr r="0" g="0" b="0"/>
+      </a:effectRef>
+      <a:fontRef idx="minor"/>
+    </dgm:style>
+  </dgm:styleLbl>
+  <dgm:styleLbl name="asst0">
+    <dgm:scene3d>
+      <a:camera prst="orthographicFront"/>
+      <a:lightRig rig="threePt" dir="t"/>
+    </dgm:scene3d>
+    <dgm:sp3d/>
+    <dgm:txPr/>
+    <dgm:style>
+      <a:lnRef idx="2">
+        <a:scrgbClr r="0" g="0" b="0"/>
+      </a:lnRef>
+      <a:fillRef idx="1">
+        <a:scrgbClr r="0" g="0" b="0"/>
+      </a:fillRef>
+      <a:effectRef idx="0">
+        <a:scrgbClr r="0" g="0" b="0"/>
+      </a:effectRef>
+      <a:fontRef idx="minor">
+        <a:schemeClr val="lt1"/>
+      </a:fontRef>
+    </dgm:style>
+  </dgm:styleLbl>
+  <dgm:styleLbl name="asst1">
+    <dgm:scene3d>
+      <a:camera prst="orthographicFront"/>
+      <a:lightRig rig="threePt" dir="t"/>
+    </dgm:scene3d>
+    <dgm:sp3d/>
+    <dgm:txPr/>
+    <dgm:style>
+      <a:lnRef idx="2">
+        <a:scrgbClr r="0" g="0" b="0"/>
+      </a:lnRef>
+      <a:fillRef idx="1">
+        <a:scrgbClr r="0" g="0" b="0"/>
+      </a:fillRef>
+      <a:effectRef idx="0">
+        <a:scrgbClr r="0" g="0" b="0"/>
+      </a:effectRef>
+      <a:fontRef idx="minor">
+        <a:schemeClr val="lt1"/>
+      </a:fontRef>
+    </dgm:style>
+  </dgm:styleLbl>
+  <dgm:styleLbl name="asst2">
+    <dgm:scene3d>
+      <a:camera prst="orthographicFront"/>
+      <a:lightRig rig="threePt" dir="t"/>
+    </dgm:scene3d>
+    <dgm:sp3d/>
+    <dgm:txPr/>
+    <dgm:style>
+      <a:lnRef idx="2">
+        <a:scrgbClr r="0" g="0" b="0"/>
+      </a:lnRef>
+      <a:fillRef idx="1">
+        <a:scrgbClr r="0" g="0" b="0"/>
+      </a:fillRef>
+      <a:effectRef idx="0">
+        <a:scrgbClr r="0" g="0" b="0"/>
+      </a:effectRef>
+      <a:fontRef idx="minor">
+        <a:schemeClr val="lt1"/>
+      </a:fontRef>
+    </dgm:style>
+  </dgm:styleLbl>
+  <dgm:styleLbl name="asst3">
+    <dgm:scene3d>
+      <a:camera prst="orthographicFront"/>
+      <a:lightRig rig="threePt" dir="t"/>
+    </dgm:scene3d>
+    <dgm:sp3d/>
+    <dgm:txPr/>
+    <dgm:style>
+      <a:lnRef idx="2">
+        <a:scrgbClr r="0" g="0" b="0"/>
+      </a:lnRef>
+      <a:fillRef idx="1">
+        <a:scrgbClr r="0" g="0" b="0"/>
+      </a:fillRef>
+      <a:effectRef idx="0">
+        <a:scrgbClr r="0" g="0" b="0"/>
+      </a:effectRef>
+      <a:fontRef idx="minor">
+        <a:schemeClr val="lt1"/>
+      </a:fontRef>
+    </dgm:style>
+  </dgm:styleLbl>
+  <dgm:styleLbl name="asst4">
+    <dgm:scene3d>
+      <a:camera prst="orthographicFront"/>
+      <a:lightRig rig="threePt" dir="t"/>
+    </dgm:scene3d>
+    <dgm:sp3d/>
+    <dgm:txPr/>
+    <dgm:style>
+      <a:lnRef idx="2">
+        <a:scrgbClr r="0" g="0" b="0"/>
+      </a:lnRef>
+      <a:fillRef idx="1">
+        <a:scrgbClr r="0" g="0" b="0"/>
+      </a:fillRef>
+      <a:effectRef idx="0">
+        <a:scrgbClr r="0" g="0" b="0"/>
+      </a:effectRef>
+      <a:fontRef idx="minor">
+        <a:schemeClr val="lt1"/>
+      </a:fontRef>
+    </dgm:style>
+  </dgm:styleLbl>
+  <dgm:styleLbl name="parChTrans2D1">
+    <dgm:scene3d>
+      <a:camera prst="orthographicFront"/>
+      <a:lightRig rig="threePt" dir="t"/>
+    </dgm:scene3d>
+    <dgm:sp3d/>
+    <dgm:txPr/>
+    <dgm:style>
+      <a:lnRef idx="2">
+        <a:scrgbClr r="0" g="0" b="0"/>
+      </a:lnRef>
+      <a:fillRef idx="1">
+        <a:scrgbClr r="0" g="0" b="0"/>
+      </a:fillRef>
+      <a:effectRef idx="0">
+        <a:scrgbClr r="0" g="0" b="0"/>
+      </a:effectRef>
+      <a:fontRef idx="minor">
+        <a:schemeClr val="lt1"/>
+      </a:fontRef>
+    </dgm:style>
+  </dgm:styleLbl>
+  <dgm:styleLbl name="parChTrans2D2">
+    <dgm:scene3d>
+      <a:camera prst="orthographicFront"/>
+      <a:lightRig rig="threePt" dir="t"/>
+    </dgm:scene3d>
+    <dgm:sp3d/>
+    <dgm:txPr/>
+    <dgm:style>
+      <a:lnRef idx="2">
+        <a:scrgbClr r="0" g="0" b="0"/>
+      </a:lnRef>
+      <a:fillRef idx="1">
+        <a:scrgbClr r="0" g="0" b="0"/>
+      </a:fillRef>
+      <a:effectRef idx="0">
+        <a:scrgbClr r="0" g="0" b="0"/>
+      </a:effectRef>
+      <a:fontRef idx="minor">
+        <a:schemeClr val="lt1"/>
+      </a:fontRef>
+    </dgm:style>
+  </dgm:styleLbl>
+  <dgm:styleLbl name="parChTrans2D3">
+    <dgm:scene3d>
+      <a:camera prst="orthographicFront"/>
+      <a:lightRig rig="threePt" dir="t"/>
+    </dgm:scene3d>
+    <dgm:sp3d/>
+    <dgm:txPr/>
+    <dgm:style>
+      <a:lnRef idx="2">
+        <a:scrgbClr r="0" g="0" b="0"/>
+      </a:lnRef>
+      <a:fillRef idx="1">
+        <a:scrgbClr r="0" g="0" b="0"/>
+      </a:fillRef>
+      <a:effectRef idx="0">
+        <a:scrgbClr r="0" g="0" b="0"/>
+      </a:effectRef>
+      <a:fontRef idx="minor">
+        <a:schemeClr val="lt1"/>
+      </a:fontRef>
+    </dgm:style>
+  </dgm:styleLbl>
+  <dgm:styleLbl name="parChTrans2D4">
+    <dgm:scene3d>
+      <a:camera prst="orthographicFront"/>
+      <a:lightRig rig="threePt" dir="t"/>
+    </dgm:scene3d>
+    <dgm:sp3d/>
+    <dgm:txPr/>
+    <dgm:style>
+      <a:lnRef idx="2">
+        <a:scrgbClr r="0" g="0" b="0"/>
+      </a:lnRef>
+      <a:fillRef idx="1">
+        <a:scrgbClr r="0" g="0" b="0"/>
+      </a:fillRef>
+      <a:effectRef idx="0">
+        <a:scrgbClr r="0" g="0" b="0"/>
+      </a:effectRef>
+      <a:fontRef idx="minor">
+        <a:schemeClr val="lt1"/>
+      </a:fontRef>
+    </dgm:style>
+  </dgm:styleLbl>
+  <dgm:styleLbl name="parChTrans1D1">
+    <dgm:scene3d>
+      <a:camera prst="orthographicFront"/>
+      <a:lightRig rig="threePt" dir="t"/>
+    </dgm:scene3d>
+    <dgm:sp3d/>
+    <dgm:txPr/>
+    <dgm:style>
+      <a:lnRef idx="2">
+        <a:scrgbClr r="0" g="0" b="0"/>
+      </a:lnRef>
+      <a:fillRef idx="0">
+        <a:scrgbClr r="0" g="0" b="0"/>
+      </a:fillRef>
+      <a:effectRef idx="0">
+        <a:scrgbClr r="0" g="0" b="0"/>
+      </a:effectRef>
+      <a:fontRef idx="minor"/>
+    </dgm:style>
+  </dgm:styleLbl>
+  <dgm:styleLbl name="parChTrans1D2">
+    <dgm:scene3d>
+      <a:camera prst="orthographicFront"/>
+      <a:lightRig rig="threePt" dir="t"/>
+    </dgm:scene3d>
+    <dgm:sp3d/>
+    <dgm:txPr/>
+    <dgm:style>
+      <a:lnRef idx="2">
+        <a:scrgbClr r="0" g="0" b="0"/>
+      </a:lnRef>
+      <a:fillRef idx="0">
+        <a:scrgbClr r="0" g="0" b="0"/>
+      </a:fillRef>
+      <a:effectRef idx="0">
+        <a:scrgbClr r="0" g="0" b="0"/>
+      </a:effectRef>
+      <a:fontRef idx="minor"/>
+    </dgm:style>
+  </dgm:styleLbl>
+  <dgm:styleLbl name="parChTrans1D3">
+    <dgm:scene3d>
+      <a:camera prst="orthographicFront"/>
+      <a:lightRig rig="threePt" dir="t"/>
+    </dgm:scene3d>
+    <dgm:sp3d/>
+    <dgm:txPr/>
+    <dgm:style>
+      <a:lnRef idx="2">
+        <a:scrgbClr r="0" g="0" b="0"/>
+      </a:lnRef>
+      <a:fillRef idx="0">
+        <a:scrgbClr r="0" g="0" b="0"/>
+      </a:fillRef>
+      <a:effectRef idx="0">
+        <a:scrgbClr r="0" g="0" b="0"/>
+      </a:effectRef>
+      <a:fontRef idx="minor"/>
+    </dgm:style>
+  </dgm:styleLbl>
+  <dgm:styleLbl name="parChTrans1D4">
+    <dgm:scene3d>
+      <a:camera prst="orthographicFront"/>
+      <a:lightRig rig="threePt" dir="t"/>
+    </dgm:scene3d>
+    <dgm:sp3d/>
+    <dgm:txPr/>
+    <dgm:style>
+      <a:lnRef idx="2">
+        <a:scrgbClr r="0" g="0" b="0"/>
+      </a:lnRef>
+      <a:fillRef idx="0">
+        <a:scrgbClr r="0" g="0" b="0"/>
+      </a:fillRef>
+      <a:effectRef idx="0">
+        <a:scrgbClr r="0" g="0" b="0"/>
+      </a:effectRef>
+      <a:fontRef idx="minor"/>
+    </dgm:style>
+  </dgm:styleLbl>
+  <dgm:styleLbl name="fgAcc1">
+    <dgm:scene3d>
+      <a:camera prst="orthographicFront"/>
+      <a:lightRig rig="threePt" dir="t"/>
+    </dgm:scene3d>
+    <dgm:sp3d/>
+    <dgm:txPr/>
+    <dgm:style>
+      <a:lnRef idx="2">
+        <a:scrgbClr r="0" g="0" b="0"/>
+      </a:lnRef>
+      <a:fillRef idx="1">
+        <a:scrgbClr r="0" g="0" b="0"/>
+      </a:fillRef>
+      <a:effectRef idx="0">
+        <a:scrgbClr r="0" g="0" b="0"/>
+      </a:effectRef>
+      <a:fontRef idx="minor"/>
+    </dgm:style>
+  </dgm:styleLbl>
+  <dgm:styleLbl name="conFgAcc1">
+    <dgm:scene3d>
+      <a:camera prst="orthographicFront"/>
+      <a:lightRig rig="threePt" dir="t"/>
+    </dgm:scene3d>
+    <dgm:sp3d/>
+    <dgm:txPr/>
+    <dgm:style>
+      <a:lnRef idx="2">
+        <a:scrgbClr r="0" g="0" b="0"/>
+      </a:lnRef>
+      <a:fillRef idx="1">
+        <a:scrgbClr r="0" g="0" b="0"/>
+      </a:fillRef>
+      <a:effectRef idx="0">
+        <a:scrgbClr r="0" g="0" b="0"/>
+      </a:effectRef>
+      <a:fontRef idx="minor"/>
+    </dgm:style>
+  </dgm:styleLbl>
+  <dgm:styleLbl name="alignAcc1">
+    <dgm:scene3d>
+      <a:camera prst="orthographicFront"/>
+      <a:lightRig rig="threePt" dir="t"/>
+    </dgm:scene3d>
+    <dgm:sp3d/>
+    <dgm:txPr/>
+    <dgm:style>
+      <a:lnRef idx="2">
+        <a:scrgbClr r="0" g="0" b="0"/>
+      </a:lnRef>
+      <a:fillRef idx="1">
+        <a:scrgbClr r="0" g="0" b="0"/>
+      </a:fillRef>
+      <a:effectRef idx="0">
+        <a:scrgbClr r="0" g="0" b="0"/>
+      </a:effectRef>
+      <a:fontRef idx="minor"/>
+    </dgm:style>
+  </dgm:styleLbl>
+  <dgm:styleLbl name="trAlignAcc1">
+    <dgm:scene3d>
+      <a:camera prst="orthographicFront"/>
+      <a:lightRig rig="threePt" dir="t"/>
+    </dgm:scene3d>
+    <dgm:sp3d/>
+    <dgm:txPr/>
+    <dgm:style>
+      <a:lnRef idx="1">
+        <a:scrgbClr r="0" g="0" b="0"/>
+      </a:lnRef>
+      <a:fillRef idx="1">
+        <a:scrgbClr r="0" g="0" b="0"/>
+      </a:fillRef>
+      <a:effectRef idx="0">
+        <a:scrgbClr r="0" g="0" b="0"/>
+      </a:effectRef>
+      <a:fontRef idx="minor"/>
+    </dgm:style>
+  </dgm:styleLbl>
+  <dgm:styleLbl name="bgAcc1">
+    <dgm:scene3d>
+      <a:camera prst="orthographicFront"/>
+      <a:lightRig rig="threePt" dir="t"/>
+    </dgm:scene3d>
+    <dgm:sp3d/>
+    <dgm:txPr/>
+    <dgm:style>
+      <a:lnRef idx="2">
+        <a:scrgbClr r="0" g="0" b="0"/>
+      </a:lnRef>
+      <a:fillRef idx="1">
+        <a:scrgbClr r="0" g="0" b="0"/>
+      </a:fillRef>
+      <a:effectRef idx="0">
+        <a:scrgbClr r="0" g="0" b="0"/>
+      </a:effectRef>
+      <a:fontRef idx="minor"/>
+    </dgm:style>
+  </dgm:styleLbl>
+  <dgm:styleLbl name="solidFgAcc1">
+    <dgm:scene3d>
+      <a:camera prst="orthographicFront"/>
+      <a:lightRig rig="threePt" dir="t"/>
+    </dgm:scene3d>
+    <dgm:sp3d/>
+    <dgm:txPr/>
+    <dgm:style>
+      <a:lnRef idx="2">
+        <a:scrgbClr r="0" g="0" b="0"/>
+      </a:lnRef>
+      <a:fillRef idx="1">
+        <a:scrgbClr r="0" g="0" b="0"/>
+      </a:fillRef>
+      <a:effectRef idx="0">
+        <a:scrgbClr r="0" g="0" b="0"/>
+      </a:effectRef>
+      <a:fontRef idx="minor"/>
+    </dgm:style>
+  </dgm:styleLbl>
+  <dgm:styleLbl name="solidAlignAcc1">
+    <dgm:scene3d>
+      <a:camera prst="orthographicFront"/>
+      <a:lightRig rig="threePt" dir="t"/>
+    </dgm:scene3d>
+    <dgm:sp3d/>
+    <dgm:txPr/>
+    <dgm:style>
+      <a:lnRef idx="2">
+        <a:scrgbClr r="0" g="0" b="0"/>
+      </a:lnRef>
+      <a:fillRef idx="1">
+        <a:scrgbClr r="0" g="0" b="0"/>
+      </a:fillRef>
+      <a:effectRef idx="0">
+        <a:scrgbClr r="0" g="0" b="0"/>
+      </a:effectRef>
+      <a:fontRef idx="minor"/>
+    </dgm:style>
+  </dgm:styleLbl>
+  <dgm:styleLbl name="solidBgAcc1">
+    <dgm:scene3d>
+      <a:camera prst="orthographicFront"/>
+      <a:lightRig rig="threePt" dir="t"/>
+    </dgm:scene3d>
+    <dgm:sp3d/>
+    <dgm:txPr/>
+    <dgm:style>
+      <a:lnRef idx="2">
+        <a:scrgbClr r="0" g="0" b="0"/>
+      </a:lnRef>
+      <a:fillRef idx="1">
+        <a:scrgbClr r="0" g="0" b="0"/>
+      </a:fillRef>
+      <a:effectRef idx="0">
+        <a:scrgbClr r="0" g="0" b="0"/>
+      </a:effectRef>
+      <a:fontRef idx="minor"/>
+    </dgm:style>
+  </dgm:styleLbl>
+  <dgm:styleLbl name="fgAccFollowNode1">
+    <dgm:scene3d>
+      <a:camera prst="orthographicFront"/>
+      <a:lightRig rig="threePt" dir="t"/>
+    </dgm:scene3d>
+    <dgm:sp3d/>
+    <dgm:txPr/>
+    <dgm:style>
+      <a:lnRef idx="2">
+        <a:scrgbClr r="0" g="0" b="0"/>
+      </a:lnRef>
+      <a:fillRef idx="1">
+        <a:scrgbClr r="0" g="0" b="0"/>
+      </a:fillRef>
+      <a:effectRef idx="0">
+        <a:scrgbClr r="0" g="0" b="0"/>
+      </a:effectRef>
+      <a:fontRef idx="minor"/>
+    </dgm:style>
+  </dgm:styleLbl>
+  <dgm:styleLbl name="alignAccFollowNode1">
+    <dgm:scene3d>
+      <a:camera prst="orthographicFront"/>
+      <a:lightRig rig="threePt" dir="t"/>
+    </dgm:scene3d>
+    <dgm:sp3d/>
+    <dgm:txPr/>
+    <dgm:style>
+      <a:lnRef idx="2">
+        <a:scrgbClr r="0" g="0" b="0"/>
+      </a:lnRef>
+      <a:fillRef idx="1">
+        <a:scrgbClr r="0" g="0" b="0"/>
+      </a:fillRef>
+      <a:effectRef idx="0">
+        <a:scrgbClr r="0" g="0" b="0"/>
+      </a:effectRef>
+      <a:fontRef idx="minor"/>
+    </dgm:style>
+  </dgm:styleLbl>
+  <dgm:styleLbl name="bgAccFollowNode1">
+    <dgm:scene3d>
+      <a:camera prst="orthographicFront"/>
+      <a:lightRig rig="threePt" dir="t"/>
+    </dgm:scene3d>
+    <dgm:sp3d/>
+    <dgm:txPr/>
+    <dgm:style>
+      <a:lnRef idx="2">
+        <a:scrgbClr r="0" g="0" b="0"/>
+      </a:lnRef>
+      <a:fillRef idx="1">
+        <a:scrgbClr r="0" g="0" b="0"/>
+      </a:fillRef>
+      <a:effectRef idx="0">
+        <a:scrgbClr r="0" g="0" b="0"/>
+      </a:effectRef>
+      <a:fontRef idx="minor"/>
+    </dgm:style>
+  </dgm:styleLbl>
+  <dgm:styleLbl name="fgAcc0">
+    <dgm:scene3d>
+      <a:camera prst="orthographicFront"/>
+      <a:lightRig rig="threePt" dir="t"/>
+    </dgm:scene3d>
+    <dgm:sp3d/>
+    <dgm:txPr/>
+    <dgm:style>
+      <a:lnRef idx="2">
+        <a:scrgbClr r="0" g="0" b="0"/>
+      </a:lnRef>
+      <a:fillRef idx="1">
+        <a:scrgbClr r="0" g="0" b="0"/>
+      </a:fillRef>
+      <a:effectRef idx="0">
+        <a:scrgbClr r="0" g="0" b="0"/>
+      </a:effectRef>
+      <a:fontRef idx="minor"/>
+    </dgm:style>
+  </dgm:styleLbl>
+  <dgm:styleLbl name="fgAcc2">
+    <dgm:scene3d>
+      <a:camera prst="orthographicFront"/>
+      <a:lightRig rig="threePt" dir="t"/>
+    </dgm:scene3d>
+    <dgm:sp3d/>
+    <dgm:txPr/>
+    <dgm:style>
+      <a:lnRef idx="2">
+        <a:scrgbClr r="0" g="0" b="0"/>
+      </a:lnRef>
+      <a:fillRef idx="1">
+        <a:scrgbClr r="0" g="0" b="0"/>
+      </a:fillRef>
+      <a:effectRef idx="0">
+        <a:scrgbClr r="0" g="0" b="0"/>
+      </a:effectRef>
+      <a:fontRef idx="minor"/>
+    </dgm:style>
+  </dgm:styleLbl>
+  <dgm:styleLbl name="fgAcc3">
+    <dgm:scene3d>
+      <a:camera prst="orthographicFront"/>
+      <a:lightRig rig="threePt" dir="t"/>
+    </dgm:scene3d>
+    <dgm:sp3d/>
+    <dgm:txPr/>
+    <dgm:style>
+      <a:lnRef idx="2">
+        <a:scrgbClr r="0" g="0" b="0"/>
+      </a:lnRef>
+      <a:fillRef idx="1">
+        <a:scrgbClr r="0" g="0" b="0"/>
+      </a:fillRef>
+      <a:effectRef idx="0">
+        <a:scrgbClr r="0" g="0" b="0"/>
+      </a:effectRef>
+      <a:fontRef idx="minor"/>
+    </dgm:style>
+  </dgm:styleLbl>
+  <dgm:styleLbl name="fgAcc4">
+    <dgm:scene3d>
+      <a:camera prst="orthographicFront"/>
+      <a:lightRig rig="threePt" dir="t"/>
+    </dgm:scene3d>
+    <dgm:sp3d/>
+    <dgm:txPr/>
+    <dgm:style>
+      <a:lnRef idx="2">
+        <a:scrgbClr r="0" g="0" b="0"/>
+      </a:lnRef>
+      <a:fillRef idx="1">
+        <a:scrgbClr r="0" g="0" b="0"/>
+      </a:fillRef>
+      <a:effectRef idx="0">
+        <a:scrgbClr r="0" g="0" b="0"/>
+      </a:effectRef>
+      <a:fontRef idx="minor"/>
+    </dgm:style>
+  </dgm:styleLbl>
+  <dgm:styleLbl name="bgShp">
+    <dgm:scene3d>
+      <a:camera prst="orthographicFront"/>
+      <a:lightRig rig="threePt" dir="t"/>
+    </dgm:scene3d>
+    <dgm:sp3d/>
+    <dgm:txPr/>
+    <dgm:style>
+      <a:lnRef idx="0">
+        <a:scrgbClr r="0" g="0" b="0"/>
+      </a:lnRef>
+      <a:fillRef idx="1">
+        <a:scrgbClr r="0" g="0" b="0"/>
+      </a:fillRef>
+      <a:effectRef idx="0">
+        <a:scrgbClr r="0" g="0" b="0"/>
+      </a:effectRef>
+      <a:fontRef idx="minor"/>
+    </dgm:style>
+  </dgm:styleLbl>
+  <dgm:styleLbl name="dkBgShp">
+    <dgm:scene3d>
+      <a:camera prst="orthographicFront"/>
+      <a:lightRig rig="threePt" dir="t"/>
+    </dgm:scene3d>
+    <dgm:sp3d/>
+    <dgm:txPr/>
+    <dgm:style>
+      <a:lnRef idx="0">
+        <a:scrgbClr r="0" g="0" b="0"/>
+      </a:lnRef>
+      <a:fillRef idx="1">
+        <a:scrgbClr r="0" g="0" b="0"/>
+      </a:fillRef>
+      <a:effectRef idx="0">
+        <a:scrgbClr r="0" g="0" b="0"/>
+      </a:effectRef>
+      <a:fontRef idx="minor"/>
+    </dgm:style>
+  </dgm:styleLbl>
+  <dgm:styleLbl name="trBgShp">
+    <dgm:scene3d>
+      <a:camera prst="orthographicFront"/>
+      <a:lightRig rig="threePt" dir="t"/>
+    </dgm:scene3d>
+    <dgm:sp3d/>
+    <dgm:txPr/>
+    <dgm:style>
+      <a:lnRef idx="0">
+        <a:scrgbClr r="0" g="0" b="0"/>
+      </a:lnRef>
+      <a:fillRef idx="1">
+        <a:scrgbClr r="0" g="0" b="0"/>
+      </a:fillRef>
+      <a:effectRef idx="0">
+        <a:scrgbClr r="0" g="0" b="0"/>
+      </a:effectRef>
+      <a:fontRef idx="minor"/>
+    </dgm:style>
+  </dgm:styleLbl>
+  <dgm:styleLbl name="fgShp">
+    <dgm:scene3d>
+      <a:camera prst="orthographicFront"/>
+      <a:lightRig rig="threePt" dir="t"/>
+    </dgm:scene3d>
+    <dgm:sp3d/>
+    <dgm:txPr/>
+    <dgm:style>
+      <a:lnRef idx="2">
+        <a:scrgbClr r="0" g="0" b="0"/>
+      </a:lnRef>
+      <a:fillRef idx="1">
+        <a:scrgbClr r="0" g="0" b="0"/>
+      </a:fillRef>
+      <a:effectRef idx="0">
+        <a:scrgbClr r="0" g="0" b="0"/>
+      </a:effectRef>
+      <a:fontRef idx="minor"/>
+    </dgm:style>
+  </dgm:styleLbl>
+  <dgm:styleLbl name="revTx">
+    <dgm:scene3d>
+      <a:camera prst="orthographicFront"/>
+      <a:lightRig rig="threePt" dir="t"/>
+    </dgm:scene3d>
+    <dgm:sp3d/>
+    <dgm:txPr/>
+    <dgm:style>
+      <a:lnRef idx="0">
+        <a:scrgbClr r="0" g="0" b="0"/>
+      </a:lnRef>
+      <a:fillRef idx="0">
+        <a:scrgbClr r="0" g="0" b="0"/>
+      </a:fillRef>
+      <a:effectRef idx="0">
+        <a:scrgbClr r="0" g="0" b="0"/>
+      </a:effectRef>
+      <a:fontRef idx="minor"/>
+    </dgm:style>
+  </dgm:styleLbl>
+</dgm:styleDef>
+</file>
+
 <file path=ppt/slideLayouts/slideLayout1.xml><?xml version="1.0" encoding="utf-8"?>
 <p:sldLayout xmlns:a="http://schemas.openxmlformats.org/drawingml/2006/main" xmlns:r="http://schemas.openxmlformats.org/officeDocument/2006/relationships" xmlns:p="http://schemas.openxmlformats.org/presentationml/2006/main" type="title" preserve="1">
   <p:cSld name="Title Slide">
@@ -303,7 +3241,7 @@
             <a:fld id="{B61BEF0D-F0BB-DE4B-95CE-6DB70DBA9567}" type="datetimeFigureOut">
               <a:rPr lang="en-US" smtClean="0"/>
               <a:pPr/>
-              <a:t>4/14/2021</a:t>
+              <a:t>4/15/2021</a:t>
             </a:fld>
             <a:endParaRPr lang="en-US" dirty="0"/>
           </a:p>
@@ -603,7 +3541,7 @@
             <a:fld id="{B61BEF0D-F0BB-DE4B-95CE-6DB70DBA9567}" type="datetimeFigureOut">
               <a:rPr lang="en-US" smtClean="0"/>
               <a:pPr/>
-              <a:t>4/14/2021</a:t>
+              <a:t>4/15/2021</a:t>
             </a:fld>
             <a:endParaRPr lang="en-US" dirty="0"/>
           </a:p>
@@ -797,7 +3735,7 @@
             <a:fld id="{B61BEF0D-F0BB-DE4B-95CE-6DB70DBA9567}" type="datetimeFigureOut">
               <a:rPr lang="en-US" smtClean="0"/>
               <a:pPr/>
-              <a:t>4/14/2021</a:t>
+              <a:t>4/15/2021</a:t>
             </a:fld>
             <a:endParaRPr lang="en-US" dirty="0"/>
           </a:p>
@@ -1060,7 +3998,7 @@
             <a:fld id="{B61BEF0D-F0BB-DE4B-95CE-6DB70DBA9567}" type="datetimeFigureOut">
               <a:rPr lang="en-US" smtClean="0"/>
               <a:pPr/>
-              <a:t>4/14/2021</a:t>
+              <a:t>4/15/2021</a:t>
             </a:fld>
             <a:endParaRPr lang="en-US" dirty="0"/>
           </a:p>
@@ -1486,7 +4424,7 @@
             <a:fld id="{B61BEF0D-F0BB-DE4B-95CE-6DB70DBA9567}" type="datetimeFigureOut">
               <a:rPr lang="en-US" smtClean="0"/>
               <a:pPr/>
-              <a:t>4/14/2021</a:t>
+              <a:t>4/15/2021</a:t>
             </a:fld>
             <a:endParaRPr lang="en-US" dirty="0"/>
           </a:p>
@@ -2025,7 +4963,7 @@
             <a:fld id="{B61BEF0D-F0BB-DE4B-95CE-6DB70DBA9567}" type="datetimeFigureOut">
               <a:rPr lang="en-US" smtClean="0"/>
               <a:pPr/>
-              <a:t>4/14/2021</a:t>
+              <a:t>4/15/2021</a:t>
             </a:fld>
             <a:endParaRPr lang="en-US" dirty="0"/>
           </a:p>
@@ -2891,7 +5829,7 @@
             <a:fld id="{B61BEF0D-F0BB-DE4B-95CE-6DB70DBA9567}" type="datetimeFigureOut">
               <a:rPr lang="en-US" smtClean="0"/>
               <a:pPr/>
-              <a:t>4/14/2021</a:t>
+              <a:t>4/15/2021</a:t>
             </a:fld>
             <a:endParaRPr lang="en-US" dirty="0"/>
           </a:p>
@@ -3063,7 +6001,7 @@
             <a:fld id="{B61BEF0D-F0BB-DE4B-95CE-6DB70DBA9567}" type="datetimeFigureOut">
               <a:rPr lang="en-US" smtClean="0"/>
               <a:pPr/>
-              <a:t>4/14/2021</a:t>
+              <a:t>4/15/2021</a:t>
             </a:fld>
             <a:endParaRPr lang="en-US" dirty="0"/>
           </a:p>
@@ -3249,7 +6187,7 @@
             <a:fld id="{B61BEF0D-F0BB-DE4B-95CE-6DB70DBA9567}" type="datetimeFigureOut">
               <a:rPr lang="en-US" smtClean="0"/>
               <a:pPr/>
-              <a:t>4/14/2021</a:t>
+              <a:t>4/15/2021</a:t>
             </a:fld>
             <a:endParaRPr lang="en-US" dirty="0"/>
           </a:p>
@@ -3421,7 +6359,7 @@
             <a:fld id="{B61BEF0D-F0BB-DE4B-95CE-6DB70DBA9567}" type="datetimeFigureOut">
               <a:rPr lang="en-US" smtClean="0"/>
               <a:pPr/>
-              <a:t>4/14/2021</a:t>
+              <a:t>4/15/2021</a:t>
             </a:fld>
             <a:endParaRPr lang="en-US" dirty="0"/>
           </a:p>
@@ -3667,7 +6605,7 @@
             <a:fld id="{B61BEF0D-F0BB-DE4B-95CE-6DB70DBA9567}" type="datetimeFigureOut">
               <a:rPr lang="en-US" smtClean="0"/>
               <a:pPr/>
-              <a:t>4/14/2021</a:t>
+              <a:t>4/15/2021</a:t>
             </a:fld>
             <a:endParaRPr lang="en-US" dirty="0"/>
           </a:p>
@@ -3905,7 +6843,7 @@
             <a:fld id="{B61BEF0D-F0BB-DE4B-95CE-6DB70DBA9567}" type="datetimeFigureOut">
               <a:rPr lang="en-US" smtClean="0"/>
               <a:pPr/>
-              <a:t>4/14/2021</a:t>
+              <a:t>4/15/2021</a:t>
             </a:fld>
             <a:endParaRPr lang="en-US" dirty="0"/>
           </a:p>
@@ -4373,7 +7311,7 @@
             <a:fld id="{B61BEF0D-F0BB-DE4B-95CE-6DB70DBA9567}" type="datetimeFigureOut">
               <a:rPr lang="en-US" smtClean="0"/>
               <a:pPr/>
-              <a:t>4/14/2021</a:t>
+              <a:t>4/15/2021</a:t>
             </a:fld>
             <a:endParaRPr lang="en-US" dirty="0"/>
           </a:p>
@@ -4493,7 +7431,7 @@
             <a:fld id="{B61BEF0D-F0BB-DE4B-95CE-6DB70DBA9567}" type="datetimeFigureOut">
               <a:rPr lang="en-US" smtClean="0"/>
               <a:pPr/>
-              <a:t>4/14/2021</a:t>
+              <a:t>4/15/2021</a:t>
             </a:fld>
             <a:endParaRPr lang="en-US" dirty="0"/>
           </a:p>
@@ -4590,7 +7528,7 @@
             <a:fld id="{B61BEF0D-F0BB-DE4B-95CE-6DB70DBA9567}" type="datetimeFigureOut">
               <a:rPr lang="en-US" smtClean="0"/>
               <a:pPr/>
-              <a:t>4/14/2021</a:t>
+              <a:t>4/15/2021</a:t>
             </a:fld>
             <a:endParaRPr lang="en-US" dirty="0"/>
           </a:p>
@@ -4847,7 +7785,7 @@
             <a:fld id="{B61BEF0D-F0BB-DE4B-95CE-6DB70DBA9567}" type="datetimeFigureOut">
               <a:rPr lang="en-US" smtClean="0"/>
               <a:pPr/>
-              <a:t>4/14/2021</a:t>
+              <a:t>4/15/2021</a:t>
             </a:fld>
             <a:endParaRPr lang="en-US" dirty="0"/>
           </a:p>
@@ -5149,7 +8087,7 @@
             <a:fld id="{B61BEF0D-F0BB-DE4B-95CE-6DB70DBA9567}" type="datetimeFigureOut">
               <a:rPr lang="en-US" smtClean="0"/>
               <a:pPr/>
-              <a:t>4/14/2021</a:t>
+              <a:t>4/15/2021</a:t>
             </a:fld>
             <a:endParaRPr lang="en-US" dirty="0"/>
           </a:p>
@@ -5385,7 +8323,7 @@
             <a:fld id="{B61BEF0D-F0BB-DE4B-95CE-6DB70DBA9567}" type="datetimeFigureOut">
               <a:rPr lang="en-US" smtClean="0"/>
               <a:pPr/>
-              <a:t>4/14/2021</a:t>
+              <a:t>4/15/2021</a:t>
             </a:fld>
             <a:endParaRPr lang="en-US" dirty="0"/>
           </a:p>
@@ -6162,7 +9100,7 @@
           <p:cNvPr id="2" name="Title 1">
             <a:extLst>
               <a:ext uri="{FF2B5EF4-FFF2-40B4-BE49-F238E27FC236}">
-                <a16:creationId xmlns:a16="http://schemas.microsoft.com/office/drawing/2014/main" id="{FA2F9C89-FC1C-4DC8-9424-2117A63F85AA}"/>
+                <a16:creationId xmlns:a16="http://schemas.microsoft.com/office/drawing/2014/main" id="{039D511E-E0DE-46F8-8423-D6BC944A7EA0}"/>
               </a:ext>
             </a:extLst>
           </p:cNvPr>
@@ -6175,14 +9113,12 @@
         </p:nvSpPr>
         <p:spPr/>
         <p:txBody>
-          <a:bodyPr>
-            <a:normAutofit/>
-          </a:bodyPr>
+          <a:bodyPr/>
           <a:lstStyle/>
           <a:p>
             <a:r>
-              <a:rPr lang="en-IN" sz="4400" dirty="0"/>
-              <a:t>Research And References </a:t>
+              <a:rPr lang="en-IN" dirty="0"/>
+              <a:t>Description : </a:t>
             </a:r>
           </a:p>
         </p:txBody>
@@ -6192,7 +9128,7 @@
           <p:cNvPr id="3" name="Content Placeholder 2">
             <a:extLst>
               <a:ext uri="{FF2B5EF4-FFF2-40B4-BE49-F238E27FC236}">
-                <a16:creationId xmlns:a16="http://schemas.microsoft.com/office/drawing/2014/main" id="{FE5F54A0-4AB4-46A6-A123-D7953C67BC05}"/>
+                <a16:creationId xmlns:a16="http://schemas.microsoft.com/office/drawing/2014/main" id="{1BBEA56D-0F45-4D73-8657-3DFB08181EDA}"/>
               </a:ext>
             </a:extLst>
           </p:cNvPr>
@@ -6203,96 +9139,610 @@
             <p:ph idx="1"/>
           </p:nvPr>
         </p:nvSpPr>
-        <p:spPr/>
+        <p:spPr>
+          <a:xfrm>
+            <a:off x="913795" y="2494625"/>
+            <a:ext cx="6135075" cy="3296575"/>
+          </a:xfrm>
+        </p:spPr>
         <p:txBody>
           <a:bodyPr>
             <a:normAutofit/>
           </a:bodyPr>
           <a:lstStyle/>
           <a:p>
-            <a:pPr marL="0" indent="0">
-              <a:buNone/>
-            </a:pPr>
-            <a:endParaRPr lang="en-US" sz="2400" dirty="0"/>
-          </a:p>
-          <a:p>
             <a:r>
-              <a:rPr lang="en-US" sz="2400" dirty="0"/>
-              <a:t>man page of vim text editor.</a:t>
+              <a:rPr lang="en-IN" sz="2400" dirty="0"/>
+              <a:t>A C Based Text Editor built with NCURSES library.</a:t>
             </a:r>
           </a:p>
           <a:p>
             <a:r>
-              <a:rPr lang="en-US" sz="2400" dirty="0"/>
-              <a:t>man page of </a:t>
+              <a:rPr lang="en-IN" sz="2400" dirty="0"/>
+              <a:t>Data Structure used :  </a:t>
             </a:r>
             <a:r>
-              <a:rPr lang="en-US" sz="2400" dirty="0" err="1"/>
-              <a:t>ncurses</a:t>
+              <a:rPr lang="en-IN" sz="2400" dirty="0">
+                <a:solidFill>
+                  <a:srgbClr val="FFC000"/>
+                </a:solidFill>
+              </a:rPr>
+              <a:t>Doubly linked list </a:t>
             </a:r>
             <a:r>
-              <a:rPr lang="en-US" sz="2400" dirty="0"/>
-              <a:t> library</a:t>
+              <a:rPr lang="en-IN" sz="2400" dirty="0"/>
+              <a:t>of lines as a </a:t>
+            </a:r>
+            <a:r>
+              <a:rPr lang="en-IN" sz="2400" dirty="0">
+                <a:solidFill>
+                  <a:srgbClr val="FFC000"/>
+                </a:solidFill>
+              </a:rPr>
+              <a:t>Buffer </a:t>
             </a:r>
           </a:p>
           <a:p>
+            <a:pPr marL="36900" indent="0">
+              <a:buNone/>
+            </a:pPr>
+            <a:endParaRPr lang="en-IN" sz="2400" dirty="0">
+              <a:solidFill>
+                <a:srgbClr val="FFC000"/>
+              </a:solidFill>
+            </a:endParaRPr>
+          </a:p>
+          <a:p>
+            <a:endParaRPr lang="en-IN" dirty="0"/>
+          </a:p>
+        </p:txBody>
+      </p:sp>
+      <p:sp>
+        <p:nvSpPr>
+          <p:cNvPr id="5" name="TextBox 4">
+            <a:extLst>
+              <a:ext uri="{FF2B5EF4-FFF2-40B4-BE49-F238E27FC236}">
+                <a16:creationId xmlns:a16="http://schemas.microsoft.com/office/drawing/2014/main" id="{4232891F-B53E-4572-85D1-807F7732CA0A}"/>
+              </a:ext>
+            </a:extLst>
+          </p:cNvPr>
+          <p:cNvSpPr txBox="1"/>
+          <p:nvPr/>
+        </p:nvSpPr>
+        <p:spPr>
+          <a:xfrm>
+            <a:off x="7785717" y="2565647"/>
+            <a:ext cx="3755254" cy="3139321"/>
+          </a:xfrm>
+          <a:prstGeom prst="rect">
+            <a:avLst/>
+          </a:prstGeom>
+          <a:noFill/>
+        </p:spPr>
+        <p:txBody>
+          <a:bodyPr wrap="square" rtlCol="0">
+            <a:spAutoFit/>
+          </a:bodyPr>
+          <a:lstStyle/>
+          <a:p>
+            <a:pPr marL="36900" indent="0">
+              <a:buNone/>
+            </a:pPr>
             <a:r>
-              <a:rPr lang="en-US" sz="2400" dirty="0"/>
-              <a:t>An article on </a:t>
-            </a:r>
-            <a:r>
-              <a:rPr lang="en-US" sz="2400" dirty="0" err="1"/>
-              <a:t>ncurses</a:t>
-            </a:r>
-            <a:r>
-              <a:rPr lang="en-US" sz="2400" dirty="0"/>
-              <a:t> by X. Li.</a:t>
+              <a:rPr lang="en-US" b="0" dirty="0">
+                <a:solidFill>
+                  <a:srgbClr val="569CD6"/>
+                </a:solidFill>
+                <a:effectLst/>
+                <a:latin typeface="Consolas" panose="020B0609020204030204" pitchFamily="49" charset="0"/>
+              </a:rPr>
+              <a:t>Structure used : </a:t>
             </a:r>
           </a:p>
           <a:p>
-            <a:pPr algn="l"/>
+            <a:pPr marL="36900" indent="0">
+              <a:buNone/>
+            </a:pPr>
+            <a:endParaRPr lang="en-US" dirty="0">
+              <a:solidFill>
+                <a:srgbClr val="569CD6"/>
+              </a:solidFill>
+              <a:latin typeface="Consolas" panose="020B0609020204030204" pitchFamily="49" charset="0"/>
+            </a:endParaRPr>
+          </a:p>
+          <a:p>
+            <a:pPr marL="36900" indent="0">
+              <a:buNone/>
+            </a:pPr>
             <a:r>
-              <a:rPr lang="en-US" sz="2400" dirty="0"/>
-              <a:t>I found some of the blogs seems  to be useful to get basic idea. Ex- blog by Danial Wang. </a:t>
+              <a:rPr lang="en-US" b="0" dirty="0">
+                <a:solidFill>
+                  <a:srgbClr val="569CD6"/>
+                </a:solidFill>
+                <a:effectLst/>
+                <a:latin typeface="Consolas" panose="020B0609020204030204" pitchFamily="49" charset="0"/>
+              </a:rPr>
+              <a:t>typedef</a:t>
+            </a:r>
+            <a:r>
+              <a:rPr lang="en-US" b="0" dirty="0">
+                <a:solidFill>
+                  <a:srgbClr val="D4D4D4"/>
+                </a:solidFill>
+                <a:effectLst/>
+                <a:latin typeface="Consolas" panose="020B0609020204030204" pitchFamily="49" charset="0"/>
+              </a:rPr>
+              <a:t> </a:t>
+            </a:r>
+            <a:r>
+              <a:rPr lang="en-US" b="0" dirty="0">
+                <a:solidFill>
+                  <a:srgbClr val="569CD6"/>
+                </a:solidFill>
+                <a:effectLst/>
+                <a:latin typeface="Consolas" panose="020B0609020204030204" pitchFamily="49" charset="0"/>
+              </a:rPr>
+              <a:t>struct</a:t>
+            </a:r>
+            <a:r>
+              <a:rPr lang="en-US" b="0" dirty="0">
+                <a:solidFill>
+                  <a:srgbClr val="D4D4D4"/>
+                </a:solidFill>
+                <a:effectLst/>
+                <a:latin typeface="Consolas" panose="020B0609020204030204" pitchFamily="49" charset="0"/>
+              </a:rPr>
+              <a:t> </a:t>
+            </a:r>
+            <a:r>
+              <a:rPr lang="en-US" b="0" dirty="0">
+                <a:solidFill>
+                  <a:srgbClr val="4EC9B0"/>
+                </a:solidFill>
+                <a:effectLst/>
+                <a:latin typeface="Consolas" panose="020B0609020204030204" pitchFamily="49" charset="0"/>
+              </a:rPr>
+              <a:t>buffer</a:t>
+            </a:r>
+            <a:r>
+              <a:rPr lang="en-US" b="0" dirty="0">
+                <a:solidFill>
+                  <a:srgbClr val="D4D4D4"/>
+                </a:solidFill>
+                <a:effectLst/>
+                <a:latin typeface="Consolas" panose="020B0609020204030204" pitchFamily="49" charset="0"/>
+              </a:rPr>
+              <a:t> {</a:t>
+            </a:r>
+            <a:br>
+              <a:rPr lang="en-US" b="0" dirty="0">
+                <a:solidFill>
+                  <a:srgbClr val="D4D4D4"/>
+                </a:solidFill>
+                <a:effectLst/>
+                <a:latin typeface="Consolas" panose="020B0609020204030204" pitchFamily="49" charset="0"/>
+              </a:rPr>
+            </a:br>
+            <a:r>
+              <a:rPr lang="en-US" b="0" dirty="0">
+                <a:solidFill>
+                  <a:srgbClr val="D4D4D4"/>
+                </a:solidFill>
+                <a:effectLst/>
+                <a:latin typeface="Consolas" panose="020B0609020204030204" pitchFamily="49" charset="0"/>
+              </a:rPr>
+              <a:t>    </a:t>
+            </a:r>
+            <a:r>
+              <a:rPr lang="en-US" b="0" dirty="0">
+                <a:solidFill>
+                  <a:srgbClr val="569CD6"/>
+                </a:solidFill>
+                <a:effectLst/>
+                <a:latin typeface="Consolas" panose="020B0609020204030204" pitchFamily="49" charset="0"/>
+              </a:rPr>
+              <a:t>int</a:t>
+            </a:r>
+            <a:r>
+              <a:rPr lang="en-US" b="0" dirty="0">
+                <a:solidFill>
+                  <a:srgbClr val="D4D4D4"/>
+                </a:solidFill>
+                <a:effectLst/>
+                <a:latin typeface="Consolas" panose="020B0609020204030204" pitchFamily="49" charset="0"/>
+              </a:rPr>
+              <a:t> </a:t>
+            </a:r>
+            <a:r>
+              <a:rPr lang="en-US" b="0" dirty="0" err="1">
+                <a:solidFill>
+                  <a:srgbClr val="9CDCFE"/>
+                </a:solidFill>
+                <a:effectLst/>
+                <a:latin typeface="Consolas" panose="020B0609020204030204" pitchFamily="49" charset="0"/>
+              </a:rPr>
+              <a:t>cur_line</a:t>
+            </a:r>
+            <a:r>
+              <a:rPr lang="en-US" b="0" dirty="0">
+                <a:solidFill>
+                  <a:srgbClr val="D4D4D4"/>
+                </a:solidFill>
+                <a:effectLst/>
+                <a:latin typeface="Consolas" panose="020B0609020204030204" pitchFamily="49" charset="0"/>
+              </a:rPr>
+              <a:t>;</a:t>
             </a:r>
           </a:p>
           <a:p>
-            <a:pPr algn="l"/>
+            <a:pPr marL="36900" indent="0">
+              <a:buNone/>
+            </a:pPr>
             <a:r>
-              <a:rPr lang="en-US" sz="2400" dirty="0"/>
-              <a:t>An information capsule on </a:t>
+              <a:rPr lang="en-US" b="0" dirty="0">
+                <a:solidFill>
+                  <a:srgbClr val="D4D4D4"/>
+                </a:solidFill>
+                <a:effectLst/>
+                <a:latin typeface="Consolas" panose="020B0609020204030204" pitchFamily="49" charset="0"/>
+              </a:rPr>
+              <a:t>    </a:t>
             </a:r>
             <a:r>
-              <a:rPr lang="en-US" sz="2400" dirty="0" err="1"/>
-              <a:t>curses.h</a:t>
+              <a:rPr lang="en-US" b="0" dirty="0">
+                <a:solidFill>
+                  <a:srgbClr val="569CD6"/>
+                </a:solidFill>
+                <a:effectLst/>
+                <a:latin typeface="Consolas" panose="020B0609020204030204" pitchFamily="49" charset="0"/>
+              </a:rPr>
+              <a:t>int</a:t>
             </a:r>
             <a:r>
-              <a:rPr lang="en-US" sz="2400" dirty="0"/>
-              <a:t> by The Open Group.</a:t>
-            </a:r>
-            <a:br>
-              <a:rPr lang="en-IN" sz="2400" b="0" i="0" u="none" strike="noStrike" dirty="0">
+              <a:rPr lang="en-US" b="0" dirty="0">
                 <a:solidFill>
-                  <a:srgbClr val="757575"/>
+                  <a:srgbClr val="D4D4D4"/>
                 </a:solidFill>
                 <a:effectLst/>
-                <a:latin typeface="Calisto MT (Body)"/>
-                <a:hlinkClick r:id="rId2"/>
+                <a:latin typeface="Consolas" panose="020B0609020204030204" pitchFamily="49" charset="0"/>
               </a:rPr>
-            </a:br>
-            <a:endParaRPr lang="en-US" sz="2400" dirty="0">
-              <a:latin typeface="Calisto MT (Body)"/>
-            </a:endParaRPr>
+              <a:t> </a:t>
+            </a:r>
+            <a:r>
+              <a:rPr lang="en-US" b="0" dirty="0" err="1">
+                <a:solidFill>
+                  <a:srgbClr val="9CDCFE"/>
+                </a:solidFill>
+                <a:effectLst/>
+                <a:latin typeface="Consolas" panose="020B0609020204030204" pitchFamily="49" charset="0"/>
+              </a:rPr>
+              <a:t>num_chars</a:t>
+            </a:r>
+            <a:r>
+              <a:rPr lang="en-US" b="0" dirty="0">
+                <a:solidFill>
+                  <a:srgbClr val="D4D4D4"/>
+                </a:solidFill>
+                <a:effectLst/>
+                <a:latin typeface="Consolas" panose="020B0609020204030204" pitchFamily="49" charset="0"/>
+              </a:rPr>
+              <a:t>;</a:t>
+            </a:r>
           </a:p>
           <a:p>
-            <a:endParaRPr lang="en-IN" sz="2400" dirty="0"/>
+            <a:pPr marL="36900" indent="0">
+              <a:buNone/>
+            </a:pPr>
+            <a:r>
+              <a:rPr lang="en-US" b="0" dirty="0">
+                <a:solidFill>
+                  <a:srgbClr val="D4D4D4"/>
+                </a:solidFill>
+                <a:effectLst/>
+                <a:latin typeface="Consolas" panose="020B0609020204030204" pitchFamily="49" charset="0"/>
+              </a:rPr>
+              <a:t>    </a:t>
+            </a:r>
+            <a:r>
+              <a:rPr lang="en-US" b="0" dirty="0">
+                <a:solidFill>
+                  <a:srgbClr val="569CD6"/>
+                </a:solidFill>
+                <a:effectLst/>
+                <a:latin typeface="Consolas" panose="020B0609020204030204" pitchFamily="49" charset="0"/>
+              </a:rPr>
+              <a:t>int</a:t>
+            </a:r>
+            <a:r>
+              <a:rPr lang="en-US" b="0" dirty="0">
+                <a:solidFill>
+                  <a:srgbClr val="D4D4D4"/>
+                </a:solidFill>
+                <a:effectLst/>
+                <a:latin typeface="Consolas" panose="020B0609020204030204" pitchFamily="49" charset="0"/>
+              </a:rPr>
+              <a:t> </a:t>
+            </a:r>
+            <a:r>
+              <a:rPr lang="en-US" b="0" dirty="0" err="1">
+                <a:solidFill>
+                  <a:srgbClr val="9CDCFE"/>
+                </a:solidFill>
+                <a:effectLst/>
+                <a:latin typeface="Consolas" panose="020B0609020204030204" pitchFamily="49" charset="0"/>
+              </a:rPr>
+              <a:t>cur_X</a:t>
+            </a:r>
+            <a:r>
+              <a:rPr lang="en-US" b="0" dirty="0">
+                <a:solidFill>
+                  <a:srgbClr val="D4D4D4"/>
+                </a:solidFill>
+                <a:effectLst/>
+                <a:latin typeface="Consolas" panose="020B0609020204030204" pitchFamily="49" charset="0"/>
+              </a:rPr>
+              <a:t>;</a:t>
+            </a:r>
+          </a:p>
+          <a:p>
+            <a:pPr marL="36900" indent="0">
+              <a:buNone/>
+            </a:pPr>
+            <a:r>
+              <a:rPr lang="en-US" b="0" dirty="0">
+                <a:solidFill>
+                  <a:srgbClr val="D4D4D4"/>
+                </a:solidFill>
+                <a:effectLst/>
+                <a:latin typeface="Consolas" panose="020B0609020204030204" pitchFamily="49" charset="0"/>
+              </a:rPr>
+              <a:t>    </a:t>
+            </a:r>
+            <a:r>
+              <a:rPr lang="en-US" b="0" dirty="0">
+                <a:solidFill>
+                  <a:srgbClr val="569CD6"/>
+                </a:solidFill>
+                <a:effectLst/>
+                <a:latin typeface="Consolas" panose="020B0609020204030204" pitchFamily="49" charset="0"/>
+              </a:rPr>
+              <a:t>char</a:t>
+            </a:r>
+            <a:r>
+              <a:rPr lang="en-US" b="0" dirty="0">
+                <a:solidFill>
+                  <a:srgbClr val="D4D4D4"/>
+                </a:solidFill>
+                <a:effectLst/>
+                <a:latin typeface="Consolas" panose="020B0609020204030204" pitchFamily="49" charset="0"/>
+              </a:rPr>
+              <a:t> *</a:t>
+            </a:r>
+            <a:r>
+              <a:rPr lang="en-US" b="0" dirty="0">
+                <a:solidFill>
+                  <a:srgbClr val="9CDCFE"/>
+                </a:solidFill>
+                <a:effectLst/>
+                <a:latin typeface="Consolas" panose="020B0609020204030204" pitchFamily="49" charset="0"/>
+              </a:rPr>
+              <a:t>line</a:t>
+            </a:r>
+            <a:r>
+              <a:rPr lang="en-US" b="0" dirty="0">
+                <a:solidFill>
+                  <a:srgbClr val="D4D4D4"/>
+                </a:solidFill>
+                <a:effectLst/>
+                <a:latin typeface="Consolas" panose="020B0609020204030204" pitchFamily="49" charset="0"/>
+              </a:rPr>
+              <a:t>;</a:t>
+            </a:r>
+          </a:p>
+          <a:p>
+            <a:pPr marL="36900" indent="0">
+              <a:buNone/>
+            </a:pPr>
+            <a:r>
+              <a:rPr lang="en-US" b="0" dirty="0">
+                <a:solidFill>
+                  <a:srgbClr val="569CD6"/>
+                </a:solidFill>
+                <a:effectLst/>
+                <a:latin typeface="Consolas" panose="020B0609020204030204" pitchFamily="49" charset="0"/>
+              </a:rPr>
+              <a:t>	 struct</a:t>
+            </a:r>
+            <a:r>
+              <a:rPr lang="en-US" b="0" dirty="0">
+                <a:solidFill>
+                  <a:srgbClr val="D4D4D4"/>
+                </a:solidFill>
+                <a:effectLst/>
+                <a:latin typeface="Consolas" panose="020B0609020204030204" pitchFamily="49" charset="0"/>
+              </a:rPr>
+              <a:t> </a:t>
+            </a:r>
+            <a:r>
+              <a:rPr lang="en-US" b="0" dirty="0">
+                <a:solidFill>
+                  <a:srgbClr val="4EC9B0"/>
+                </a:solidFill>
+                <a:effectLst/>
+                <a:latin typeface="Consolas" panose="020B0609020204030204" pitchFamily="49" charset="0"/>
+              </a:rPr>
+              <a:t>buffer</a:t>
+            </a:r>
+            <a:r>
+              <a:rPr lang="en-US" b="0" dirty="0">
+                <a:solidFill>
+                  <a:srgbClr val="D4D4D4"/>
+                </a:solidFill>
+                <a:effectLst/>
+                <a:latin typeface="Consolas" panose="020B0609020204030204" pitchFamily="49" charset="0"/>
+              </a:rPr>
+              <a:t> </a:t>
+            </a:r>
+            <a:r>
+              <a:rPr lang="en-US" b="0" dirty="0">
+                <a:solidFill>
+                  <a:srgbClr val="569CD6"/>
+                </a:solidFill>
+                <a:effectLst/>
+                <a:latin typeface="Consolas" panose="020B0609020204030204" pitchFamily="49" charset="0"/>
+              </a:rPr>
+              <a:t>*</a:t>
+            </a:r>
+            <a:r>
+              <a:rPr lang="en-US" b="0" dirty="0" err="1">
+                <a:solidFill>
+                  <a:srgbClr val="9CDCFE"/>
+                </a:solidFill>
+                <a:effectLst/>
+                <a:latin typeface="Consolas" panose="020B0609020204030204" pitchFamily="49" charset="0"/>
+              </a:rPr>
+              <a:t>prev</a:t>
+            </a:r>
+            <a:r>
+              <a:rPr lang="en-US" b="0" dirty="0">
+                <a:solidFill>
+                  <a:srgbClr val="D4D4D4"/>
+                </a:solidFill>
+                <a:effectLst/>
+                <a:latin typeface="Consolas" panose="020B0609020204030204" pitchFamily="49" charset="0"/>
+              </a:rPr>
+              <a:t>;</a:t>
+            </a:r>
+          </a:p>
+          <a:p>
+            <a:pPr marL="36900" indent="0">
+              <a:buNone/>
+            </a:pPr>
+            <a:r>
+              <a:rPr lang="en-US" b="0" dirty="0">
+                <a:solidFill>
+                  <a:srgbClr val="D4D4D4"/>
+                </a:solidFill>
+                <a:effectLst/>
+                <a:latin typeface="Consolas" panose="020B0609020204030204" pitchFamily="49" charset="0"/>
+              </a:rPr>
+              <a:t>    </a:t>
+            </a:r>
+            <a:r>
+              <a:rPr lang="en-US" b="0" dirty="0">
+                <a:solidFill>
+                  <a:srgbClr val="569CD6"/>
+                </a:solidFill>
+                <a:effectLst/>
+                <a:latin typeface="Consolas" panose="020B0609020204030204" pitchFamily="49" charset="0"/>
+              </a:rPr>
+              <a:t>struct</a:t>
+            </a:r>
+            <a:r>
+              <a:rPr lang="en-US" b="0" dirty="0">
+                <a:solidFill>
+                  <a:srgbClr val="D4D4D4"/>
+                </a:solidFill>
+                <a:effectLst/>
+                <a:latin typeface="Consolas" panose="020B0609020204030204" pitchFamily="49" charset="0"/>
+              </a:rPr>
+              <a:t> </a:t>
+            </a:r>
+            <a:r>
+              <a:rPr lang="en-US" b="0" dirty="0">
+                <a:solidFill>
+                  <a:srgbClr val="4EC9B0"/>
+                </a:solidFill>
+                <a:effectLst/>
+                <a:latin typeface="Consolas" panose="020B0609020204030204" pitchFamily="49" charset="0"/>
+              </a:rPr>
+              <a:t>buffer</a:t>
+            </a:r>
+            <a:r>
+              <a:rPr lang="en-US" b="0" dirty="0">
+                <a:solidFill>
+                  <a:srgbClr val="D4D4D4"/>
+                </a:solidFill>
+                <a:effectLst/>
+                <a:latin typeface="Consolas" panose="020B0609020204030204" pitchFamily="49" charset="0"/>
+              </a:rPr>
+              <a:t> </a:t>
+            </a:r>
+            <a:r>
+              <a:rPr lang="en-US" b="0" dirty="0">
+                <a:solidFill>
+                  <a:srgbClr val="569CD6"/>
+                </a:solidFill>
+                <a:effectLst/>
+                <a:latin typeface="Consolas" panose="020B0609020204030204" pitchFamily="49" charset="0"/>
+              </a:rPr>
+              <a:t>*</a:t>
+            </a:r>
+            <a:r>
+              <a:rPr lang="en-US" b="0" dirty="0">
+                <a:solidFill>
+                  <a:srgbClr val="9CDCFE"/>
+                </a:solidFill>
+                <a:effectLst/>
+                <a:latin typeface="Consolas" panose="020B0609020204030204" pitchFamily="49" charset="0"/>
+              </a:rPr>
+              <a:t>next</a:t>
+            </a:r>
+            <a:r>
+              <a:rPr lang="en-US" b="0" dirty="0">
+                <a:solidFill>
+                  <a:srgbClr val="D4D4D4"/>
+                </a:solidFill>
+                <a:effectLst/>
+                <a:latin typeface="Consolas" panose="020B0609020204030204" pitchFamily="49" charset="0"/>
+              </a:rPr>
+              <a:t>;</a:t>
+            </a:r>
+          </a:p>
+          <a:p>
+            <a:pPr marL="36900" indent="0">
+              <a:buNone/>
+            </a:pPr>
+            <a:r>
+              <a:rPr lang="en-US" b="0" dirty="0">
+                <a:solidFill>
+                  <a:srgbClr val="D4D4D4"/>
+                </a:solidFill>
+                <a:effectLst/>
+                <a:latin typeface="Consolas" panose="020B0609020204030204" pitchFamily="49" charset="0"/>
+              </a:rPr>
+              <a:t>}</a:t>
+            </a:r>
+            <a:r>
+              <a:rPr lang="en-US" b="0" dirty="0">
+                <a:solidFill>
+                  <a:srgbClr val="4EC9B0"/>
+                </a:solidFill>
+                <a:effectLst/>
+                <a:latin typeface="Consolas" panose="020B0609020204030204" pitchFamily="49" charset="0"/>
+              </a:rPr>
+              <a:t>buffer</a:t>
+            </a:r>
+            <a:r>
+              <a:rPr lang="en-US" b="0" dirty="0">
+                <a:solidFill>
+                  <a:srgbClr val="D4D4D4"/>
+                </a:solidFill>
+                <a:effectLst/>
+                <a:latin typeface="Consolas" panose="020B0609020204030204" pitchFamily="49" charset="0"/>
+              </a:rPr>
+              <a:t>;</a:t>
+            </a:r>
+          </a:p>
+          <a:p>
+            <a:endParaRPr lang="en-IN" dirty="0"/>
           </a:p>
         </p:txBody>
       </p:sp>
     </p:spTree>
     <p:extLst>
       <p:ext uri="{BB962C8B-B14F-4D97-AF65-F5344CB8AC3E}">
-        <p14:creationId xmlns:p14="http://schemas.microsoft.com/office/powerpoint/2010/main" val="2448020185"/>
+        <p14:creationId xmlns:p14="http://schemas.microsoft.com/office/powerpoint/2010/main" val="92821201"/>
       </p:ext>
     </p:extLst>
   </p:cSld>
@@ -6324,7 +9774,7 @@
           <p:cNvPr id="2" name="Title 1">
             <a:extLst>
               <a:ext uri="{FF2B5EF4-FFF2-40B4-BE49-F238E27FC236}">
-                <a16:creationId xmlns:a16="http://schemas.microsoft.com/office/drawing/2014/main" id="{039D511E-E0DE-46F8-8423-D6BC944A7EA0}"/>
+                <a16:creationId xmlns:a16="http://schemas.microsoft.com/office/drawing/2014/main" id="{2009B616-1D7D-4479-9095-DE0276A9A27F}"/>
               </a:ext>
             </a:extLst>
           </p:cNvPr>
@@ -6342,13 +9792,97 @@
           <a:p>
             <a:r>
               <a:rPr lang="en-IN" dirty="0"/>
-              <a:t>How I Had </a:t>
+              <a:t>Flow of My Project</a:t>
             </a:r>
+          </a:p>
+        </p:txBody>
+      </p:sp>
+      <p:graphicFrame>
+        <p:nvGraphicFramePr>
+          <p:cNvPr id="5" name="Content Placeholder 4">
+            <a:extLst>
+              <a:ext uri="{FF2B5EF4-FFF2-40B4-BE49-F238E27FC236}">
+                <a16:creationId xmlns:a16="http://schemas.microsoft.com/office/drawing/2014/main" id="{E222DF36-8B64-4820-B92D-4D0C2A9791F0}"/>
+              </a:ext>
+            </a:extLst>
+          </p:cNvPr>
+          <p:cNvGraphicFramePr>
+            <a:graphicFrameLocks noGrp="1"/>
+          </p:cNvGraphicFramePr>
+          <p:nvPr>
+            <p:ph idx="1"/>
+            <p:extLst>
+              <p:ext uri="{D42A27DB-BD31-4B8C-83A1-F6EECF244321}">
+                <p14:modId xmlns:p14="http://schemas.microsoft.com/office/powerpoint/2010/main" val="592696311"/>
+              </p:ext>
+            </p:extLst>
+          </p:nvPr>
+        </p:nvGraphicFramePr>
+        <p:xfrm>
+          <a:off x="913795" y="1732449"/>
+          <a:ext cx="10353762" cy="4058751"/>
+        </p:xfrm>
+        <a:graphic>
+          <a:graphicData uri="http://schemas.openxmlformats.org/drawingml/2006/diagram">
+            <dgm:relIds xmlns:dgm="http://schemas.openxmlformats.org/drawingml/2006/diagram" xmlns:r="http://schemas.openxmlformats.org/officeDocument/2006/relationships" r:dm="rId2" r:lo="rId3" r:qs="rId4" r:cs="rId5"/>
+          </a:graphicData>
+        </a:graphic>
+      </p:graphicFrame>
+    </p:spTree>
+    <p:extLst>
+      <p:ext uri="{BB962C8B-B14F-4D97-AF65-F5344CB8AC3E}">
+        <p14:creationId xmlns:p14="http://schemas.microsoft.com/office/powerpoint/2010/main" val="2217528373"/>
+      </p:ext>
+    </p:extLst>
+  </p:cSld>
+  <p:clrMapOvr>
+    <a:masterClrMapping/>
+  </p:clrMapOvr>
+</p:sld>
+</file>
+
+<file path=ppt/slides/slide4.xml><?xml version="1.0" encoding="utf-8"?>
+<p:sld xmlns:a="http://schemas.openxmlformats.org/drawingml/2006/main" xmlns:r="http://schemas.openxmlformats.org/officeDocument/2006/relationships" xmlns:p="http://schemas.openxmlformats.org/presentationml/2006/main">
+  <p:cSld>
+    <p:spTree>
+      <p:nvGrpSpPr>
+        <p:cNvPr id="1" name=""/>
+        <p:cNvGrpSpPr/>
+        <p:nvPr/>
+      </p:nvGrpSpPr>
+      <p:grpSpPr>
+        <a:xfrm>
+          <a:off x="0" y="0"/>
+          <a:ext cx="0" cy="0"/>
+          <a:chOff x="0" y="0"/>
+          <a:chExt cx="0" cy="0"/>
+        </a:xfrm>
+      </p:grpSpPr>
+      <p:sp>
+        <p:nvSpPr>
+          <p:cNvPr id="2" name="Title 1">
+            <a:extLst>
+              <a:ext uri="{FF2B5EF4-FFF2-40B4-BE49-F238E27FC236}">
+                <a16:creationId xmlns:a16="http://schemas.microsoft.com/office/drawing/2014/main" id="{B354EF9A-1F1D-4C5F-A5BC-2DE737FC2873}"/>
+              </a:ext>
+            </a:extLst>
+          </p:cNvPr>
+          <p:cNvSpPr>
+            <a:spLocks noGrp="1"/>
+          </p:cNvSpPr>
+          <p:nvPr>
+            <p:ph type="title"/>
+          </p:nvPr>
+        </p:nvSpPr>
+        <p:spPr/>
+        <p:txBody>
+          <a:bodyPr/>
+          <a:lstStyle/>
+          <a:p>
             <a:r>
-              <a:rPr lang="en-IN" dirty="0" err="1"/>
-              <a:t>Implimented</a:t>
+              <a:rPr lang="en-IN" dirty="0"/>
+              <a:t>Features of Text editor</a:t>
             </a:r>
-            <a:endParaRPr lang="en-IN" dirty="0"/>
           </a:p>
         </p:txBody>
       </p:sp>
@@ -6357,7 +9891,7 @@
           <p:cNvPr id="3" name="Content Placeholder 2">
             <a:extLst>
               <a:ext uri="{FF2B5EF4-FFF2-40B4-BE49-F238E27FC236}">
-                <a16:creationId xmlns:a16="http://schemas.microsoft.com/office/drawing/2014/main" id="{1BBEA56D-0F45-4D73-8657-3DFB08181EDA}"/>
+                <a16:creationId xmlns:a16="http://schemas.microsoft.com/office/drawing/2014/main" id="{6D3E8922-B545-493D-8B07-69C49C0E2850}"/>
               </a:ext>
             </a:extLst>
           </p:cNvPr>
@@ -6368,21 +9902,91 @@
             <p:ph idx="1"/>
           </p:nvPr>
         </p:nvSpPr>
-        <p:spPr/>
+        <p:spPr>
+          <a:xfrm>
+            <a:off x="2520652" y="2442662"/>
+            <a:ext cx="9082462" cy="4020281"/>
+          </a:xfrm>
+        </p:spPr>
         <p:txBody>
-          <a:bodyPr/>
+          <a:bodyPr numCol="2">
+            <a:normAutofit/>
+          </a:bodyPr>
           <a:lstStyle/>
           <a:p>
             <a:r>
               <a:rPr lang="en-IN" sz="2400" dirty="0"/>
-              <a:t>This is the Text editor made with NCURSES library for Terminal UI.</a:t>
+              <a:t>Creating files</a:t>
             </a:r>
           </a:p>
           <a:p>
             <a:r>
               <a:rPr lang="en-IN" sz="2400" dirty="0"/>
-              <a:t>I used linked list of lines as a Buffer </a:t>
+              <a:t>Saving files</a:t>
             </a:r>
+          </a:p>
+          <a:p>
+            <a:r>
+              <a:rPr lang="en-IN" sz="2400" dirty="0"/>
+              <a:t>Editing files</a:t>
+            </a:r>
+          </a:p>
+          <a:p>
+            <a:r>
+              <a:rPr lang="en-IN" sz="2400" dirty="0"/>
+              <a:t>Cursor movement</a:t>
+            </a:r>
+          </a:p>
+          <a:p>
+            <a:r>
+              <a:rPr lang="en-IN" sz="2400" dirty="0"/>
+              <a:t>Cut , Copy, Paste</a:t>
+            </a:r>
+          </a:p>
+          <a:p>
+            <a:r>
+              <a:rPr lang="en-IN" sz="2400" dirty="0"/>
+              <a:t>Search and Replace</a:t>
+            </a:r>
+          </a:p>
+          <a:p>
+            <a:pPr marL="36900" indent="0">
+              <a:buNone/>
+            </a:pPr>
+            <a:endParaRPr lang="en-IN" sz="2400" dirty="0"/>
+          </a:p>
+          <a:p>
+            <a:r>
+              <a:rPr lang="en-IN" sz="2400" dirty="0"/>
+              <a:t>Undo and Redo </a:t>
+            </a:r>
+          </a:p>
+          <a:p>
+            <a:r>
+              <a:rPr lang="en-IN" sz="2400" dirty="0"/>
+              <a:t>Syntax Highlighting</a:t>
+            </a:r>
+          </a:p>
+          <a:p>
+            <a:r>
+              <a:rPr lang="en-IN" sz="2400" dirty="0"/>
+              <a:t>Go to line number</a:t>
+            </a:r>
+          </a:p>
+          <a:p>
+            <a:r>
+              <a:rPr lang="en-IN" sz="2400" dirty="0"/>
+              <a:t>Page Up and Page Down</a:t>
+            </a:r>
+          </a:p>
+          <a:p>
+            <a:r>
+              <a:rPr lang="en-IN" sz="2400" dirty="0"/>
+              <a:t>Home And End key</a:t>
+            </a:r>
+          </a:p>
+          <a:p>
+            <a:endParaRPr lang="en-IN" dirty="0"/>
           </a:p>
           <a:p>
             <a:endParaRPr lang="en-IN" dirty="0"/>
@@ -6392,7 +9996,7 @@
     </p:spTree>
     <p:extLst>
       <p:ext uri="{BB962C8B-B14F-4D97-AF65-F5344CB8AC3E}">
-        <p14:creationId xmlns:p14="http://schemas.microsoft.com/office/powerpoint/2010/main" val="92821201"/>
+        <p14:creationId xmlns:p14="http://schemas.microsoft.com/office/powerpoint/2010/main" val="3688805775"/>
       </p:ext>
     </p:extLst>
   </p:cSld>
@@ -6402,7 +10006,7 @@
 </p:sld>
 </file>
 
-<file path=ppt/slides/slide4.xml><?xml version="1.0" encoding="utf-8"?>
+<file path=ppt/slides/slide5.xml><?xml version="1.0" encoding="utf-8"?>
 <p:sld xmlns:a="http://schemas.openxmlformats.org/drawingml/2006/main" xmlns:r="http://schemas.openxmlformats.org/officeDocument/2006/relationships" xmlns:p="http://schemas.openxmlformats.org/presentationml/2006/main">
   <p:cSld>
     <p:spTree>
@@ -6444,13 +10048,8 @@
           <a:p>
             <a:r>
               <a:rPr lang="en-IN" sz="4000" dirty="0"/>
-              <a:t>Functionalities </a:t>
+              <a:t>Features  Implemented</a:t>
             </a:r>
-            <a:r>
-              <a:rPr lang="en-IN" dirty="0"/>
-              <a:t>: </a:t>
-            </a:r>
-            <a:endParaRPr lang="en-IN" sz="4000" dirty="0"/>
           </a:p>
         </p:txBody>
       </p:sp>
@@ -6550,7 +10149,7 @@
           <a:p>
             <a:r>
               <a:rPr lang="en-IN" sz="2400" dirty="0"/>
-              <a:t>Use of curser key to navigate</a:t>
+              <a:t>Use of cursor to navigate</a:t>
             </a:r>
           </a:p>
           <a:p>
@@ -6577,7 +10176,7 @@
 </p:sld>
 </file>
 
-<file path=ppt/slides/slide5.xml><?xml version="1.0" encoding="utf-8"?>
+<file path=ppt/slides/slide6.xml><?xml version="1.0" encoding="utf-8"?>
 <p:sld xmlns:a="http://schemas.openxmlformats.org/drawingml/2006/main" xmlns:r="http://schemas.openxmlformats.org/officeDocument/2006/relationships" xmlns:p="http://schemas.openxmlformats.org/presentationml/2006/main">
   <p:cSld>
     <p:spTree>
@@ -6599,7 +10198,7 @@
           <p:cNvPr id="2" name="Title 1">
             <a:extLst>
               <a:ext uri="{FF2B5EF4-FFF2-40B4-BE49-F238E27FC236}">
-                <a16:creationId xmlns:a16="http://schemas.microsoft.com/office/drawing/2014/main" id="{52FAD45F-0FCC-445B-ACCA-F48A088DC6F4}"/>
+                <a16:creationId xmlns:a16="http://schemas.microsoft.com/office/drawing/2014/main" id="{FA2F9C89-FC1C-4DC8-9424-2117A63F85AA}"/>
               </a:ext>
             </a:extLst>
           </p:cNvPr>
@@ -6612,12 +10211,14 @@
         </p:nvSpPr>
         <p:spPr/>
         <p:txBody>
-          <a:bodyPr/>
+          <a:bodyPr>
+            <a:normAutofit/>
+          </a:bodyPr>
           <a:lstStyle/>
           <a:p>
             <a:r>
-              <a:rPr lang="en-IN" dirty="0"/>
-              <a:t>Functions that I have implemented : </a:t>
+              <a:rPr lang="en-IN" sz="4400" dirty="0"/>
+              <a:t>Research And References </a:t>
             </a:r>
           </a:p>
         </p:txBody>
@@ -6627,7 +10228,7 @@
           <p:cNvPr id="3" name="Content Placeholder 2">
             <a:extLst>
               <a:ext uri="{FF2B5EF4-FFF2-40B4-BE49-F238E27FC236}">
-                <a16:creationId xmlns:a16="http://schemas.microsoft.com/office/drawing/2014/main" id="{1EF491FF-8D7B-4605-9DB0-F8E303728029}"/>
+                <a16:creationId xmlns:a16="http://schemas.microsoft.com/office/drawing/2014/main" id="{FE5F54A0-4AB4-46A6-A123-D7953C67BC05}"/>
               </a:ext>
             </a:extLst>
           </p:cNvPr>
@@ -6641,91 +10242,93 @@
         <p:spPr/>
         <p:txBody>
           <a:bodyPr>
-            <a:normAutofit fontScale="92500" lnSpcReduction="10000"/>
+            <a:normAutofit/>
           </a:bodyPr>
           <a:lstStyle/>
           <a:p>
+            <a:pPr marL="0" indent="0">
+              <a:buNone/>
+            </a:pPr>
+            <a:endParaRPr lang="en-US" sz="2400" dirty="0"/>
+          </a:p>
+          <a:p>
             <a:r>
-              <a:rPr lang="en-IN" dirty="0"/>
-              <a:t>Reading from files</a:t>
+              <a:rPr lang="en-US" sz="2400" dirty="0"/>
+              <a:t>man page of vim text editor.</a:t>
             </a:r>
           </a:p>
           <a:p>
             <a:r>
-              <a:rPr lang="en-IN" dirty="0"/>
-              <a:t>If user don’t provide any file then it will create a empty buffer.</a:t>
+              <a:rPr lang="en-US" sz="2400" dirty="0"/>
+              <a:t>man page of </a:t>
+            </a:r>
+            <a:r>
+              <a:rPr lang="en-US" sz="2400" dirty="0" err="1"/>
+              <a:t>ncurses</a:t>
+            </a:r>
+            <a:r>
+              <a:rPr lang="en-US" sz="2400" dirty="0"/>
+              <a:t> library</a:t>
             </a:r>
           </a:p>
           <a:p>
             <a:r>
-              <a:rPr lang="en-IN" dirty="0"/>
-              <a:t>Implemented UI of text editor.</a:t>
+              <a:rPr lang="en-US" sz="2400" dirty="0"/>
+              <a:t>An article on </a:t>
+            </a:r>
+            <a:r>
+              <a:rPr lang="en-US" sz="2400" dirty="0" err="1"/>
+              <a:t>ncurses</a:t>
+            </a:r>
+            <a:r>
+              <a:rPr lang="en-US" sz="2400" dirty="0"/>
+              <a:t> by X. Li.</a:t>
             </a:r>
           </a:p>
           <a:p>
+            <a:pPr algn="l"/>
             <a:r>
-              <a:rPr lang="en-IN" dirty="0"/>
-              <a:t>Curser is used to navigate.</a:t>
+              <a:rPr lang="en-US" sz="2400" dirty="0"/>
+              <a:t>I found some of the blogs seems  to be useful to get basic idea. Ex- blog by Danial Wang. </a:t>
             </a:r>
           </a:p>
           <a:p>
+            <a:pPr algn="l"/>
             <a:r>
-              <a:rPr lang="en-IN" dirty="0"/>
-              <a:t>Arrow keys – left , right, up, down works.</a:t>
+              <a:rPr lang="en-US" sz="2400" dirty="0"/>
+              <a:t>An information capsule on </a:t>
             </a:r>
+            <a:r>
+              <a:rPr lang="en-US" sz="2400" dirty="0" err="1"/>
+              <a:t>curses.h</a:t>
+            </a:r>
+            <a:r>
+              <a:rPr lang="en-US" sz="2400" dirty="0"/>
+              <a:t> by The Open Group.</a:t>
+            </a:r>
+            <a:br>
+              <a:rPr lang="en-IN" sz="2400" b="0" i="0" u="none" strike="noStrike" dirty="0">
+                <a:solidFill>
+                  <a:srgbClr val="757575"/>
+                </a:solidFill>
+                <a:effectLst/>
+                <a:latin typeface="Calisto MT (Body)"/>
+                <a:hlinkClick r:id="rId2"/>
+              </a:rPr>
+            </a:br>
+            <a:endParaRPr lang="en-US" sz="2400" dirty="0">
+              <a:latin typeface="Calisto MT (Body)"/>
+            </a:endParaRPr>
           </a:p>
           <a:p>
-            <a:r>
-              <a:rPr lang="en-IN" dirty="0"/>
-              <a:t>Backspace works</a:t>
-            </a:r>
-          </a:p>
-          <a:p>
-            <a:r>
-              <a:rPr lang="en-IN" dirty="0"/>
-              <a:t>Save file works </a:t>
-            </a:r>
-            <a:r>
-              <a:rPr lang="en-IN" dirty="0" err="1"/>
-              <a:t>i.e</a:t>
-            </a:r>
-            <a:r>
-              <a:rPr lang="en-IN" dirty="0"/>
-              <a:t> ctrl + </a:t>
-            </a:r>
-            <a:r>
-              <a:rPr lang="en-IN"/>
-              <a:t>s works</a:t>
-            </a:r>
-            <a:endParaRPr lang="en-IN" dirty="0"/>
-          </a:p>
-          <a:p>
-            <a:r>
-              <a:rPr lang="en-IN" dirty="0"/>
-              <a:t>Insert at any place works.</a:t>
-            </a:r>
-          </a:p>
-          <a:p>
-            <a:r>
-              <a:rPr lang="en-IN" dirty="0"/>
-              <a:t>Save file works.</a:t>
-            </a:r>
-          </a:p>
-          <a:p>
-            <a:r>
-              <a:rPr lang="en-IN" dirty="0"/>
-              <a:t>If file name is not given then it will ask for file name , create it and then save to it.</a:t>
-            </a:r>
-          </a:p>
-          <a:p>
-            <a:endParaRPr lang="en-IN" dirty="0"/>
+            <a:endParaRPr lang="en-IN" sz="2400" dirty="0"/>
           </a:p>
         </p:txBody>
       </p:sp>
     </p:spTree>
     <p:extLst>
       <p:ext uri="{BB962C8B-B14F-4D97-AF65-F5344CB8AC3E}">
-        <p14:creationId xmlns:p14="http://schemas.microsoft.com/office/powerpoint/2010/main" val="4025605297"/>
+        <p14:creationId xmlns:p14="http://schemas.microsoft.com/office/powerpoint/2010/main" val="2448020185"/>
       </p:ext>
     </p:extLst>
   </p:cSld>
@@ -6735,7 +10338,7 @@
 </p:sld>
 </file>
 
-<file path=ppt/slides/slide6.xml><?xml version="1.0" encoding="utf-8"?>
+<file path=ppt/slides/slide7.xml><?xml version="1.0" encoding="utf-8"?>
 <p:sld xmlns:a="http://schemas.openxmlformats.org/drawingml/2006/main" xmlns:r="http://schemas.openxmlformats.org/officeDocument/2006/relationships" xmlns:p="http://schemas.openxmlformats.org/presentationml/2006/main">
   <p:cSld>
     <p:spTree>
@@ -22203,6 +25806,71 @@
 </p:sld>
 </file>
 
+<file path=ppt/slides/slide8.xml><?xml version="1.0" encoding="utf-8"?>
+<p:sld xmlns:a="http://schemas.openxmlformats.org/drawingml/2006/main" xmlns:r="http://schemas.openxmlformats.org/officeDocument/2006/relationships" xmlns:p="http://schemas.openxmlformats.org/presentationml/2006/main">
+  <p:cSld>
+    <p:spTree>
+      <p:nvGrpSpPr>
+        <p:cNvPr id="1" name=""/>
+        <p:cNvGrpSpPr/>
+        <p:nvPr/>
+      </p:nvGrpSpPr>
+      <p:grpSpPr>
+        <a:xfrm>
+          <a:off x="0" y="0"/>
+          <a:ext cx="0" cy="0"/>
+          <a:chOff x="0" y="0"/>
+          <a:chExt cx="0" cy="0"/>
+        </a:xfrm>
+      </p:grpSpPr>
+      <p:sp>
+        <p:nvSpPr>
+          <p:cNvPr id="2" name="Title 1">
+            <a:extLst>
+              <a:ext uri="{FF2B5EF4-FFF2-40B4-BE49-F238E27FC236}">
+                <a16:creationId xmlns:a16="http://schemas.microsoft.com/office/drawing/2014/main" id="{1ABDF51A-A9F6-4002-9B8E-909B5EDF9B6A}"/>
+              </a:ext>
+            </a:extLst>
+          </p:cNvPr>
+          <p:cNvSpPr>
+            <a:spLocks noGrp="1"/>
+          </p:cNvSpPr>
+          <p:nvPr>
+            <p:ph type="title"/>
+          </p:nvPr>
+        </p:nvSpPr>
+        <p:spPr>
+          <a:xfrm>
+            <a:off x="919119" y="2678097"/>
+            <a:ext cx="10353762" cy="970450"/>
+          </a:xfrm>
+        </p:spPr>
+        <p:txBody>
+          <a:bodyPr>
+            <a:normAutofit/>
+          </a:bodyPr>
+          <a:lstStyle/>
+          <a:p>
+            <a:r>
+              <a:rPr lang="en-IN" sz="5400" dirty="0"/>
+              <a:t>Thank You </a:t>
+            </a:r>
+          </a:p>
+        </p:txBody>
+      </p:sp>
+    </p:spTree>
+    <p:extLst>
+      <p:ext uri="{BB962C8B-B14F-4D97-AF65-F5344CB8AC3E}">
+        <p14:creationId xmlns:p14="http://schemas.microsoft.com/office/powerpoint/2010/main" val="433553227"/>
+      </p:ext>
+    </p:extLst>
+  </p:cSld>
+  <p:clrMapOvr>
+    <a:masterClrMapping/>
+  </p:clrMapOvr>
+</p:sld>
+</file>
+
 <file path=ppt/theme/theme1.xml><?xml version="1.0" encoding="utf-8"?>
 <a:theme xmlns:a="http://schemas.openxmlformats.org/drawingml/2006/main" name="Slate">
   <a:themeElements>

</xml_diff>